<commit_message>
added bar chart factory
</commit_message>
<xml_diff>
--- a/exampleOutput.pptx
+++ b/exampleOutput.pptx
@@ -184,7 +184,119 @@
             </c:numRef>
           </c:val>
         </c:ser>
+        <c:dLbls>
+          <c:numFmt formatCode="0%" sourceLinked="0"/>
+          <c:dLblPos val="outEnd"/>
+          <c:showLegendKey val="0"/>
+          <c:showVal val="1"/>
+          <c:showCatName val="0"/>
+          <c:showSerName val="0"/>
+          <c:showPercent val="0"/>
+          <c:showBubbleSize val="0"/>
+        </c:dLbls>
       </c:pieChart>
+    </c:plotArea>
+    <c:legend>
+      <c:legendPos val="b"/>
+      <c:overlay val="0"/>
+    </c:legend>
+  </c:chart>
+  <c:txPr>
+    <a:bodyPr/>
+    <a:lstStyle/>
+    <a:p>
+      <a:pPr>
+        <a:defRPr sz="1800"/>
+      </a:pPr>
+      <a:endParaRPr lang="en-US"/>
+    </a:p>
+  </c:txPr>
+  <c:externalData r:id="rId1">
+    <c:autoUpdate val="0"/>
+  </c:externalData>
+</c:chartSpace>
+</file>
+
+<file path=ppt/charts/chart2.xml><?xml version="1.0" encoding="utf-8"?>
+<c:chartSpace xmlns:c="http://schemas.openxmlformats.org/drawingml/2006/chart" xmlns:a="http://schemas.openxmlformats.org/drawingml/2006/main" xmlns:r="http://schemas.openxmlformats.org/officeDocument/2006/relationships">
+  <c:chart>
+    <c:plotArea>
+      <c:barChart>
+        <c:barDir val="col"/>
+        <c:grouping val="clustered"/>
+        <c:ser>
+          <c:idx val="0"/>
+          <c:order val="0"/>
+          <c:tx>
+            <c:strRef>
+              <c:f>Sheet1!$B$1</c:f>
+              <c:strCache>
+                <c:ptCount val="1"/>
+                <c:pt idx="0">
+                  <c:v>Series 1</c:v>
+                </c:pt>
+              </c:strCache>
+            </c:strRef>
+          </c:tx>
+          <c:cat>
+            <c:strRef>
+              <c:f>Sheet1!$A$2:$A$3</c:f>
+              <c:strCache>
+                <c:ptCount val="2"/>
+                <c:pt idx="0">
+                  <c:v>Less than Goal</c:v>
+                </c:pt>
+                <c:pt idx="1">
+                  <c:v>Goal</c:v>
+                </c:pt>
+              </c:strCache>
+            </c:strRef>
+          </c:cat>
+          <c:val>
+            <c:numRef>
+              <c:f>Sheet1!$B$2:$B$3</c:f>
+              <c:numCache>
+                <c:formatCode>General</c:formatCode>
+                <c:ptCount val="2"/>
+                <c:pt idx="0">
+                  <c:v>18</c:v>
+                </c:pt>
+                <c:pt idx="1">
+                  <c:v>30</c:v>
+                </c:pt>
+              </c:numCache>
+            </c:numRef>
+          </c:val>
+        </c:ser>
+        <c:axId val="-2068027336"/>
+        <c:axId val="-2113994440"/>
+      </c:barChart>
+      <c:catAx>
+        <c:axId val="-2068027336"/>
+        <c:scaling/>
+        <c:delete val="0"/>
+        <c:axPos val="b"/>
+        <c:majorTickMark val="out"/>
+        <c:minorTickMark val="none"/>
+        <c:tickLblPos val="nextTo"/>
+        <c:crossAx val="-2113994440"/>
+        <c:crosses val="autoZero"/>
+        <c:lblAlgn val="ctr"/>
+        <c:lblOffset val="100"/>
+        <c:noMultiLvlLbl val="0"/>
+      </c:catAx>
+      <c:valAx>
+        <c:axId val="-2113994440"/>
+        <c:scaling/>
+        <c:delete val="0"/>
+        <c:axPos val="l"/>
+        <c:majorGridlines/>
+        <c:majorTickMark val="out"/>
+        <c:minorTickMark val="none"/>
+        <c:tickLblPos val="nextTo"/>
+        <c:crossAx val="-2068027336"/>
+        <c:crosses val="autoZero"/>
+      </c:valAx>
     </c:plotArea>
   </c:chart>
   <c:txPr>
@@ -4520,10 +4632,6 @@
             <a:pPr marL="0" indent="0">
               <a:buNone/>
             </a:pPr>
-            <a:r>
-              <a:rPr lang="en-US" sz="4000" dirty="0" smtClean="0"/>
-              <a:t>#{TYPE:TEXT,TEXT:WASD}</a:t>
-            </a:r>
             <a:endParaRPr lang="en-US" sz="4000" dirty="0" smtClean="0"/>
           </a:p>
         </p:txBody>
@@ -4666,10 +4774,6 @@
             <a:pPr marL="0" indent="0">
               <a:buNone/>
             </a:pPr>
-            <a:r>
-              <a:rPr lang="en-US" sz="4000" dirty="0" smtClean="0"/>
-              <a:t>#{TYPE:TEXT,TEXT:WASD}</a:t>
-            </a:r>
             <a:endParaRPr lang="en-US" sz="4000" dirty="0" smtClean="0"/>
           </a:p>
         </p:txBody>
@@ -4890,18 +4994,6 @@
             </a:lvl9pPr>
           </a:lstStyle>
           <a:p>
-            <a:r>
-              <a:rPr lang="en-US" sz="4000" dirty="0" smtClean="0"/>
-              <a:t>#{</a:t>
-            </a:r>
-            <a:r>
-              <a:rPr lang="en-US" sz="4000" dirty="0" err="1" smtClean="0"/>
-              <a:t>TYPE:TEXT,TEXT:asdf</a:t>
-            </a:r>
-            <a:r>
-              <a:rPr lang="en-US" sz="4000" dirty="0" smtClean="0"/>
-              <a:t>}</a:t>
-            </a:r>
             <a:endParaRPr lang="en-US" sz="4000" dirty="0" smtClean="0"/>
           </a:p>
         </p:txBody>
@@ -5047,22 +5139,6 @@
             <a:pPr marL="0" indent="0">
               <a:buNone/>
             </a:pPr>
-            <a:r>
-              <a:rPr lang="en-US" sz="4000" dirty="0" smtClean="0"/>
-              <a:t>#{TYPE:PIE CHART</a:t>
-            </a:r>
-            <a:r>
-              <a:rPr lang="en-US" sz="4000" dirty="0"/>
-              <a:t>, </a:t>
-            </a:r>
-            <a:r>
-              <a:rPr lang="en-US" sz="4000" dirty="0" smtClean="0"/>
-              <a:t>COLUMN:2, X:2,Y:2,CX:3,CY:3</a:t>
-            </a:r>
-            <a:r>
-              <a:rPr lang="en-US" sz="4000" dirty="0"/>
-              <a:t>}</a:t>
-            </a:r>
             <a:endParaRPr lang="en-US" sz="4000" dirty="0" smtClean="0"/>
           </a:p>
         </p:txBody>
@@ -5195,18 +5271,6 @@
             <a:pPr marL="0" indent="0">
               <a:buNone/>
             </a:pPr>
-            <a:r>
-              <a:rPr lang="en-US" sz="4000" dirty="0" smtClean="0"/>
-              <a:t>#{TYPE:BAR CHART, COLUMN:5</a:t>
-            </a:r>
-            <a:r>
-              <a:rPr lang="en-US" sz="4000" smtClean="0"/>
-              <a:t>, X:2,Y:2,CX:3,CY:3</a:t>
-            </a:r>
-            <a:r>
-              <a:rPr lang="en-US" sz="4000" dirty="0" smtClean="0"/>
-              <a:t>}</a:t>
-            </a:r>
             <a:endParaRPr lang="en-US" sz="4000" dirty="0" smtClean="0"/>
           </a:p>
         </p:txBody>
@@ -5236,6 +5300,24 @@
           </a:p>
         </p:txBody>
       </p:sp>
+      <p:graphicFrame>
+        <p:nvGraphicFramePr>
+          <p:cNvPr id="4" name="Chart 3"/>
+          <p:cNvGraphicFramePr>
+            <a:graphicFrameLocks noGrp="1"/>
+          </p:cNvGraphicFramePr>
+          <p:nvPr/>
+        </p:nvGraphicFramePr>
+        <p:xfrm>
+          <a:off x="1828800" y="1828800"/>
+          <a:ext cx="2743200" cy="2743200"/>
+        </p:xfrm>
+        <a:graphic>
+          <a:graphicData uri="http://schemas.openxmlformats.org/drawingml/2006/chart">
+            <c:chart xmlns:c="http://schemas.openxmlformats.org/drawingml/2006/chart" r:id="rId2"/>
+          </a:graphicData>
+        </a:graphic>
+      </p:graphicFrame>
     </p:spTree>
     <p:extLst>
       <p:ext uri="{BB962C8B-B14F-4D97-AF65-F5344CB8AC3E}">

</xml_diff>

<commit_message>
added insertion to text and inheritence to factories
</commit_message>
<xml_diff>
--- a/exampleOutput.pptx
+++ b/exampleOutput.pptx
@@ -4632,6 +4632,9 @@
             <a:pPr marL="0" indent="0">
               <a:buNone/>
             </a:pPr>
+            <a:r>
+              <a:t>WASD</a:t>
+            </a:r>
             <a:endParaRPr lang="en-US" sz="4000" dirty="0" smtClean="0"/>
           </a:p>
         </p:txBody>
@@ -4658,34 +4661,6 @@
               <a:t>2</a:t>
             </a:fld>
             <a:endParaRPr lang="en-US" dirty="0"/>
-          </a:p>
-        </p:txBody>
-      </p:sp>
-      <p:sp>
-        <p:nvSpPr>
-          <p:cNvPr id="4" name="TextBox 3"/>
-          <p:cNvSpPr txBox="1"/>
-          <p:nvPr/>
-        </p:nvSpPr>
-        <p:spPr>
-          <a:xfrm>
-            <a:off x="3352800" y="1524000"/>
-            <a:ext cx="6169152" cy="1066800"/>
-          </a:xfrm>
-          <a:prstGeom prst="rect">
-            <a:avLst/>
-          </a:prstGeom>
-          <a:noFill/>
-        </p:spPr>
-        <p:txBody>
-          <a:bodyPr wrap="none">
-            <a:spAutoFit/>
-          </a:bodyPr>
-          <a:lstStyle/>
-          <a:p>
-            <a:r>
-              <a:t>WASD</a:t>
-            </a:r>
           </a:p>
         </p:txBody>
       </p:sp>
@@ -4774,6 +4749,9 @@
             <a:pPr marL="0" indent="0">
               <a:buNone/>
             </a:pPr>
+            <a:r>
+              <a:t>WASD</a:t>
+            </a:r>
             <a:endParaRPr lang="en-US" sz="4000" dirty="0" smtClean="0"/>
           </a:p>
         </p:txBody>
@@ -4994,63 +4972,10 @@
             </a:lvl9pPr>
           </a:lstStyle>
           <a:p>
+            <a:r>
+              <a:t>ASDF</a:t>
+            </a:r>
             <a:endParaRPr lang="en-US" sz="4000" dirty="0" smtClean="0"/>
-          </a:p>
-        </p:txBody>
-      </p:sp>
-      <p:sp>
-        <p:nvSpPr>
-          <p:cNvPr id="4" name="TextBox 3"/>
-          <p:cNvSpPr txBox="1"/>
-          <p:nvPr/>
-        </p:nvSpPr>
-        <p:spPr>
-          <a:xfrm>
-            <a:off x="2590800" y="1371600"/>
-            <a:ext cx="6169152" cy="1066800"/>
-          </a:xfrm>
-          <a:prstGeom prst="rect">
-            <a:avLst/>
-          </a:prstGeom>
-          <a:noFill/>
-        </p:spPr>
-        <p:txBody>
-          <a:bodyPr wrap="none">
-            <a:spAutoFit/>
-          </a:bodyPr>
-          <a:lstStyle/>
-          <a:p>
-            <a:r>
-              <a:t>WASD</a:t>
-            </a:r>
-          </a:p>
-        </p:txBody>
-      </p:sp>
-      <p:sp>
-        <p:nvSpPr>
-          <p:cNvPr id="7" name="TextBox 6"/>
-          <p:cNvSpPr txBox="1"/>
-          <p:nvPr/>
-        </p:nvSpPr>
-        <p:spPr>
-          <a:xfrm>
-            <a:off x="4191000" y="1447800"/>
-            <a:ext cx="6169152" cy="1066800"/>
-          </a:xfrm>
-          <a:prstGeom prst="rect">
-            <a:avLst/>
-          </a:prstGeom>
-          <a:noFill/>
-        </p:spPr>
-        <p:txBody>
-          <a:bodyPr wrap="none">
-            <a:spAutoFit/>
-          </a:bodyPr>
-          <a:lstStyle/>
-          <a:p>
-            <a:r>
-              <a:t>ASDF</a:t>
-            </a:r>
           </a:p>
         </p:txBody>
       </p:sp>
@@ -5178,7 +5103,7 @@
         </p:nvGraphicFramePr>
         <p:xfrm>
           <a:off x="1828800" y="1828800"/>
-          <a:ext cx="2743200" cy="2743200"/>
+          <a:ext cx="2743200" cy="3886198"/>
         </p:xfrm>
         <a:graphic>
           <a:graphicData uri="http://schemas.openxmlformats.org/drawingml/2006/chart">

</xml_diff>

<commit_message>
text insert will properly insert variables
</commit_message>
<xml_diff>
--- a/exampleOutput.pptx
+++ b/exampleOutput.pptx
@@ -5,18 +5,14 @@
     <p:sldMasterId id="2147483996" r:id="rId1"/>
   </p:sldMasterIdLst>
   <p:notesMasterIdLst>
-    <p:notesMasterId r:id="rId8"/>
+    <p:notesMasterId r:id="rId4"/>
   </p:notesMasterIdLst>
   <p:handoutMasterIdLst>
-    <p:handoutMasterId r:id="rId9"/>
+    <p:handoutMasterId r:id="rId5"/>
   </p:handoutMasterIdLst>
   <p:sldIdLst>
-    <p:sldId id="256" r:id="rId2"/>
-    <p:sldId id="259" r:id="rId3"/>
-    <p:sldId id="274" r:id="rId4"/>
-    <p:sldId id="273" r:id="rId5"/>
-    <p:sldId id="275" r:id="rId6"/>
-    <p:sldId id="258" r:id="rId7"/>
+    <p:sldId id="259" r:id="rId2"/>
+    <p:sldId id="260" r:id="rId3"/>
   </p:sldIdLst>
   <p:sldSz cx="9144000" cy="6858000" type="screen4x3"/>
   <p:notesSz cx="9296400" cy="7010400"/>
@@ -117,7 +113,7 @@
   </p:defaultTextStyle>
   <p:extLst>
     <p:ext uri="{EFAFB233-063F-42B5-8137-9DF3F51BA10A}">
-      <p15:sldGuideLst xmlns="" xmlns:p15="http://schemas.microsoft.com/office/powerpoint/2012/main">
+      <p15:sldGuideLst xmlns:p15="http://schemas.microsoft.com/office/powerpoint/2012/main" xmlns="">
         <p15:guide id="1" orient="horz" pos="2160">
           <p15:clr>
             <a:srgbClr val="A4A3A4"/>
@@ -132,187 +128,6 @@
     </p:ext>
   </p:extLst>
 </p:presentation>
-</file>
-
-<file path=ppt/charts/chart1.xml><?xml version="1.0" encoding="utf-8"?>
-<c:chartSpace xmlns:c="http://schemas.openxmlformats.org/drawingml/2006/chart" xmlns:a="http://schemas.openxmlformats.org/drawingml/2006/main" xmlns:r="http://schemas.openxmlformats.org/officeDocument/2006/relationships">
-  <c:chart>
-    <c:plotArea>
-      <c:pieChart>
-        <c:varyColors val="1"/>
-        <c:ser>
-          <c:idx val="0"/>
-          <c:order val="0"/>
-          <c:tx>
-            <c:strRef>
-              <c:f>Sheet1!$B$1</c:f>
-              <c:strCache>
-                <c:ptCount val="1"/>
-                <c:pt idx="0">
-                  <c:v>Series 1</c:v>
-                </c:pt>
-              </c:strCache>
-            </c:strRef>
-          </c:tx>
-          <c:cat>
-            <c:strRef>
-              <c:f>Sheet1!$A$2:$A$3</c:f>
-              <c:strCache>
-                <c:ptCount val="2"/>
-                <c:pt idx="0">
-                  <c:v>male</c:v>
-                </c:pt>
-                <c:pt idx="1">
-                  <c:v>female</c:v>
-                </c:pt>
-              </c:strCache>
-            </c:strRef>
-          </c:cat>
-          <c:val>
-            <c:numRef>
-              <c:f>Sheet1!$B$2:$B$3</c:f>
-              <c:numCache>
-                <c:formatCode>General</c:formatCode>
-                <c:ptCount val="2"/>
-                <c:pt idx="0">
-                  <c:v>16</c:v>
-                </c:pt>
-                <c:pt idx="1">
-                  <c:v>32</c:v>
-                </c:pt>
-              </c:numCache>
-            </c:numRef>
-          </c:val>
-        </c:ser>
-        <c:dLbls>
-          <c:numFmt formatCode="0%" sourceLinked="0"/>
-          <c:dLblPos val="outEnd"/>
-          <c:showLegendKey val="0"/>
-          <c:showVal val="1"/>
-          <c:showCatName val="0"/>
-          <c:showSerName val="0"/>
-          <c:showPercent val="0"/>
-          <c:showBubbleSize val="0"/>
-        </c:dLbls>
-      </c:pieChart>
-    </c:plotArea>
-    <c:legend>
-      <c:legendPos val="b"/>
-      <c:overlay val="0"/>
-    </c:legend>
-  </c:chart>
-  <c:txPr>
-    <a:bodyPr/>
-    <a:lstStyle/>
-    <a:p>
-      <a:pPr>
-        <a:defRPr sz="1800"/>
-      </a:pPr>
-      <a:endParaRPr lang="en-US"/>
-    </a:p>
-  </c:txPr>
-  <c:externalData r:id="rId1">
-    <c:autoUpdate val="0"/>
-  </c:externalData>
-</c:chartSpace>
-</file>
-
-<file path=ppt/charts/chart2.xml><?xml version="1.0" encoding="utf-8"?>
-<c:chartSpace xmlns:c="http://schemas.openxmlformats.org/drawingml/2006/chart" xmlns:a="http://schemas.openxmlformats.org/drawingml/2006/main" xmlns:r="http://schemas.openxmlformats.org/officeDocument/2006/relationships">
-  <c:chart>
-    <c:plotArea>
-      <c:barChart>
-        <c:barDir val="col"/>
-        <c:grouping val="clustered"/>
-        <c:ser>
-          <c:idx val="0"/>
-          <c:order val="0"/>
-          <c:tx>
-            <c:strRef>
-              <c:f>Sheet1!$B$1</c:f>
-              <c:strCache>
-                <c:ptCount val="1"/>
-                <c:pt idx="0">
-                  <c:v>Series 1</c:v>
-                </c:pt>
-              </c:strCache>
-            </c:strRef>
-          </c:tx>
-          <c:cat>
-            <c:strRef>
-              <c:f>Sheet1!$A$2:$A$3</c:f>
-              <c:strCache>
-                <c:ptCount val="2"/>
-                <c:pt idx="0">
-                  <c:v>Less than Goal</c:v>
-                </c:pt>
-                <c:pt idx="1">
-                  <c:v>Goal</c:v>
-                </c:pt>
-              </c:strCache>
-            </c:strRef>
-          </c:cat>
-          <c:val>
-            <c:numRef>
-              <c:f>Sheet1!$B$2:$B$3</c:f>
-              <c:numCache>
-                <c:formatCode>General</c:formatCode>
-                <c:ptCount val="2"/>
-                <c:pt idx="0">
-                  <c:v>18</c:v>
-                </c:pt>
-                <c:pt idx="1">
-                  <c:v>30</c:v>
-                </c:pt>
-              </c:numCache>
-            </c:numRef>
-          </c:val>
-        </c:ser>
-        <c:axId val="-2068027336"/>
-        <c:axId val="-2113994440"/>
-      </c:barChart>
-      <c:catAx>
-        <c:axId val="-2068027336"/>
-        <c:scaling/>
-        <c:delete val="0"/>
-        <c:axPos val="b"/>
-        <c:majorTickMark val="out"/>
-        <c:minorTickMark val="none"/>
-        <c:tickLblPos val="nextTo"/>
-        <c:crossAx val="-2113994440"/>
-        <c:crosses val="autoZero"/>
-        <c:lblAlgn val="ctr"/>
-        <c:lblOffset val="100"/>
-        <c:noMultiLvlLbl val="0"/>
-      </c:catAx>
-      <c:valAx>
-        <c:axId val="-2113994440"/>
-        <c:scaling/>
-        <c:delete val="0"/>
-        <c:axPos val="l"/>
-        <c:majorGridlines/>
-        <c:majorTickMark val="out"/>
-        <c:minorTickMark val="none"/>
-        <c:tickLblPos val="nextTo"/>
-        <c:crossAx val="-2068027336"/>
-        <c:crosses val="autoZero"/>
-      </c:valAx>
-    </c:plotArea>
-  </c:chart>
-  <c:txPr>
-    <a:bodyPr/>
-    <a:lstStyle/>
-    <a:p>
-      <a:pPr>
-        <a:defRPr sz="1800"/>
-      </a:pPr>
-      <a:endParaRPr lang="en-US"/>
-    </a:p>
-  </c:txPr>
-  <c:externalData r:id="rId1">
-    <c:autoUpdate val="0"/>
-  </c:externalData>
-</c:chartSpace>
 </file>
 
 <file path=ppt/handoutMasters/handoutMaster1.xml><?xml version="1.0" encoding="utf-8"?>
@@ -397,7 +212,7 @@
           <a:p>
             <a:fld id="{AAB9D47E-67C1-4E1B-91B6-1C4A4CD91A70}" type="datetimeFigureOut">
               <a:rPr lang="en-US" smtClean="0"/>
-              <a:t>11/2/2016</a:t>
+              <a:t>11/17/2016</a:t>
             </a:fld>
             <a:endParaRPr lang="en-US" dirty="0"/>
           </a:p>
@@ -562,7 +377,7 @@
           <a:p>
             <a:fld id="{D43B9A28-89AB-4FF7-B6F7-B576186B66F1}" type="datetimeFigureOut">
               <a:rPr lang="en-US" smtClean="0"/>
-              <a:t>11/2/2016</a:t>
+              <a:t>11/17/2016</a:t>
             </a:fld>
             <a:endParaRPr lang="en-US" dirty="0"/>
           </a:p>
@@ -830,98 +645,6 @@
 </p:notesMaster>
 </file>
 
-<file path=ppt/notesSlides/notesSlide1.xml><?xml version="1.0" encoding="utf-8"?>
-<p:notes xmlns:a="http://schemas.openxmlformats.org/drawingml/2006/main" xmlns:r="http://schemas.openxmlformats.org/officeDocument/2006/relationships" xmlns:p="http://schemas.openxmlformats.org/presentationml/2006/main">
-  <p:cSld>
-    <p:spTree>
-      <p:nvGrpSpPr>
-        <p:cNvPr id="1" name=""/>
-        <p:cNvGrpSpPr/>
-        <p:nvPr/>
-      </p:nvGrpSpPr>
-      <p:grpSpPr>
-        <a:xfrm>
-          <a:off x="0" y="0"/>
-          <a:ext cx="0" cy="0"/>
-          <a:chOff x="0" y="0"/>
-          <a:chExt cx="0" cy="0"/>
-        </a:xfrm>
-      </p:grpSpPr>
-      <p:sp>
-        <p:nvSpPr>
-          <p:cNvPr id="2" name="Slide Image Placeholder 1"/>
-          <p:cNvSpPr>
-            <a:spLocks noGrp="1" noRot="1" noChangeAspect="1"/>
-          </p:cNvSpPr>
-          <p:nvPr>
-            <p:ph type="sldImg"/>
-          </p:nvPr>
-        </p:nvSpPr>
-        <p:spPr/>
-      </p:sp>
-      <p:sp>
-        <p:nvSpPr>
-          <p:cNvPr id="3" name="Notes Placeholder 2"/>
-          <p:cNvSpPr>
-            <a:spLocks noGrp="1"/>
-          </p:cNvSpPr>
-          <p:nvPr>
-            <p:ph type="body" idx="1"/>
-          </p:nvPr>
-        </p:nvSpPr>
-        <p:spPr/>
-        <p:txBody>
-          <a:bodyPr/>
-          <a:lstStyle/>
-          <a:p>
-            <a:r>
-              <a:rPr lang="en-US" dirty="0" smtClean="0"/>
-              <a:t>SB Note: I’d like</a:t>
-            </a:r>
-            <a:r>
-              <a:rPr lang="en-US" baseline="0" dirty="0" smtClean="0"/>
-              <a:t> this page to be about where we got the info.  But also where they can go to read more. What others should we include?  What would be nice, actually, is if we had a resource page for each factor we tested and we could put it at the bottom of each slide!</a:t>
-            </a:r>
-            <a:endParaRPr lang="en-US" dirty="0"/>
-          </a:p>
-        </p:txBody>
-      </p:sp>
-      <p:sp>
-        <p:nvSpPr>
-          <p:cNvPr id="4" name="Slide Number Placeholder 3"/>
-          <p:cNvSpPr>
-            <a:spLocks noGrp="1"/>
-          </p:cNvSpPr>
-          <p:nvPr>
-            <p:ph type="sldNum" sz="quarter" idx="10"/>
-          </p:nvPr>
-        </p:nvSpPr>
-        <p:spPr/>
-        <p:txBody>
-          <a:bodyPr/>
-          <a:lstStyle/>
-          <a:p>
-            <a:fld id="{3F33A409-1646-4137-A75F-3A02A90E5C52}" type="slidenum">
-              <a:rPr lang="en-US" smtClean="0"/>
-              <a:t>6</a:t>
-            </a:fld>
-            <a:endParaRPr lang="en-US" dirty="0"/>
-          </a:p>
-        </p:txBody>
-      </p:sp>
-    </p:spTree>
-    <p:extLst>
-      <p:ext uri="{BB962C8B-B14F-4D97-AF65-F5344CB8AC3E}">
-        <p14:creationId xmlns:p14="http://schemas.microsoft.com/office/powerpoint/2010/main" val="3005467066"/>
-      </p:ext>
-    </p:extLst>
-  </p:cSld>
-  <p:clrMapOvr>
-    <a:masterClrMapping/>
-  </p:clrMapOvr>
-</p:notes>
-</file>
-
 <file path=ppt/slideLayouts/slideLayout1.xml><?xml version="1.0" encoding="utf-8"?>
 <p:sldLayout xmlns:a="http://schemas.openxmlformats.org/drawingml/2006/main" xmlns:r="http://schemas.openxmlformats.org/officeDocument/2006/relationships" xmlns:p="http://schemas.openxmlformats.org/presentationml/2006/main" showMasterSp="0" type="title" preserve="1">
   <p:cSld name="Title Slide">
@@ -1213,7 +936,7 @@
           <a:p>
             <a:fld id="{EB9FD57E-C399-49A5-9E41-A3349D7DE35B}" type="datetime1">
               <a:rPr lang="en-US" smtClean="0"/>
-              <a:t>11/2/2016</a:t>
+              <a:t>11/17/2016</a:t>
             </a:fld>
             <a:endParaRPr lang="en-US" dirty="0"/>
           </a:p>
@@ -1404,7 +1127,7 @@
           <a:p>
             <a:fld id="{FCEC67C6-3403-4BFB-8B45-9DB8B05CDF67}" type="datetime1">
               <a:rPr lang="en-US" smtClean="0"/>
-              <a:t>11/2/2016</a:t>
+              <a:t>11/17/2016</a:t>
             </a:fld>
             <a:endParaRPr lang="en-US" dirty="0"/>
           </a:p>
@@ -1589,7 +1312,7 @@
           <a:p>
             <a:fld id="{12BE4818-FD7D-4705-B5B3-0E204E7B8767}" type="datetime1">
               <a:rPr lang="en-US" smtClean="0"/>
-              <a:t>11/2/2016</a:t>
+              <a:t>11/17/2016</a:t>
             </a:fld>
             <a:endParaRPr lang="en-US" dirty="0"/>
           </a:p>
@@ -1852,7 +1575,7 @@
           <a:p>
             <a:fld id="{461E0769-57AC-4935-8715-988FC8288D8B}" type="datetime1">
               <a:rPr lang="en-US" smtClean="0"/>
-              <a:t>11/2/2016</a:t>
+              <a:t>11/17/2016</a:t>
             </a:fld>
             <a:endParaRPr lang="en-US" dirty="0"/>
           </a:p>
@@ -2268,7 +1991,7 @@
           <a:p>
             <a:fld id="{CB4DF6D8-D059-4E6F-9489-47A7683AE661}" type="datetime1">
               <a:rPr lang="en-US" smtClean="0"/>
-              <a:t>11/2/2016</a:t>
+              <a:t>11/17/2016</a:t>
             </a:fld>
             <a:endParaRPr lang="en-US" dirty="0"/>
           </a:p>
@@ -2510,7 +2233,7 @@
           <a:p>
             <a:fld id="{3DF2A073-D756-4989-BBD7-7130788C34CA}" type="datetime1">
               <a:rPr lang="en-US" smtClean="0"/>
-              <a:t>11/2/2016</a:t>
+              <a:t>11/17/2016</a:t>
             </a:fld>
             <a:endParaRPr lang="en-US" dirty="0"/>
           </a:p>
@@ -2746,7 +2469,7 @@
           <a:p>
             <a:fld id="{C7812262-0143-4593-8ABE-7E4B68DA324A}" type="datetime1">
               <a:rPr lang="en-US" smtClean="0"/>
-              <a:t>11/2/2016</a:t>
+              <a:t>11/17/2016</a:t>
             </a:fld>
             <a:endParaRPr lang="en-US" dirty="0"/>
           </a:p>
@@ -2941,7 +2664,7 @@
           <a:p>
             <a:fld id="{9444DF3C-DB17-4177-83A1-1F4CFF0BDA1F}" type="datetime1">
               <a:rPr lang="en-US" smtClean="0"/>
-              <a:t>11/2/2016</a:t>
+              <a:t>11/17/2016</a:t>
             </a:fld>
             <a:endParaRPr lang="en-US" dirty="0"/>
           </a:p>
@@ -3039,7 +2762,7 @@
           <a:p>
             <a:fld id="{F6C8DF98-0850-4199-9763-F5AC2123D534}" type="datetime1">
               <a:rPr lang="en-US" smtClean="0"/>
-              <a:t>11/2/2016</a:t>
+              <a:t>11/17/2016</a:t>
             </a:fld>
             <a:endParaRPr lang="en-US" dirty="0"/>
           </a:p>
@@ -3175,7 +2898,7 @@
           <a:p>
             <a:fld id="{01D547BE-D041-448C-ACAF-73E0E93ABA79}" type="datetime1">
               <a:rPr lang="en-US" smtClean="0"/>
-              <a:t>11/2/2016</a:t>
+              <a:t>11/17/2016</a:t>
             </a:fld>
             <a:endParaRPr lang="en-US" dirty="0"/>
           </a:p>
@@ -3693,7 +3416,7 @@
           <a:p>
             <a:fld id="{578863BF-C007-49B5-9EBC-83335D3595B0}" type="datetime1">
               <a:rPr lang="en-US" smtClean="0"/>
-              <a:t>11/2/2016</a:t>
+              <a:t>11/17/2016</a:t>
             </a:fld>
             <a:endParaRPr lang="en-US" dirty="0"/>
           </a:p>
@@ -3954,7 +3677,7 @@
           <a:p>
             <a:fld id="{3AD18C84-CE91-4C35-A0EF-F805A78F094C}" type="datetime1">
               <a:rPr lang="en-US" smtClean="0"/>
-              <a:t>11/2/2016</a:t>
+              <a:t>11/17/2016</a:t>
             </a:fld>
             <a:endParaRPr lang="en-US" dirty="0"/>
           </a:p>
@@ -4501,48 +4224,75 @@
             <a:spLocks noGrp="1"/>
           </p:cNvSpPr>
           <p:nvPr>
-            <p:ph type="ctrTitle"/>
-          </p:nvPr>
-        </p:nvSpPr>
-        <p:spPr>
-          <a:xfrm>
-            <a:off x="0" y="4038600"/>
-            <a:ext cx="7848600" cy="1828800"/>
+            <p:ph type="title"/>
+          </p:nvPr>
+        </p:nvSpPr>
+        <p:spPr/>
+        <p:txBody>
+          <a:bodyPr/>
+          <a:lstStyle/>
+          <a:p>
+            <a:r>
+              <a:rPr lang="en-US" dirty="0" smtClean="0"/>
+              <a:t>Who participated?</a:t>
+            </a:r>
+            <a:endParaRPr lang="en-US" dirty="0"/>
+          </a:p>
+        </p:txBody>
+      </p:sp>
+      <p:sp>
+        <p:nvSpPr>
+          <p:cNvPr id="3" name="Content Placeholder 2"/>
+          <p:cNvSpPr>
+            <a:spLocks noGrp="1"/>
+          </p:cNvSpPr>
+          <p:nvPr>
+            <p:ph sz="quarter" idx="1"/>
+          </p:nvPr>
+        </p:nvSpPr>
+        <p:spPr>
+          <a:xfrm>
+            <a:off x="1524000" y="3352800"/>
+            <a:ext cx="6169152" cy="1066800"/>
           </a:xfrm>
         </p:spPr>
         <p:txBody>
           <a:bodyPr>
-            <a:normAutofit fontScale="90000"/>
+            <a:normAutofit fontScale="62500" lnSpcReduction="20000"/>
           </a:bodyPr>
           <a:lstStyle/>
           <a:p>
-            <a:r>
-              <a:rPr lang="en-US" dirty="0" smtClean="0"/>
-              <a:t>White Castle Biometric Health Screening Aggregate Summary</a:t>
-            </a:r>
-            <a:endParaRPr lang="en-US" dirty="0"/>
-          </a:p>
-        </p:txBody>
-      </p:sp>
-      <p:sp>
-        <p:nvSpPr>
-          <p:cNvPr id="3" name="Subtitle 2"/>
-          <p:cNvSpPr>
-            <a:spLocks noGrp="1"/>
-          </p:cNvSpPr>
-          <p:nvPr>
-            <p:ph type="subTitle" idx="1"/>
+            <a:pPr marL="0" indent="0">
+              <a:buNone/>
+            </a:pPr>
+            <a:r>
+              <a:t>Blah blah nospace32%nospace blah blah</a:t>
+            </a:r>
+            <a:endParaRPr lang="en-US" sz="4000" dirty="0" smtClean="0"/>
+          </a:p>
+        </p:txBody>
+      </p:sp>
+      <p:sp>
+        <p:nvSpPr>
+          <p:cNvPr id="5" name="Slide Number Placeholder 4"/>
+          <p:cNvSpPr>
+            <a:spLocks noGrp="1"/>
+          </p:cNvSpPr>
+          <p:nvPr>
+            <p:ph type="sldNum" sz="quarter" idx="12"/>
           </p:nvPr>
         </p:nvSpPr>
         <p:spPr/>
         <p:txBody>
-          <a:bodyPr/>
-          <a:lstStyle/>
-          <a:p>
-            <a:r>
-              <a:rPr lang="en-US" dirty="0" smtClean="0"/>
-              <a:t>Compiled by LifeCare Alliance</a:t>
-            </a:r>
+          <a:bodyPr>
+            <a:normAutofit fontScale="85000" lnSpcReduction="20000"/>
+          </a:bodyPr>
+          <a:lstStyle/>
+          <a:p>
+            <a:fld id="{0550DE80-A55D-4FEA-ABCE-0175392B4432}" type="slidenum">
+              <a:rPr lang="en-US" smtClean="0"/>
+              <a:t>1</a:t>
+            </a:fld>
             <a:endParaRPr lang="en-US" dirty="0"/>
           </a:p>
         </p:txBody>
@@ -4550,7 +4300,7 @@
     </p:spTree>
     <p:extLst>
       <p:ext uri="{BB962C8B-B14F-4D97-AF65-F5344CB8AC3E}">
-        <p14:creationId xmlns:p14="http://schemas.microsoft.com/office/powerpoint/2010/main" val="3398785662"/>
+        <p14:creationId xmlns:p14="http://schemas.microsoft.com/office/powerpoint/2010/main" val="580674313"/>
       </p:ext>
     </p:extLst>
   </p:cSld>
@@ -4625,7 +4375,7 @@
         </p:spPr>
         <p:txBody>
           <a:bodyPr>
-            <a:normAutofit/>
+            <a:normAutofit fontScale="85000" lnSpcReduction="10000"/>
           </a:bodyPr>
           <a:lstStyle/>
           <a:p>
@@ -4633,7 +4383,7 @@
               <a:buNone/>
             </a:pPr>
             <a:r>
-              <a:t>WASD</a:t>
+              <a:t>32%</a:t>
             </a:r>
             <a:endParaRPr lang="en-US" sz="4000" dirty="0" smtClean="0"/>
           </a:p>
@@ -4667,816 +4417,7 @@
     </p:spTree>
     <p:extLst>
       <p:ext uri="{BB962C8B-B14F-4D97-AF65-F5344CB8AC3E}">
-        <p14:creationId xmlns:p14="http://schemas.microsoft.com/office/powerpoint/2010/main" val="580674313"/>
-      </p:ext>
-    </p:extLst>
-  </p:cSld>
-  <p:clrMapOvr>
-    <a:masterClrMapping/>
-  </p:clrMapOvr>
-  <p:timing>
-    <p:tnLst>
-      <p:par>
-        <p:cTn id="1" dur="indefinite" restart="never" nodeType="tmRoot"/>
-      </p:par>
-    </p:tnLst>
-  </p:timing>
-</p:sld>
-</file>
-
-<file path=ppt/slides/slide3.xml><?xml version="1.0" encoding="utf-8"?>
-<p:sld xmlns:a="http://schemas.openxmlformats.org/drawingml/2006/main" xmlns:r="http://schemas.openxmlformats.org/officeDocument/2006/relationships" xmlns:p="http://schemas.openxmlformats.org/presentationml/2006/main">
-  <p:cSld>
-    <p:spTree>
-      <p:nvGrpSpPr>
-        <p:cNvPr id="1" name=""/>
-        <p:cNvGrpSpPr/>
-        <p:nvPr/>
-      </p:nvGrpSpPr>
-      <p:grpSpPr>
-        <a:xfrm>
-          <a:off x="0" y="0"/>
-          <a:ext cx="0" cy="0"/>
-          <a:chOff x="0" y="0"/>
-          <a:chExt cx="0" cy="0"/>
-        </a:xfrm>
-      </p:grpSpPr>
-      <p:sp>
-        <p:nvSpPr>
-          <p:cNvPr id="2" name="Title 1"/>
-          <p:cNvSpPr>
-            <a:spLocks noGrp="1"/>
-          </p:cNvSpPr>
-          <p:nvPr>
-            <p:ph type="title"/>
-          </p:nvPr>
-        </p:nvSpPr>
-        <p:spPr/>
-        <p:txBody>
-          <a:bodyPr/>
-          <a:lstStyle/>
-          <a:p>
-            <a:r>
-              <a:rPr lang="en-US" dirty="0" smtClean="0"/>
-              <a:t>Who participated?</a:t>
-            </a:r>
-            <a:endParaRPr lang="en-US" dirty="0"/>
-          </a:p>
-        </p:txBody>
-      </p:sp>
-      <p:sp>
-        <p:nvSpPr>
-          <p:cNvPr id="3" name="Content Placeholder 2"/>
-          <p:cNvSpPr>
-            <a:spLocks noGrp="1"/>
-          </p:cNvSpPr>
-          <p:nvPr>
-            <p:ph sz="quarter" idx="1"/>
-          </p:nvPr>
-        </p:nvSpPr>
-        <p:spPr>
-          <a:xfrm>
-            <a:off x="1371600" y="2590800"/>
-            <a:ext cx="6169152" cy="1066800"/>
-          </a:xfrm>
-        </p:spPr>
-        <p:txBody>
-          <a:bodyPr>
-            <a:normAutofit/>
-          </a:bodyPr>
-          <a:lstStyle/>
-          <a:p>
-            <a:pPr marL="0" indent="0">
-              <a:buNone/>
-            </a:pPr>
-            <a:r>
-              <a:t>WASD</a:t>
-            </a:r>
-            <a:endParaRPr lang="en-US" sz="4000" dirty="0" smtClean="0"/>
-          </a:p>
-        </p:txBody>
-      </p:sp>
-      <p:sp>
-        <p:nvSpPr>
-          <p:cNvPr id="5" name="Slide Number Placeholder 4"/>
-          <p:cNvSpPr>
-            <a:spLocks noGrp="1"/>
-          </p:cNvSpPr>
-          <p:nvPr>
-            <p:ph type="sldNum" sz="quarter" idx="12"/>
-          </p:nvPr>
-        </p:nvSpPr>
-        <p:spPr/>
-        <p:txBody>
-          <a:bodyPr>
-            <a:normAutofit fontScale="85000" lnSpcReduction="20000"/>
-          </a:bodyPr>
-          <a:lstStyle/>
-          <a:p>
-            <a:fld id="{0550DE80-A55D-4FEA-ABCE-0175392B4432}" type="slidenum">
-              <a:rPr lang="en-US" smtClean="0"/>
-              <a:t>3</a:t>
-            </a:fld>
-            <a:endParaRPr lang="en-US" dirty="0"/>
-          </a:p>
-        </p:txBody>
-      </p:sp>
-      <p:sp>
-        <p:nvSpPr>
-          <p:cNvPr id="6" name="Content Placeholder 2"/>
-          <p:cNvSpPr txBox="1">
-            <a:spLocks/>
-          </p:cNvSpPr>
-          <p:nvPr/>
-        </p:nvSpPr>
-        <p:spPr>
-          <a:xfrm>
-            <a:off x="1447800" y="4191000"/>
-            <a:ext cx="6169152" cy="1066800"/>
-          </a:xfrm>
-          <a:prstGeom prst="rect">
-            <a:avLst/>
-          </a:prstGeom>
-        </p:spPr>
-        <p:txBody>
-          <a:bodyPr vert="horz">
-            <a:normAutofit/>
-          </a:bodyPr>
-          <a:lstStyle>
-            <a:lvl1pPr marL="320040" indent="-320040" algn="l" rtl="0" eaLnBrk="1" latinLnBrk="0" hangingPunct="1">
-              <a:spcBef>
-                <a:spcPts val="700"/>
-              </a:spcBef>
-              <a:buClr>
-                <a:schemeClr val="accent2"/>
-              </a:buClr>
-              <a:buSzPct val="60000"/>
-              <a:buFont typeface="Wingdings"/>
-              <a:buChar char=""/>
-              <a:defRPr kumimoji="0" sz="2900" kern="1200">
-                <a:solidFill>
-                  <a:schemeClr val="tx1"/>
-                </a:solidFill>
-                <a:latin typeface="+mn-lt"/>
-                <a:ea typeface="+mn-ea"/>
-                <a:cs typeface="+mn-cs"/>
-              </a:defRPr>
-            </a:lvl1pPr>
-            <a:lvl2pPr marL="640080" indent="-274320" algn="l" rtl="0" eaLnBrk="1" latinLnBrk="0" hangingPunct="1">
-              <a:spcBef>
-                <a:spcPts val="550"/>
-              </a:spcBef>
-              <a:buClr>
-                <a:schemeClr val="accent1"/>
-              </a:buClr>
-              <a:buSzPct val="70000"/>
-              <a:buFont typeface="Wingdings 2"/>
-              <a:buChar char=""/>
-              <a:defRPr kumimoji="0" sz="2600" kern="1200">
-                <a:solidFill>
-                  <a:schemeClr val="tx1"/>
-                </a:solidFill>
-                <a:latin typeface="+mn-lt"/>
-                <a:ea typeface="+mn-ea"/>
-                <a:cs typeface="+mn-cs"/>
-              </a:defRPr>
-            </a:lvl2pPr>
-            <a:lvl3pPr marL="914400" indent="-228600" algn="l" rtl="0" eaLnBrk="1" latinLnBrk="0" hangingPunct="1">
-              <a:spcBef>
-                <a:spcPts val="500"/>
-              </a:spcBef>
-              <a:buClr>
-                <a:schemeClr val="accent2"/>
-              </a:buClr>
-              <a:buSzPct val="75000"/>
-              <a:buFont typeface="Wingdings"/>
-              <a:buChar char=""/>
-              <a:defRPr kumimoji="0" sz="2300" kern="1200">
-                <a:solidFill>
-                  <a:schemeClr val="tx1"/>
-                </a:solidFill>
-                <a:latin typeface="+mn-lt"/>
-                <a:ea typeface="+mn-ea"/>
-                <a:cs typeface="+mn-cs"/>
-              </a:defRPr>
-            </a:lvl3pPr>
-            <a:lvl4pPr marL="1371600" indent="-228600" algn="l" rtl="0" eaLnBrk="1" latinLnBrk="0" hangingPunct="1">
-              <a:spcBef>
-                <a:spcPts val="400"/>
-              </a:spcBef>
-              <a:buClr>
-                <a:schemeClr val="accent3"/>
-              </a:buClr>
-              <a:buSzPct val="75000"/>
-              <a:buFont typeface="Wingdings"/>
-              <a:buChar char=""/>
-              <a:defRPr kumimoji="0" sz="2000" kern="1200">
-                <a:solidFill>
-                  <a:schemeClr val="tx1"/>
-                </a:solidFill>
-                <a:latin typeface="+mn-lt"/>
-                <a:ea typeface="+mn-ea"/>
-                <a:cs typeface="+mn-cs"/>
-              </a:defRPr>
-            </a:lvl4pPr>
-            <a:lvl5pPr marL="1828800" indent="-228600" algn="l" rtl="0" eaLnBrk="1" latinLnBrk="0" hangingPunct="1">
-              <a:spcBef>
-                <a:spcPts val="400"/>
-              </a:spcBef>
-              <a:buClr>
-                <a:schemeClr val="accent4"/>
-              </a:buClr>
-              <a:buSzPct val="65000"/>
-              <a:buFont typeface="Wingdings"/>
-              <a:buChar char=""/>
-              <a:defRPr kumimoji="0" sz="2000" kern="1200">
-                <a:solidFill>
-                  <a:schemeClr val="tx1"/>
-                </a:solidFill>
-                <a:latin typeface="+mn-lt"/>
-                <a:ea typeface="+mn-ea"/>
-                <a:cs typeface="+mn-cs"/>
-              </a:defRPr>
-            </a:lvl5pPr>
-            <a:lvl6pPr marL="2103120" indent="-228600" algn="l" rtl="0" eaLnBrk="1" latinLnBrk="0" hangingPunct="1">
-              <a:spcBef>
-                <a:spcPct val="20000"/>
-              </a:spcBef>
-              <a:buClr>
-                <a:schemeClr val="accent1"/>
-              </a:buClr>
-              <a:buFont typeface="Wingdings"/>
-              <a:buChar char="§"/>
-              <a:defRPr kumimoji="0" sz="1800" kern="1200" baseline="0">
-                <a:solidFill>
-                  <a:schemeClr val="tx1"/>
-                </a:solidFill>
-                <a:latin typeface="+mn-lt"/>
-                <a:ea typeface="+mn-ea"/>
-                <a:cs typeface="+mn-cs"/>
-              </a:defRPr>
-            </a:lvl6pPr>
-            <a:lvl7pPr marL="2377440" indent="-228600" algn="l" rtl="0" eaLnBrk="1" latinLnBrk="0" hangingPunct="1">
-              <a:spcBef>
-                <a:spcPct val="20000"/>
-              </a:spcBef>
-              <a:buClr>
-                <a:schemeClr val="accent2"/>
-              </a:buClr>
-              <a:buFont typeface="Wingdings"/>
-              <a:buChar char="§"/>
-              <a:defRPr kumimoji="0" sz="1800" kern="1200" baseline="0">
-                <a:solidFill>
-                  <a:schemeClr val="tx1"/>
-                </a:solidFill>
-                <a:latin typeface="+mn-lt"/>
-                <a:ea typeface="+mn-ea"/>
-                <a:cs typeface="+mn-cs"/>
-              </a:defRPr>
-            </a:lvl7pPr>
-            <a:lvl8pPr marL="2651760" indent="-228600" algn="l" rtl="0" eaLnBrk="1" latinLnBrk="0" hangingPunct="1">
-              <a:spcBef>
-                <a:spcPct val="20000"/>
-              </a:spcBef>
-              <a:buClr>
-                <a:schemeClr val="accent3"/>
-              </a:buClr>
-              <a:buFont typeface="Wingdings"/>
-              <a:buChar char="§"/>
-              <a:defRPr kumimoji="0" sz="1800" kern="1200" baseline="0">
-                <a:solidFill>
-                  <a:schemeClr val="tx1"/>
-                </a:solidFill>
-                <a:latin typeface="+mn-lt"/>
-                <a:ea typeface="+mn-ea"/>
-                <a:cs typeface="+mn-cs"/>
-              </a:defRPr>
-            </a:lvl8pPr>
-            <a:lvl9pPr marL="2926080" indent="-228600" algn="l" rtl="0" eaLnBrk="1" latinLnBrk="0" hangingPunct="1">
-              <a:spcBef>
-                <a:spcPct val="20000"/>
-              </a:spcBef>
-              <a:buClr>
-                <a:schemeClr val="accent4"/>
-              </a:buClr>
-              <a:buFont typeface="Wingdings"/>
-              <a:buChar char="§"/>
-              <a:defRPr kumimoji="0" sz="1800" kern="1200" baseline="0">
-                <a:solidFill>
-                  <a:schemeClr val="tx1"/>
-                </a:solidFill>
-                <a:latin typeface="+mn-lt"/>
-                <a:ea typeface="+mn-ea"/>
-                <a:cs typeface="+mn-cs"/>
-              </a:defRPr>
-            </a:lvl9pPr>
-          </a:lstStyle>
-          <a:p>
-            <a:r>
-              <a:t>ASDF</a:t>
-            </a:r>
-            <a:endParaRPr lang="en-US" sz="4000" dirty="0" smtClean="0"/>
-          </a:p>
-        </p:txBody>
-      </p:sp>
-    </p:spTree>
-    <p:extLst>
-      <p:ext uri="{BB962C8B-B14F-4D97-AF65-F5344CB8AC3E}">
-        <p14:creationId xmlns:p14="http://schemas.microsoft.com/office/powerpoint/2010/main" val="2841723979"/>
-      </p:ext>
-    </p:extLst>
-  </p:cSld>
-  <p:clrMapOvr>
-    <a:masterClrMapping/>
-  </p:clrMapOvr>
-  <p:timing>
-    <p:tnLst>
-      <p:par>
-        <p:cTn id="1" dur="indefinite" restart="never" nodeType="tmRoot"/>
-      </p:par>
-    </p:tnLst>
-  </p:timing>
-</p:sld>
-</file>
-
-<file path=ppt/slides/slide4.xml><?xml version="1.0" encoding="utf-8"?>
-<p:sld xmlns:a="http://schemas.openxmlformats.org/drawingml/2006/main" xmlns:r="http://schemas.openxmlformats.org/officeDocument/2006/relationships" xmlns:p="http://schemas.openxmlformats.org/presentationml/2006/main">
-  <p:cSld>
-    <p:spTree>
-      <p:nvGrpSpPr>
-        <p:cNvPr id="1" name=""/>
-        <p:cNvGrpSpPr/>
-        <p:nvPr/>
-      </p:nvGrpSpPr>
-      <p:grpSpPr>
-        <a:xfrm>
-          <a:off x="0" y="0"/>
-          <a:ext cx="0" cy="0"/>
-          <a:chOff x="0" y="0"/>
-          <a:chExt cx="0" cy="0"/>
-        </a:xfrm>
-      </p:grpSpPr>
-      <p:sp>
-        <p:nvSpPr>
-          <p:cNvPr id="2" name="Title 1"/>
-          <p:cNvSpPr>
-            <a:spLocks noGrp="1"/>
-          </p:cNvSpPr>
-          <p:nvPr>
-            <p:ph type="title"/>
-          </p:nvPr>
-        </p:nvSpPr>
-        <p:spPr/>
-        <p:txBody>
-          <a:bodyPr/>
-          <a:lstStyle/>
-          <a:p>
-            <a:r>
-              <a:rPr lang="en-US" dirty="0" smtClean="0"/>
-              <a:t>Who participated?</a:t>
-            </a:r>
-            <a:endParaRPr lang="en-US" dirty="0"/>
-          </a:p>
-        </p:txBody>
-      </p:sp>
-      <p:sp>
-        <p:nvSpPr>
-          <p:cNvPr id="3" name="Content Placeholder 2"/>
-          <p:cNvSpPr>
-            <a:spLocks noGrp="1"/>
-          </p:cNvSpPr>
-          <p:nvPr>
-            <p:ph sz="quarter" idx="1"/>
-          </p:nvPr>
-        </p:nvSpPr>
-        <p:spPr>
-          <a:xfrm>
-            <a:off x="381000" y="1600200"/>
-            <a:ext cx="8153400" cy="3886198"/>
-          </a:xfrm>
-        </p:spPr>
-        <p:txBody>
-          <a:bodyPr>
-            <a:normAutofit/>
-          </a:bodyPr>
-          <a:lstStyle/>
-          <a:p>
-            <a:pPr marL="0" indent="0">
-              <a:buNone/>
-            </a:pPr>
-            <a:endParaRPr lang="en-US" sz="4000" dirty="0" smtClean="0"/>
-          </a:p>
-        </p:txBody>
-      </p:sp>
-      <p:sp>
-        <p:nvSpPr>
-          <p:cNvPr id="5" name="Slide Number Placeholder 4"/>
-          <p:cNvSpPr>
-            <a:spLocks noGrp="1"/>
-          </p:cNvSpPr>
-          <p:nvPr>
-            <p:ph type="sldNum" sz="quarter" idx="12"/>
-          </p:nvPr>
-        </p:nvSpPr>
-        <p:spPr/>
-        <p:txBody>
-          <a:bodyPr>
-            <a:normAutofit fontScale="85000" lnSpcReduction="20000"/>
-          </a:bodyPr>
-          <a:lstStyle/>
-          <a:p>
-            <a:fld id="{0550DE80-A55D-4FEA-ABCE-0175392B4432}" type="slidenum">
-              <a:rPr lang="en-US" smtClean="0"/>
-              <a:t>4</a:t>
-            </a:fld>
-            <a:endParaRPr lang="en-US" dirty="0"/>
-          </a:p>
-        </p:txBody>
-      </p:sp>
-      <p:graphicFrame>
-        <p:nvGraphicFramePr>
-          <p:cNvPr id="4" name="Chart 3"/>
-          <p:cNvGraphicFramePr>
-            <a:graphicFrameLocks noGrp="1"/>
-          </p:cNvGraphicFramePr>
-          <p:nvPr/>
-        </p:nvGraphicFramePr>
-        <p:xfrm>
-          <a:off x="1828800" y="1828800"/>
-          <a:ext cx="2743200" cy="3886198"/>
-        </p:xfrm>
-        <a:graphic>
-          <a:graphicData uri="http://schemas.openxmlformats.org/drawingml/2006/chart">
-            <c:chart xmlns:c="http://schemas.openxmlformats.org/drawingml/2006/chart" r:id="rId2"/>
-          </a:graphicData>
-        </a:graphic>
-      </p:graphicFrame>
-    </p:spTree>
-    <p:extLst>
-      <p:ext uri="{BB962C8B-B14F-4D97-AF65-F5344CB8AC3E}">
-        <p14:creationId xmlns:p14="http://schemas.microsoft.com/office/powerpoint/2010/main" val="1597361193"/>
-      </p:ext>
-    </p:extLst>
-  </p:cSld>
-  <p:clrMapOvr>
-    <a:masterClrMapping/>
-  </p:clrMapOvr>
-  <p:timing>
-    <p:tnLst>
-      <p:par>
-        <p:cTn id="1" dur="indefinite" restart="never" nodeType="tmRoot"/>
-      </p:par>
-    </p:tnLst>
-  </p:timing>
-</p:sld>
-</file>
-
-<file path=ppt/slides/slide5.xml><?xml version="1.0" encoding="utf-8"?>
-<p:sld xmlns:a="http://schemas.openxmlformats.org/drawingml/2006/main" xmlns:r="http://schemas.openxmlformats.org/officeDocument/2006/relationships" xmlns:p="http://schemas.openxmlformats.org/presentationml/2006/main">
-  <p:cSld>
-    <p:spTree>
-      <p:nvGrpSpPr>
-        <p:cNvPr id="1" name=""/>
-        <p:cNvGrpSpPr/>
-        <p:nvPr/>
-      </p:nvGrpSpPr>
-      <p:grpSpPr>
-        <a:xfrm>
-          <a:off x="0" y="0"/>
-          <a:ext cx="0" cy="0"/>
-          <a:chOff x="0" y="0"/>
-          <a:chExt cx="0" cy="0"/>
-        </a:xfrm>
-      </p:grpSpPr>
-      <p:sp>
-        <p:nvSpPr>
-          <p:cNvPr id="2" name="Title 1"/>
-          <p:cNvSpPr>
-            <a:spLocks noGrp="1"/>
-          </p:cNvSpPr>
-          <p:nvPr>
-            <p:ph type="title"/>
-          </p:nvPr>
-        </p:nvSpPr>
-        <p:spPr/>
-        <p:txBody>
-          <a:bodyPr/>
-          <a:lstStyle/>
-          <a:p>
-            <a:r>
-              <a:rPr lang="en-US" dirty="0" smtClean="0"/>
-              <a:t>Who participated?</a:t>
-            </a:r>
-            <a:endParaRPr lang="en-US" dirty="0"/>
-          </a:p>
-        </p:txBody>
-      </p:sp>
-      <p:sp>
-        <p:nvSpPr>
-          <p:cNvPr id="3" name="Content Placeholder 2"/>
-          <p:cNvSpPr>
-            <a:spLocks noGrp="1"/>
-          </p:cNvSpPr>
-          <p:nvPr>
-            <p:ph sz="quarter" idx="1"/>
-          </p:nvPr>
-        </p:nvSpPr>
-        <p:spPr>
-          <a:xfrm>
-            <a:off x="612648" y="1600200"/>
-            <a:ext cx="8153400" cy="3886198"/>
-          </a:xfrm>
-        </p:spPr>
-        <p:txBody>
-          <a:bodyPr>
-            <a:normAutofit/>
-          </a:bodyPr>
-          <a:lstStyle/>
-          <a:p>
-            <a:pPr marL="0" indent="0">
-              <a:buNone/>
-            </a:pPr>
-            <a:endParaRPr lang="en-US" sz="4000" dirty="0" smtClean="0"/>
-          </a:p>
-        </p:txBody>
-      </p:sp>
-      <p:sp>
-        <p:nvSpPr>
-          <p:cNvPr id="5" name="Slide Number Placeholder 4"/>
-          <p:cNvSpPr>
-            <a:spLocks noGrp="1"/>
-          </p:cNvSpPr>
-          <p:nvPr>
-            <p:ph type="sldNum" sz="quarter" idx="12"/>
-          </p:nvPr>
-        </p:nvSpPr>
-        <p:spPr/>
-        <p:txBody>
-          <a:bodyPr>
-            <a:normAutofit fontScale="85000" lnSpcReduction="20000"/>
-          </a:bodyPr>
-          <a:lstStyle/>
-          <a:p>
-            <a:fld id="{0550DE80-A55D-4FEA-ABCE-0175392B4432}" type="slidenum">
-              <a:rPr lang="en-US" smtClean="0"/>
-              <a:t>5</a:t>
-            </a:fld>
-            <a:endParaRPr lang="en-US" dirty="0"/>
-          </a:p>
-        </p:txBody>
-      </p:sp>
-      <p:graphicFrame>
-        <p:nvGraphicFramePr>
-          <p:cNvPr id="4" name="Chart 3"/>
-          <p:cNvGraphicFramePr>
-            <a:graphicFrameLocks noGrp="1"/>
-          </p:cNvGraphicFramePr>
-          <p:nvPr/>
-        </p:nvGraphicFramePr>
-        <p:xfrm>
-          <a:off x="1828800" y="1828800"/>
-          <a:ext cx="2743200" cy="2743200"/>
-        </p:xfrm>
-        <a:graphic>
-          <a:graphicData uri="http://schemas.openxmlformats.org/drawingml/2006/chart">
-            <c:chart xmlns:c="http://schemas.openxmlformats.org/drawingml/2006/chart" r:id="rId2"/>
-          </a:graphicData>
-        </a:graphic>
-      </p:graphicFrame>
-    </p:spTree>
-    <p:extLst>
-      <p:ext uri="{BB962C8B-B14F-4D97-AF65-F5344CB8AC3E}">
-        <p14:creationId xmlns:p14="http://schemas.microsoft.com/office/powerpoint/2010/main" val="3209572625"/>
-      </p:ext>
-    </p:extLst>
-  </p:cSld>
-  <p:clrMapOvr>
-    <a:masterClrMapping/>
-  </p:clrMapOvr>
-  <p:timing>
-    <p:tnLst>
-      <p:par>
-        <p:cTn id="1" dur="indefinite" restart="never" nodeType="tmRoot"/>
-      </p:par>
-    </p:tnLst>
-  </p:timing>
-</p:sld>
-</file>
-
-<file path=ppt/slides/slide6.xml><?xml version="1.0" encoding="utf-8"?>
-<p:sld xmlns:a="http://schemas.openxmlformats.org/drawingml/2006/main" xmlns:r="http://schemas.openxmlformats.org/officeDocument/2006/relationships" xmlns:p="http://schemas.openxmlformats.org/presentationml/2006/main">
-  <p:cSld>
-    <p:spTree>
-      <p:nvGrpSpPr>
-        <p:cNvPr id="1" name=""/>
-        <p:cNvGrpSpPr/>
-        <p:nvPr/>
-      </p:nvGrpSpPr>
-      <p:grpSpPr>
-        <a:xfrm>
-          <a:off x="0" y="0"/>
-          <a:ext cx="0" cy="0"/>
-          <a:chOff x="0" y="0"/>
-          <a:chExt cx="0" cy="0"/>
-        </a:xfrm>
-      </p:grpSpPr>
-      <p:sp>
-        <p:nvSpPr>
-          <p:cNvPr id="2" name="Title 1"/>
-          <p:cNvSpPr>
-            <a:spLocks noGrp="1"/>
-          </p:cNvSpPr>
-          <p:nvPr>
-            <p:ph type="title"/>
-          </p:nvPr>
-        </p:nvSpPr>
-        <p:spPr/>
-        <p:txBody>
-          <a:bodyPr/>
-          <a:lstStyle/>
-          <a:p>
-            <a:r>
-              <a:rPr lang="en-US" dirty="0" smtClean="0"/>
-              <a:t>Resources</a:t>
-            </a:r>
-            <a:endParaRPr lang="en-US" dirty="0"/>
-          </a:p>
-        </p:txBody>
-      </p:sp>
-      <p:sp>
-        <p:nvSpPr>
-          <p:cNvPr id="3" name="Content Placeholder 2"/>
-          <p:cNvSpPr>
-            <a:spLocks noGrp="1"/>
-          </p:cNvSpPr>
-          <p:nvPr>
-            <p:ph sz="quarter" idx="1"/>
-          </p:nvPr>
-        </p:nvSpPr>
-        <p:spPr>
-          <a:xfrm>
-            <a:off x="612648" y="1600200"/>
-            <a:ext cx="8150352" cy="4800600"/>
-          </a:xfrm>
-        </p:spPr>
-        <p:txBody>
-          <a:bodyPr>
-            <a:normAutofit fontScale="77500" lnSpcReduction="20000"/>
-          </a:bodyPr>
-          <a:lstStyle/>
-          <a:p>
-            <a:r>
-              <a:rPr lang="en-US" sz="3100" dirty="0" smtClean="0"/>
-              <a:t>Managing </a:t>
-            </a:r>
-            <a:r>
-              <a:rPr lang="en-US" sz="3100" dirty="0"/>
-              <a:t>Overweight and Obesity in Adults: Systematic Evidence </a:t>
-            </a:r>
-            <a:r>
-              <a:rPr lang="en-US" sz="3100" dirty="0" smtClean="0"/>
-              <a:t>Review from </a:t>
-            </a:r>
-            <a:r>
-              <a:rPr lang="en-US" sz="3100" dirty="0"/>
-              <a:t>the Obesity Expert Panel. </a:t>
-            </a:r>
-            <a:r>
-              <a:rPr lang="en-US" sz="3100" u="sng" dirty="0" smtClean="0">
-                <a:hlinkClick r:id="rId3" tooltip="Link to External Web Site"/>
-              </a:rPr>
-              <a:t>www.nhlbi.nih.gov/sites/www.nhlbi.nih.gov/files/obesity-evidence-review.pdf[PDF </a:t>
-            </a:r>
-            <a:r>
-              <a:rPr lang="en-US" sz="3100" u="sng" dirty="0">
-                <a:hlinkClick r:id="rId3" tooltip="Link to External Web Site"/>
-              </a:rPr>
-              <a:t>- 93KB]</a:t>
-            </a:r>
-            <a:endParaRPr lang="en-US" sz="3100" dirty="0"/>
-          </a:p>
-          <a:p>
-            <a:r>
-              <a:rPr lang="en-US" sz="3100" dirty="0" smtClean="0"/>
-              <a:t>Clinical </a:t>
-            </a:r>
-            <a:r>
-              <a:rPr lang="en-US" sz="3100" dirty="0"/>
-              <a:t>Guidelines on the Identification, Evaluation, and Treatment of Overweight and Obesity in </a:t>
-            </a:r>
-            <a:r>
-              <a:rPr lang="en-US" sz="3100" dirty="0" smtClean="0"/>
-              <a:t>Adults</a:t>
-            </a:r>
-            <a:r>
-              <a:rPr lang="en-US" sz="3100" u="sng" dirty="0" smtClean="0">
-                <a:hlinkClick r:id="rId4" tooltip="Link to External Web Site"/>
-              </a:rPr>
-              <a:t> www.nhlbi.nih.gov/files/docs/guidelines/ob_gdlns.pdf[PDF </a:t>
-            </a:r>
-            <a:r>
-              <a:rPr lang="en-US" sz="3100" u="sng" dirty="0">
-                <a:hlinkClick r:id="rId4" tooltip="Link to External Web Site"/>
-              </a:rPr>
-              <a:t>- 2MB]</a:t>
-            </a:r>
-            <a:endParaRPr lang="en-US" sz="3100" dirty="0"/>
-          </a:p>
-          <a:p>
-            <a:r>
-              <a:rPr lang="en-US" sz="3100" dirty="0" smtClean="0"/>
-              <a:t>U.S</a:t>
-            </a:r>
-            <a:r>
-              <a:rPr lang="en-US" sz="3100" dirty="0"/>
-              <a:t>. Department of Health and Human </a:t>
-            </a:r>
-            <a:r>
-              <a:rPr lang="en-US" sz="3100" dirty="0" smtClean="0"/>
-              <a:t>Services, Office </a:t>
-            </a:r>
-            <a:r>
-              <a:rPr lang="en-US" sz="3100" dirty="0"/>
-              <a:t>of Disease Prevention and Health </a:t>
-            </a:r>
-            <a:r>
-              <a:rPr lang="en-US" sz="3100" dirty="0" smtClean="0"/>
-              <a:t>Promotion, </a:t>
-            </a:r>
-            <a:r>
-              <a:rPr lang="en-US" sz="3100" i="1" dirty="0"/>
-              <a:t>2008 Physical Activity Guidelines for </a:t>
-            </a:r>
-            <a:r>
-              <a:rPr lang="en-US" sz="3100" i="1" dirty="0" smtClean="0"/>
-              <a:t>Americans</a:t>
-            </a:r>
-          </a:p>
-          <a:p>
-            <a:r>
-              <a:rPr lang="en-US" sz="3100" dirty="0" smtClean="0"/>
-              <a:t>My Plate </a:t>
-            </a:r>
-            <a:r>
-              <a:rPr lang="en-US" sz="3100" dirty="0" smtClean="0">
-                <a:hlinkClick r:id="rId5"/>
-              </a:rPr>
-              <a:t>www.choosemyplate.gov</a:t>
-            </a:r>
-            <a:endParaRPr lang="en-US" sz="3100" dirty="0" smtClean="0"/>
-          </a:p>
-          <a:p>
-            <a:r>
-              <a:rPr lang="en-US" sz="3100" dirty="0" smtClean="0"/>
-              <a:t>Center for Disease Control </a:t>
-            </a:r>
-          </a:p>
-          <a:p>
-            <a:r>
-              <a:rPr lang="en-US" sz="3100" dirty="0" smtClean="0"/>
-              <a:t>Harvard School of Public Health</a:t>
-            </a:r>
-          </a:p>
-          <a:p>
-            <a:endParaRPr lang="en-US" dirty="0"/>
-          </a:p>
-          <a:p>
-            <a:endParaRPr lang="en-US" dirty="0" smtClean="0"/>
-          </a:p>
-          <a:p>
-            <a:endParaRPr lang="en-US" dirty="0"/>
-          </a:p>
-        </p:txBody>
-      </p:sp>
-      <p:sp>
-        <p:nvSpPr>
-          <p:cNvPr id="5" name="Slide Number Placeholder 4"/>
-          <p:cNvSpPr>
-            <a:spLocks noGrp="1"/>
-          </p:cNvSpPr>
-          <p:nvPr>
-            <p:ph type="sldNum" sz="quarter" idx="12"/>
-          </p:nvPr>
-        </p:nvSpPr>
-        <p:spPr/>
-        <p:txBody>
-          <a:bodyPr>
-            <a:normAutofit fontScale="85000" lnSpcReduction="20000"/>
-          </a:bodyPr>
-          <a:lstStyle/>
-          <a:p>
-            <a:fld id="{0550DE80-A55D-4FEA-ABCE-0175392B4432}" type="slidenum">
-              <a:rPr lang="en-US" smtClean="0"/>
-              <a:t>6</a:t>
-            </a:fld>
-            <a:endParaRPr lang="en-US" dirty="0"/>
-          </a:p>
-        </p:txBody>
-      </p:sp>
-    </p:spTree>
-    <p:extLst>
-      <p:ext uri="{BB962C8B-B14F-4D97-AF65-F5344CB8AC3E}">
-        <p14:creationId xmlns:p14="http://schemas.microsoft.com/office/powerpoint/2010/main" val="20209268"/>
+        <p14:creationId xmlns:p14="http://schemas.microsoft.com/office/powerpoint/2010/main" val="3648241844"/>
       </p:ext>
     </p:extLst>
   </p:cSld>

</xml_diff>

<commit_message>
fixed being able to read from tables
</commit_message>
<xml_diff>
--- a/exampleOutput.pptx
+++ b/exampleOutput.pptx
@@ -5,19 +5,13 @@
     <p:sldMasterId id="2147483996" r:id="rId1"/>
   </p:sldMasterIdLst>
   <p:notesMasterIdLst>
-    <p:notesMasterId r:id="rId9"/>
+    <p:notesMasterId r:id="rId3"/>
   </p:notesMasterIdLst>
   <p:handoutMasterIdLst>
-    <p:handoutMasterId r:id="rId10"/>
+    <p:handoutMasterId r:id="rId4"/>
   </p:handoutMasterIdLst>
   <p:sldIdLst>
-    <p:sldId id="256" r:id="rId2"/>
-    <p:sldId id="276" r:id="rId3"/>
-    <p:sldId id="259" r:id="rId4"/>
-    <p:sldId id="274" r:id="rId5"/>
-    <p:sldId id="273" r:id="rId6"/>
-    <p:sldId id="275" r:id="rId7"/>
-    <p:sldId id="258" r:id="rId8"/>
+    <p:sldId id="259" r:id="rId2"/>
   </p:sldIdLst>
   <p:sldSz cx="9144000" cy="6858000" type="screen4x3"/>
   <p:notesSz cx="9296400" cy="7010400"/>
@@ -135,244 +129,6 @@
 </p:presentation>
 </file>
 
-<file path=ppt/charts/chart1.xml><?xml version="1.0" encoding="utf-8"?>
-<c:chartSpace xmlns:c="http://schemas.openxmlformats.org/drawingml/2006/chart" xmlns:a="http://schemas.openxmlformats.org/drawingml/2006/main" xmlns:r="http://schemas.openxmlformats.org/officeDocument/2006/relationships">
-  <c:chart>
-    <c:plotArea>
-      <c:lineChart>
-        <c:grouping val="standard"/>
-        <c:marker val="1"/>
-        <c:axId val="2118791784"/>
-        <c:axId val="2140495176"/>
-      </c:lineChart>
-      <c:catAx>
-        <c:axId val="2118791784"/>
-        <c:scaling/>
-        <c:delete val="0"/>
-        <c:axPos val="b"/>
-        <c:majorTickMark val="out"/>
-        <c:minorTickMark val="none"/>
-        <c:tickLblPos val="nextTo"/>
-        <c:crossAx val="2140495176"/>
-        <c:crosses val="autoZero"/>
-        <c:lblAlgn val="ctr"/>
-        <c:lblOffset val="100"/>
-        <c:noMultiLvlLbl val="0"/>
-      </c:catAx>
-      <c:valAx>
-        <c:axId val="2140495176"/>
-        <c:scaling/>
-        <c:delete val="0"/>
-        <c:axPos val="l"/>
-        <c:majorGridlines/>
-        <c:majorTickMark val="out"/>
-        <c:minorTickMark val="none"/>
-        <c:tickLblPos val="nextTo"/>
-        <c:crossAx val="2118791784"/>
-        <c:crosses val="autoZero"/>
-      </c:valAx>
-    </c:plotArea>
-    <c:legend>
-      <c:overlay val="0"/>
-    </c:legend>
-  </c:chart>
-  <c:txPr>
-    <a:bodyPr/>
-    <a:lstStyle/>
-    <a:p>
-      <a:pPr>
-        <a:defRPr sz="1800"/>
-      </a:pPr>
-      <a:endParaRPr lang="en-US"/>
-    </a:p>
-  </c:txPr>
-  <c:externalData r:id="rId1">
-    <c:autoUpdate val="0"/>
-  </c:externalData>
-</c:chartSpace>
-</file>
-
-<file path=ppt/charts/chart2.xml><?xml version="1.0" encoding="utf-8"?>
-<c:chartSpace xmlns:c="http://schemas.openxmlformats.org/drawingml/2006/chart" xmlns:a="http://schemas.openxmlformats.org/drawingml/2006/main" xmlns:r="http://schemas.openxmlformats.org/officeDocument/2006/relationships">
-  <c:chart>
-    <c:plotArea>
-      <c:pieChart>
-        <c:varyColors val="1"/>
-        <c:ser>
-          <c:idx val="0"/>
-          <c:order val="0"/>
-          <c:tx>
-            <c:strRef>
-              <c:f>Sheet1!$B$1</c:f>
-              <c:strCache>
-                <c:ptCount val="1"/>
-                <c:pt idx="0">
-                  <c:v>Series 1</c:v>
-                </c:pt>
-              </c:strCache>
-            </c:strRef>
-          </c:tx>
-          <c:cat>
-            <c:strRef>
-              <c:f>Sheet1!$A$2:$A$3</c:f>
-              <c:strCache>
-                <c:ptCount val="2"/>
-                <c:pt idx="0">
-                  <c:v>male</c:v>
-                </c:pt>
-                <c:pt idx="1">
-                  <c:v>female</c:v>
-                </c:pt>
-              </c:strCache>
-            </c:strRef>
-          </c:cat>
-          <c:val>
-            <c:numRef>
-              <c:f>Sheet1!$B$2:$B$3</c:f>
-              <c:numCache>
-                <c:formatCode>General</c:formatCode>
-                <c:ptCount val="2"/>
-                <c:pt idx="0">
-                  <c:v>16</c:v>
-                </c:pt>
-                <c:pt idx="1">
-                  <c:v>32</c:v>
-                </c:pt>
-              </c:numCache>
-            </c:numRef>
-          </c:val>
-        </c:ser>
-        <c:dLbls>
-          <c:numFmt formatCode="0%" sourceLinked="0"/>
-          <c:dLblPos val="outEnd"/>
-          <c:showLegendKey val="0"/>
-          <c:showVal val="1"/>
-          <c:showCatName val="0"/>
-          <c:showSerName val="0"/>
-          <c:showPercent val="0"/>
-          <c:showBubbleSize val="0"/>
-        </c:dLbls>
-      </c:pieChart>
-    </c:plotArea>
-    <c:legend>
-      <c:legendPos val="b"/>
-      <c:overlay val="0"/>
-    </c:legend>
-  </c:chart>
-  <c:txPr>
-    <a:bodyPr/>
-    <a:lstStyle/>
-    <a:p>
-      <a:pPr>
-        <a:defRPr sz="1800"/>
-      </a:pPr>
-      <a:endParaRPr lang="en-US"/>
-    </a:p>
-  </c:txPr>
-  <c:externalData r:id="rId1">
-    <c:autoUpdate val="0"/>
-  </c:externalData>
-</c:chartSpace>
-</file>
-
-<file path=ppt/charts/chart3.xml><?xml version="1.0" encoding="utf-8"?>
-<c:chartSpace xmlns:c="http://schemas.openxmlformats.org/drawingml/2006/chart" xmlns:a="http://schemas.openxmlformats.org/drawingml/2006/main" xmlns:r="http://schemas.openxmlformats.org/officeDocument/2006/relationships">
-  <c:chart>
-    <c:plotArea>
-      <c:barChart>
-        <c:barDir val="col"/>
-        <c:grouping val="clustered"/>
-        <c:ser>
-          <c:idx val="0"/>
-          <c:order val="0"/>
-          <c:tx>
-            <c:strRef>
-              <c:f>Sheet1!$B$1</c:f>
-              <c:strCache>
-                <c:ptCount val="1"/>
-                <c:pt idx="0">
-                  <c:v>Series 1</c:v>
-                </c:pt>
-              </c:strCache>
-            </c:strRef>
-          </c:tx>
-          <c:cat>
-            <c:strRef>
-              <c:f>Sheet1!$A$2:$A$3</c:f>
-              <c:strCache>
-                <c:ptCount val="2"/>
-                <c:pt idx="0">
-                  <c:v>Less than Goal</c:v>
-                </c:pt>
-                <c:pt idx="1">
-                  <c:v>Goal</c:v>
-                </c:pt>
-              </c:strCache>
-            </c:strRef>
-          </c:cat>
-          <c:val>
-            <c:numRef>
-              <c:f>Sheet1!$B$2:$B$3</c:f>
-              <c:numCache>
-                <c:formatCode>General</c:formatCode>
-                <c:ptCount val="2"/>
-                <c:pt idx="0">
-                  <c:v>34</c:v>
-                </c:pt>
-                <c:pt idx="1">
-                  <c:v>14</c:v>
-                </c:pt>
-              </c:numCache>
-            </c:numRef>
-          </c:val>
-        </c:ser>
-        <c:axId val="-2068027336"/>
-        <c:axId val="-2113994440"/>
-      </c:barChart>
-      <c:catAx>
-        <c:axId val="-2068027336"/>
-        <c:scaling/>
-        <c:delete val="0"/>
-        <c:axPos val="b"/>
-        <c:majorTickMark val="out"/>
-        <c:minorTickMark val="none"/>
-        <c:tickLblPos val="nextTo"/>
-        <c:crossAx val="-2113994440"/>
-        <c:crosses val="autoZero"/>
-        <c:lblAlgn val="ctr"/>
-        <c:lblOffset val="100"/>
-        <c:noMultiLvlLbl val="0"/>
-      </c:catAx>
-      <c:valAx>
-        <c:axId val="-2113994440"/>
-        <c:scaling/>
-        <c:delete val="0"/>
-        <c:axPos val="l"/>
-        <c:majorGridlines/>
-        <c:majorTickMark val="out"/>
-        <c:minorTickMark val="none"/>
-        <c:tickLblPos val="nextTo"/>
-        <c:crossAx val="-2068027336"/>
-        <c:crosses val="autoZero"/>
-      </c:valAx>
-    </c:plotArea>
-  </c:chart>
-  <c:txPr>
-    <a:bodyPr/>
-    <a:lstStyle/>
-    <a:p>
-      <a:pPr>
-        <a:defRPr sz="1800"/>
-      </a:pPr>
-      <a:endParaRPr lang="en-US"/>
-    </a:p>
-  </c:txPr>
-  <c:externalData r:id="rId1">
-    <c:autoUpdate val="0"/>
-  </c:externalData>
-</c:chartSpace>
-</file>
-
 <file path=ppt/handoutMasters/handoutMaster1.xml><?xml version="1.0" encoding="utf-8"?>
 <p:handoutMaster xmlns:a="http://schemas.openxmlformats.org/drawingml/2006/main" xmlns:r="http://schemas.openxmlformats.org/officeDocument/2006/relationships" xmlns:p="http://schemas.openxmlformats.org/presentationml/2006/main">
   <p:cSld>
@@ -455,7 +211,7 @@
           <a:p>
             <a:fld id="{AAB9D47E-67C1-4E1B-91B6-1C4A4CD91A70}" type="datetimeFigureOut">
               <a:rPr lang="en-US" smtClean="0"/>
-              <a:t>11/21/2016</a:t>
+              <a:t>11/27/2016</a:t>
             </a:fld>
             <a:endParaRPr lang="en-US" dirty="0"/>
           </a:p>
@@ -620,7 +376,7 @@
           <a:p>
             <a:fld id="{D43B9A28-89AB-4FF7-B6F7-B576186B66F1}" type="datetimeFigureOut">
               <a:rPr lang="en-US" smtClean="0"/>
-              <a:t>11/21/2016</a:t>
+              <a:t>11/27/2016</a:t>
             </a:fld>
             <a:endParaRPr lang="en-US" dirty="0"/>
           </a:p>
@@ -888,98 +644,6 @@
 </p:notesMaster>
 </file>
 
-<file path=ppt/notesSlides/notesSlide1.xml><?xml version="1.0" encoding="utf-8"?>
-<p:notes xmlns:a="http://schemas.openxmlformats.org/drawingml/2006/main" xmlns:r="http://schemas.openxmlformats.org/officeDocument/2006/relationships" xmlns:p="http://schemas.openxmlformats.org/presentationml/2006/main">
-  <p:cSld>
-    <p:spTree>
-      <p:nvGrpSpPr>
-        <p:cNvPr id="1" name=""/>
-        <p:cNvGrpSpPr/>
-        <p:nvPr/>
-      </p:nvGrpSpPr>
-      <p:grpSpPr>
-        <a:xfrm>
-          <a:off x="0" y="0"/>
-          <a:ext cx="0" cy="0"/>
-          <a:chOff x="0" y="0"/>
-          <a:chExt cx="0" cy="0"/>
-        </a:xfrm>
-      </p:grpSpPr>
-      <p:sp>
-        <p:nvSpPr>
-          <p:cNvPr id="2" name="Slide Image Placeholder 1"/>
-          <p:cNvSpPr>
-            <a:spLocks noGrp="1" noRot="1" noChangeAspect="1"/>
-          </p:cNvSpPr>
-          <p:nvPr>
-            <p:ph type="sldImg"/>
-          </p:nvPr>
-        </p:nvSpPr>
-        <p:spPr/>
-      </p:sp>
-      <p:sp>
-        <p:nvSpPr>
-          <p:cNvPr id="3" name="Notes Placeholder 2"/>
-          <p:cNvSpPr>
-            <a:spLocks noGrp="1"/>
-          </p:cNvSpPr>
-          <p:nvPr>
-            <p:ph type="body" idx="1"/>
-          </p:nvPr>
-        </p:nvSpPr>
-        <p:spPr/>
-        <p:txBody>
-          <a:bodyPr/>
-          <a:lstStyle/>
-          <a:p>
-            <a:r>
-              <a:rPr lang="en-US" dirty="0" smtClean="0"/>
-              <a:t>SB Note: I’d like</a:t>
-            </a:r>
-            <a:r>
-              <a:rPr lang="en-US" baseline="0" dirty="0" smtClean="0"/>
-              <a:t> this page to be about where we got the info.  But also where they can go to read more. What others should we include?  What would be nice, actually, is if we had a resource page for each factor we tested and we could put it at the bottom of each slide!</a:t>
-            </a:r>
-            <a:endParaRPr lang="en-US" dirty="0"/>
-          </a:p>
-        </p:txBody>
-      </p:sp>
-      <p:sp>
-        <p:nvSpPr>
-          <p:cNvPr id="4" name="Slide Number Placeholder 3"/>
-          <p:cNvSpPr>
-            <a:spLocks noGrp="1"/>
-          </p:cNvSpPr>
-          <p:nvPr>
-            <p:ph type="sldNum" sz="quarter" idx="10"/>
-          </p:nvPr>
-        </p:nvSpPr>
-        <p:spPr/>
-        <p:txBody>
-          <a:bodyPr/>
-          <a:lstStyle/>
-          <a:p>
-            <a:fld id="{3F33A409-1646-4137-A75F-3A02A90E5C52}" type="slidenum">
-              <a:rPr lang="en-US" smtClean="0"/>
-              <a:t>7</a:t>
-            </a:fld>
-            <a:endParaRPr lang="en-US" dirty="0"/>
-          </a:p>
-        </p:txBody>
-      </p:sp>
-    </p:spTree>
-    <p:extLst>
-      <p:ext uri="{BB962C8B-B14F-4D97-AF65-F5344CB8AC3E}">
-        <p14:creationId xmlns:p14="http://schemas.microsoft.com/office/powerpoint/2010/main" val="3005467066"/>
-      </p:ext>
-    </p:extLst>
-  </p:cSld>
-  <p:clrMapOvr>
-    <a:masterClrMapping/>
-  </p:clrMapOvr>
-</p:notes>
-</file>
-
 <file path=ppt/slideLayouts/slideLayout1.xml><?xml version="1.0" encoding="utf-8"?>
 <p:sldLayout xmlns:a="http://schemas.openxmlformats.org/drawingml/2006/main" xmlns:r="http://schemas.openxmlformats.org/officeDocument/2006/relationships" xmlns:p="http://schemas.openxmlformats.org/presentationml/2006/main" showMasterSp="0" type="title" preserve="1">
   <p:cSld name="Title Slide">
@@ -1271,7 +935,7 @@
           <a:p>
             <a:fld id="{EB9FD57E-C399-49A5-9E41-A3349D7DE35B}" type="datetime1">
               <a:rPr lang="en-US" smtClean="0"/>
-              <a:t>11/21/2016</a:t>
+              <a:t>11/27/2016</a:t>
             </a:fld>
             <a:endParaRPr lang="en-US" dirty="0"/>
           </a:p>
@@ -1462,7 +1126,7 @@
           <a:p>
             <a:fld id="{FCEC67C6-3403-4BFB-8B45-9DB8B05CDF67}" type="datetime1">
               <a:rPr lang="en-US" smtClean="0"/>
-              <a:t>11/21/2016</a:t>
+              <a:t>11/27/2016</a:t>
             </a:fld>
             <a:endParaRPr lang="en-US" dirty="0"/>
           </a:p>
@@ -1647,7 +1311,7 @@
           <a:p>
             <a:fld id="{12BE4818-FD7D-4705-B5B3-0E204E7B8767}" type="datetime1">
               <a:rPr lang="en-US" smtClean="0"/>
-              <a:t>11/21/2016</a:t>
+              <a:t>11/27/2016</a:t>
             </a:fld>
             <a:endParaRPr lang="en-US" dirty="0"/>
           </a:p>
@@ -1910,7 +1574,7 @@
           <a:p>
             <a:fld id="{461E0769-57AC-4935-8715-988FC8288D8B}" type="datetime1">
               <a:rPr lang="en-US" smtClean="0"/>
-              <a:t>11/21/2016</a:t>
+              <a:t>11/27/2016</a:t>
             </a:fld>
             <a:endParaRPr lang="en-US" dirty="0"/>
           </a:p>
@@ -2326,7 +1990,7 @@
           <a:p>
             <a:fld id="{CB4DF6D8-D059-4E6F-9489-47A7683AE661}" type="datetime1">
               <a:rPr lang="en-US" smtClean="0"/>
-              <a:t>11/21/2016</a:t>
+              <a:t>11/27/2016</a:t>
             </a:fld>
             <a:endParaRPr lang="en-US" dirty="0"/>
           </a:p>
@@ -2568,7 +2232,7 @@
           <a:p>
             <a:fld id="{3DF2A073-D756-4989-BBD7-7130788C34CA}" type="datetime1">
               <a:rPr lang="en-US" smtClean="0"/>
-              <a:t>11/21/2016</a:t>
+              <a:t>11/27/2016</a:t>
             </a:fld>
             <a:endParaRPr lang="en-US" dirty="0"/>
           </a:p>
@@ -2804,7 +2468,7 @@
           <a:p>
             <a:fld id="{C7812262-0143-4593-8ABE-7E4B68DA324A}" type="datetime1">
               <a:rPr lang="en-US" smtClean="0"/>
-              <a:t>11/21/2016</a:t>
+              <a:t>11/27/2016</a:t>
             </a:fld>
             <a:endParaRPr lang="en-US" dirty="0"/>
           </a:p>
@@ -2999,7 +2663,7 @@
           <a:p>
             <a:fld id="{9444DF3C-DB17-4177-83A1-1F4CFF0BDA1F}" type="datetime1">
               <a:rPr lang="en-US" smtClean="0"/>
-              <a:t>11/21/2016</a:t>
+              <a:t>11/27/2016</a:t>
             </a:fld>
             <a:endParaRPr lang="en-US" dirty="0"/>
           </a:p>
@@ -3097,7 +2761,7 @@
           <a:p>
             <a:fld id="{F6C8DF98-0850-4199-9763-F5AC2123D534}" type="datetime1">
               <a:rPr lang="en-US" smtClean="0"/>
-              <a:t>11/21/2016</a:t>
+              <a:t>11/27/2016</a:t>
             </a:fld>
             <a:endParaRPr lang="en-US" dirty="0"/>
           </a:p>
@@ -3233,7 +2897,7 @@
           <a:p>
             <a:fld id="{01D547BE-D041-448C-ACAF-73E0E93ABA79}" type="datetime1">
               <a:rPr lang="en-US" smtClean="0"/>
-              <a:t>11/21/2016</a:t>
+              <a:t>11/27/2016</a:t>
             </a:fld>
             <a:endParaRPr lang="en-US" dirty="0"/>
           </a:p>
@@ -3751,7 +3415,7 @@
           <a:p>
             <a:fld id="{578863BF-C007-49B5-9EBC-83335D3595B0}" type="datetime1">
               <a:rPr lang="en-US" smtClean="0"/>
-              <a:t>11/21/2016</a:t>
+              <a:t>11/27/2016</a:t>
             </a:fld>
             <a:endParaRPr lang="en-US" dirty="0"/>
           </a:p>
@@ -4012,7 +3676,7 @@
           <a:p>
             <a:fld id="{3AD18C84-CE91-4C35-A0EF-F805A78F094C}" type="datetime1">
               <a:rPr lang="en-US" smtClean="0"/>
-              <a:t>11/21/2016</a:t>
+              <a:t>11/27/2016</a:t>
             </a:fld>
             <a:endParaRPr lang="en-US" dirty="0"/>
           </a:p>
@@ -4559,24 +4223,17 @@
             <a:spLocks noGrp="1"/>
           </p:cNvSpPr>
           <p:nvPr>
-            <p:ph type="ctrTitle"/>
-          </p:nvPr>
-        </p:nvSpPr>
-        <p:spPr>
-          <a:xfrm>
-            <a:off x="0" y="4038600"/>
-            <a:ext cx="7848600" cy="1828800"/>
-          </a:xfrm>
-        </p:spPr>
-        <p:txBody>
-          <a:bodyPr>
-            <a:normAutofit fontScale="90000"/>
-          </a:bodyPr>
+            <p:ph type="title"/>
+          </p:nvPr>
+        </p:nvSpPr>
+        <p:spPr/>
+        <p:txBody>
+          <a:bodyPr/>
           <a:lstStyle/>
           <a:p>
             <a:r>
               <a:rPr lang="en-US" dirty="0" smtClean="0"/>
-              <a:t>White Castle Biometric Health Screening Aggregate Summary</a:t>
+              <a:t>Who participated?</a:t>
             </a:r>
             <a:endParaRPr lang="en-US" dirty="0"/>
           </a:p>
@@ -4584,86 +4241,7 @@
       </p:sp>
       <p:sp>
         <p:nvSpPr>
-          <p:cNvPr id="3" name="Subtitle 2"/>
-          <p:cNvSpPr>
-            <a:spLocks noGrp="1"/>
-          </p:cNvSpPr>
-          <p:nvPr>
-            <p:ph type="subTitle" idx="1"/>
-          </p:nvPr>
-        </p:nvSpPr>
-        <p:spPr/>
-        <p:txBody>
-          <a:bodyPr/>
-          <a:lstStyle/>
-          <a:p>
-            <a:r>
-              <a:rPr lang="en-US" dirty="0" smtClean="0"/>
-              <a:t>Compiled by LifeCare Alliance</a:t>
-            </a:r>
-            <a:endParaRPr lang="en-US" dirty="0"/>
-          </a:p>
-        </p:txBody>
-      </p:sp>
-    </p:spTree>
-    <p:extLst>
-      <p:ext uri="{BB962C8B-B14F-4D97-AF65-F5344CB8AC3E}">
-        <p14:creationId xmlns:p14="http://schemas.microsoft.com/office/powerpoint/2010/main" val="3398785662"/>
-      </p:ext>
-    </p:extLst>
-  </p:cSld>
-  <p:clrMapOvr>
-    <a:masterClrMapping/>
-  </p:clrMapOvr>
-  <p:timing>
-    <p:tnLst>
-      <p:par>
-        <p:cTn id="1" dur="indefinite" restart="never" nodeType="tmRoot"/>
-      </p:par>
-    </p:tnLst>
-  </p:timing>
-</p:sld>
-</file>
-
-<file path=ppt/slides/slide2.xml><?xml version="1.0" encoding="utf-8"?>
-<p:sld xmlns:a="http://schemas.openxmlformats.org/drawingml/2006/main" xmlns:r="http://schemas.openxmlformats.org/officeDocument/2006/relationships" xmlns:p="http://schemas.openxmlformats.org/presentationml/2006/main">
-  <p:cSld>
-    <p:spTree>
-      <p:nvGrpSpPr>
-        <p:cNvPr id="1" name=""/>
-        <p:cNvGrpSpPr/>
-        <p:nvPr/>
-      </p:nvGrpSpPr>
-      <p:grpSpPr>
-        <a:xfrm>
-          <a:off x="0" y="0"/>
-          <a:ext cx="0" cy="0"/>
-          <a:chOff x="0" y="0"/>
-          <a:chExt cx="0" cy="0"/>
-        </a:xfrm>
-      </p:grpSpPr>
-      <p:sp>
-        <p:nvSpPr>
-          <p:cNvPr id="2" name="Title 1"/>
-          <p:cNvSpPr>
-            <a:spLocks noGrp="1"/>
-          </p:cNvSpPr>
-          <p:nvPr>
-            <p:ph type="title"/>
-          </p:nvPr>
-        </p:nvSpPr>
-        <p:spPr/>
-        <p:txBody>
-          <a:bodyPr/>
-          <a:lstStyle/>
-          <a:p>
-            <a:endParaRPr lang="en-US"/>
-          </a:p>
-        </p:txBody>
-      </p:sp>
-      <p:sp>
-        <p:nvSpPr>
-          <p:cNvPr id="3" name="Slide Number Placeholder 2"/>
+          <p:cNvPr id="5" name="Slide Number Placeholder 4"/>
           <p:cNvSpPr>
             <a:spLocks noGrp="1"/>
           </p:cNvSpPr>
@@ -4680,1008 +4258,323 @@
           <a:p>
             <a:fld id="{0550DE80-A55D-4FEA-ABCE-0175392B4432}" type="slidenum">
               <a:rPr lang="en-US" smtClean="0"/>
-              <a:t>2</a:t>
+              <a:t>1</a:t>
             </a:fld>
             <a:endParaRPr lang="en-US" dirty="0"/>
           </a:p>
         </p:txBody>
       </p:sp>
-      <p:sp>
-        <p:nvSpPr>
-          <p:cNvPr id="4" name="Content Placeholder 3"/>
-          <p:cNvSpPr>
-            <a:spLocks noGrp="1"/>
-          </p:cNvSpPr>
-          <p:nvPr>
-            <p:ph sz="quarter" idx="1"/>
-          </p:nvPr>
-        </p:nvSpPr>
-        <p:spPr>
-          <a:xfrm>
-            <a:off x="1828800" y="2133600"/>
-            <a:ext cx="4575048" cy="2362200"/>
-          </a:xfrm>
-        </p:spPr>
-        <p:txBody>
-          <a:bodyPr/>
-          <a:lstStyle/>
-          <a:p>
-            <a:r>
-              <a:rPr lang="en-US" sz="3200" dirty="0"/>
-              <a:t>#{</a:t>
-            </a:r>
-            <a:r>
-              <a:rPr lang="en-US" sz="3200" dirty="0" err="1" smtClean="0"/>
-              <a:t>TYPE:line</a:t>
-            </a:r>
-            <a:r>
-              <a:rPr lang="en-US" sz="3200" dirty="0" smtClean="0"/>
-              <a:t> </a:t>
-            </a:r>
-            <a:r>
-              <a:rPr lang="en-US" sz="3200" dirty="0"/>
-              <a:t>CHART, </a:t>
-            </a:r>
-            <a:r>
-              <a:rPr lang="en-US" sz="3200" smtClean="0"/>
-              <a:t>COLUMNNAME:Sex</a:t>
-            </a:r>
-            <a:r>
-              <a:rPr lang="en-US" sz="3200" dirty="0" smtClean="0"/>
-              <a:t>, surveycount:3,X:2,Y:2,CX:3,CY:3</a:t>
-            </a:r>
-            <a:r>
-              <a:rPr lang="en-US" sz="3200" dirty="0"/>
-              <a:t>}</a:t>
-            </a:r>
-          </a:p>
-          <a:p>
-            <a:pPr marL="0" indent="0">
-              <a:buNone/>
-            </a:pPr>
-            <a:endParaRPr lang="en-US" dirty="0"/>
-          </a:p>
-        </p:txBody>
-      </p:sp>
       <p:graphicFrame>
         <p:nvGraphicFramePr>
-          <p:cNvPr id="5" name="Chart 4"/>
+          <p:cNvPr id="4" name="Table 3"/>
           <p:cNvGraphicFramePr>
             <a:graphicFrameLocks noGrp="1"/>
           </p:cNvGraphicFramePr>
-          <p:nvPr/>
+          <p:nvPr>
+            <p:extLst>
+              <p:ext uri="{D42A27DB-BD31-4B8C-83A1-F6EECF244321}">
+                <p14:modId xmlns:p14="http://schemas.microsoft.com/office/powerpoint/2010/main" val="4243160473"/>
+              </p:ext>
+            </p:extLst>
+          </p:nvPr>
         </p:nvGraphicFramePr>
         <p:xfrm>
-          <a:off x="1828800" y="1828800"/>
-          <a:ext cx="2743200" cy="2362200"/>
+          <a:off x="1600200" y="4648200"/>
+          <a:ext cx="6096000" cy="3845560"/>
         </p:xfrm>
         <a:graphic>
-          <a:graphicData uri="http://schemas.openxmlformats.org/drawingml/2006/chart">
-            <c:chart xmlns:c="http://schemas.openxmlformats.org/drawingml/2006/chart" r:id="rId2"/>
+          <a:graphicData uri="http://schemas.openxmlformats.org/drawingml/2006/table">
+            <a:tbl>
+              <a:tblPr firstRow="1" bandRow="1">
+                <a:tableStyleId>{5C22544A-7EE6-4342-B048-85BDC9FD1C3A}</a:tableStyleId>
+              </a:tblPr>
+              <a:tblGrid>
+                <a:gridCol w="1016000"/>
+                <a:gridCol w="1016000"/>
+                <a:gridCol w="1016000"/>
+                <a:gridCol w="1016000"/>
+                <a:gridCol w="1016000"/>
+                <a:gridCol w="1016000"/>
+              </a:tblGrid>
+              <a:tr h="370840">
+                <a:tc>
+                  <a:txBody>
+                    <a:bodyPr/>
+                    <a:lstStyle/>
+                    <a:p>
+                      <a:r>
+                        <a:rPr lang="en-US" dirty="0" err="1" smtClean="0"/>
+                        <a:t>qwer</a:t>
+                      </a:r>
+                      <a:endParaRPr lang="en-US" dirty="0"/>
+                    </a:p>
+                  </a:txBody>
+                  <a:tcPr/>
+                </a:tc>
+                <a:tc>
+                  <a:txBody>
+                    <a:bodyPr/>
+                    <a:lstStyle/>
+                    <a:p>
+                      <a:endParaRPr lang="en-US"/>
+                    </a:p>
+                  </a:txBody>
+                  <a:tcPr/>
+                </a:tc>
+                <a:tc>
+                  <a:txBody>
+                    <a:bodyPr/>
+                    <a:lstStyle/>
+                    <a:p>
+                      <a:endParaRPr lang="en-US"/>
+                    </a:p>
+                  </a:txBody>
+                  <a:tcPr/>
+                </a:tc>
+                <a:tc>
+                  <a:txBody>
+                    <a:bodyPr/>
+                    <a:lstStyle/>
+                    <a:p>
+                      <a:endParaRPr lang="en-US"/>
+                    </a:p>
+                  </a:txBody>
+                  <a:tcPr/>
+                </a:tc>
+                <a:tc>
+                  <a:txBody>
+                    <a:bodyPr/>
+                    <a:lstStyle/>
+                    <a:p>
+                      <a:endParaRPr lang="en-US"/>
+                    </a:p>
+                  </a:txBody>
+                  <a:tcPr/>
+                </a:tc>
+                <a:tc>
+                  <a:txBody>
+                    <a:bodyPr/>
+                    <a:lstStyle/>
+                    <a:p>
+                      <a:endParaRPr lang="en-US"/>
+                    </a:p>
+                  </a:txBody>
+                  <a:tcPr/>
+                </a:tc>
+              </a:tr>
+              <a:tr h="370840">
+                <a:tc>
+                  <a:txBody>
+                    <a:bodyPr/>
+                    <a:lstStyle/>
+                    <a:p>
+                      <a:r>
+                        <a:rPr lang="en-US" dirty="0" err="1" smtClean="0"/>
+                        <a:t>asdf</a:t>
+                      </a:r>
+                      <a:endParaRPr lang="en-US" dirty="0"/>
+                    </a:p>
+                  </a:txBody>
+                  <a:tcPr/>
+                </a:tc>
+                <a:tc>
+                  <a:txBody>
+                    <a:bodyPr/>
+                    <a:lstStyle/>
+                    <a:p>
+                      <a:r>
+                        <a:t>32%</a:t>
+                      </a:r>
+                      <a:endParaRPr lang="en-US" dirty="0"/>
+                    </a:p>
+                  </a:txBody>
+                  <a:tcPr/>
+                </a:tc>
+                <a:tc>
+                  <a:txBody>
+                    <a:bodyPr/>
+                    <a:lstStyle/>
+                    <a:p>
+                      <a:pPr marL="0" marR="0" indent="0" algn="l" defTabSz="914400" rtl="0" eaLnBrk="1" fontAlgn="auto" latinLnBrk="0" hangingPunct="1">
+                        <a:lnSpc>
+                          <a:spcPct val="100000"/>
+                        </a:lnSpc>
+                        <a:spcBef>
+                          <a:spcPts val="0"/>
+                        </a:spcBef>
+                        <a:spcAft>
+                          <a:spcPts val="0"/>
+                        </a:spcAft>
+                        <a:buClrTx/>
+                        <a:buSzTx/>
+                        <a:buFontTx/>
+                        <a:buNone/>
+                        <a:tabLst/>
+                        <a:defRPr/>
+                      </a:pPr>
+                      <a:r>
+                        <a:t>28%</a:t>
+                      </a:r>
+                      <a:br/>
+                      <a:endParaRPr lang="en-US" dirty="0" smtClean="0"/>
+                    </a:p>
+                  </a:txBody>
+                  <a:tcPr/>
+                </a:tc>
+                <a:tc>
+                  <a:txBody>
+                    <a:bodyPr/>
+                    <a:lstStyle/>
+                    <a:p>
+                      <a:r>
+                        <a:t>36%</a:t>
+                      </a:r>
+                      <a:br/>
+                      <a:endParaRPr lang="en-US" dirty="0" smtClean="0"/>
+                    </a:p>
+                  </a:txBody>
+                  <a:tcPr/>
+                </a:tc>
+                <a:tc>
+                  <a:txBody>
+                    <a:bodyPr/>
+                    <a:lstStyle/>
+                    <a:p>
+                      <a:endParaRPr lang="en-US"/>
+                    </a:p>
+                  </a:txBody>
+                  <a:tcPr/>
+                </a:tc>
+                <a:tc>
+                  <a:txBody>
+                    <a:bodyPr/>
+                    <a:lstStyle/>
+                    <a:p>
+                      <a:endParaRPr lang="en-US"/>
+                    </a:p>
+                  </a:txBody>
+                  <a:tcPr/>
+                </a:tc>
+              </a:tr>
+              <a:tr h="370840">
+                <a:tc>
+                  <a:txBody>
+                    <a:bodyPr/>
+                    <a:lstStyle/>
+                    <a:p>
+                      <a:r>
+                        <a:rPr lang="en-US" dirty="0" err="1" smtClean="0"/>
+                        <a:t>zxcv</a:t>
+                      </a:r>
+                      <a:endParaRPr lang="en-US" dirty="0"/>
+                    </a:p>
+                  </a:txBody>
+                  <a:tcPr/>
+                </a:tc>
+                <a:tc>
+                  <a:txBody>
+                    <a:bodyPr/>
+                    <a:lstStyle/>
+                    <a:p>
+                      <a:r>
+                        <a:t>65%</a:t>
+                      </a:r>
+                      <a:endParaRPr lang="en-US" sz="800" dirty="0"/>
+                    </a:p>
+                  </a:txBody>
+                  <a:tcPr/>
+                </a:tc>
+                <a:tc>
+                  <a:txBody>
+                    <a:bodyPr/>
+                    <a:lstStyle/>
+                    <a:p>
+                      <a:pPr marL="0" marR="0" indent="0" algn="l" defTabSz="914400" rtl="0" eaLnBrk="1" fontAlgn="auto" latinLnBrk="0" hangingPunct="1">
+                        <a:lnSpc>
+                          <a:spcPct val="100000"/>
+                        </a:lnSpc>
+                        <a:spcBef>
+                          <a:spcPts val="0"/>
+                        </a:spcBef>
+                        <a:spcAft>
+                          <a:spcPts val="0"/>
+                        </a:spcAft>
+                        <a:buClrTx/>
+                        <a:buSzTx/>
+                        <a:buFontTx/>
+                        <a:buNone/>
+                        <a:tabLst/>
+                        <a:defRPr/>
+                      </a:pPr>
+                      <a:r>
+                        <a:t>NO OUTPUT TEXT CREATED</a:t>
+                      </a:r>
+                      <a:br/>
+                      <a:endParaRPr lang="en-US" dirty="0" smtClean="0"/>
+                    </a:p>
+                  </a:txBody>
+                  <a:tcPr/>
+                </a:tc>
+                <a:tc>
+                  <a:txBody>
+                    <a:bodyPr/>
+                    <a:lstStyle/>
+                    <a:p>
+                      <a:pPr marL="0" marR="0" indent="0" algn="l" defTabSz="914400" rtl="0" eaLnBrk="1" fontAlgn="auto" latinLnBrk="0" hangingPunct="1">
+                        <a:lnSpc>
+                          <a:spcPct val="100000"/>
+                        </a:lnSpc>
+                        <a:spcBef>
+                          <a:spcPts val="0"/>
+                        </a:spcBef>
+                        <a:spcAft>
+                          <a:spcPts val="0"/>
+                        </a:spcAft>
+                        <a:buClrTx/>
+                        <a:buSzTx/>
+                        <a:buFontTx/>
+                        <a:buNone/>
+                        <a:tabLst/>
+                        <a:defRPr/>
+                      </a:pPr>
+                      <a:r>
+                        <a:t>62%</a:t>
+                      </a:r>
+                      <a:br/>
+                      <a:endParaRPr lang="en-US" dirty="0" smtClean="0"/>
+                    </a:p>
+                  </a:txBody>
+                  <a:tcPr/>
+                </a:tc>
+                <a:tc>
+                  <a:txBody>
+                    <a:bodyPr/>
+                    <a:lstStyle/>
+                    <a:p>
+                      <a:endParaRPr lang="en-US"/>
+                    </a:p>
+                  </a:txBody>
+                  <a:tcPr/>
+                </a:tc>
+                <a:tc>
+                  <a:txBody>
+                    <a:bodyPr/>
+                    <a:lstStyle/>
+                    <a:p>
+                      <a:endParaRPr lang="en-US" dirty="0"/>
+                    </a:p>
+                  </a:txBody>
+                  <a:tcPr/>
+                </a:tc>
+              </a:tr>
+            </a:tbl>
           </a:graphicData>
         </a:graphic>
       </p:graphicFrame>
     </p:spTree>
     <p:extLst>
       <p:ext uri="{BB962C8B-B14F-4D97-AF65-F5344CB8AC3E}">
-        <p14:creationId xmlns:p14="http://schemas.microsoft.com/office/powerpoint/2010/main" val="2054613054"/>
-      </p:ext>
-    </p:extLst>
-  </p:cSld>
-  <p:clrMapOvr>
-    <a:masterClrMapping/>
-  </p:clrMapOvr>
-</p:sld>
-</file>
-
-<file path=ppt/slides/slide3.xml><?xml version="1.0" encoding="utf-8"?>
-<p:sld xmlns:a="http://schemas.openxmlformats.org/drawingml/2006/main" xmlns:r="http://schemas.openxmlformats.org/officeDocument/2006/relationships" xmlns:p="http://schemas.openxmlformats.org/presentationml/2006/main">
-  <p:cSld>
-    <p:spTree>
-      <p:nvGrpSpPr>
-        <p:cNvPr id="1" name=""/>
-        <p:cNvGrpSpPr/>
-        <p:nvPr/>
-      </p:nvGrpSpPr>
-      <p:grpSpPr>
-        <a:xfrm>
-          <a:off x="0" y="0"/>
-          <a:ext cx="0" cy="0"/>
-          <a:chOff x="0" y="0"/>
-          <a:chExt cx="0" cy="0"/>
-        </a:xfrm>
-      </p:grpSpPr>
-      <p:sp>
-        <p:nvSpPr>
-          <p:cNvPr id="2" name="Title 1"/>
-          <p:cNvSpPr>
-            <a:spLocks noGrp="1"/>
-          </p:cNvSpPr>
-          <p:nvPr>
-            <p:ph type="title"/>
-          </p:nvPr>
-        </p:nvSpPr>
-        <p:spPr/>
-        <p:txBody>
-          <a:bodyPr/>
-          <a:lstStyle/>
-          <a:p>
-            <a:r>
-              <a:rPr lang="en-US" dirty="0" smtClean="0"/>
-              <a:t>Who participated?</a:t>
-            </a:r>
-            <a:endParaRPr lang="en-US" dirty="0"/>
-          </a:p>
-        </p:txBody>
-      </p:sp>
-      <p:sp>
-        <p:nvSpPr>
-          <p:cNvPr id="3" name="Content Placeholder 2"/>
-          <p:cNvSpPr>
-            <a:spLocks noGrp="1"/>
-          </p:cNvSpPr>
-          <p:nvPr>
-            <p:ph sz="quarter" idx="1"/>
-          </p:nvPr>
-        </p:nvSpPr>
-        <p:spPr>
-          <a:xfrm>
-            <a:off x="1524000" y="3352800"/>
-            <a:ext cx="6169152" cy="1066800"/>
-          </a:xfrm>
-        </p:spPr>
-        <p:txBody>
-          <a:bodyPr>
-            <a:normAutofit fontScale="62500" lnSpcReduction="20000"/>
-          </a:bodyPr>
-          <a:lstStyle/>
-          <a:p>
-            <a:pPr marL="0" indent="0">
-              <a:buNone/>
-            </a:pPr>
-            <a:r>
-              <a:t>Blah blah nospace32%nospace blah blah</a:t>
-            </a:r>
-            <a:endParaRPr lang="en-US" sz="4000" dirty="0"/>
-          </a:p>
-        </p:txBody>
-      </p:sp>
-      <p:sp>
-        <p:nvSpPr>
-          <p:cNvPr id="5" name="Slide Number Placeholder 4"/>
-          <p:cNvSpPr>
-            <a:spLocks noGrp="1"/>
-          </p:cNvSpPr>
-          <p:nvPr>
-            <p:ph type="sldNum" sz="quarter" idx="12"/>
-          </p:nvPr>
-        </p:nvSpPr>
-        <p:spPr/>
-        <p:txBody>
-          <a:bodyPr>
-            <a:normAutofit fontScale="85000" lnSpcReduction="20000"/>
-          </a:bodyPr>
-          <a:lstStyle/>
-          <a:p>
-            <a:fld id="{0550DE80-A55D-4FEA-ABCE-0175392B4432}" type="slidenum">
-              <a:rPr lang="en-US" smtClean="0"/>
-              <a:t>3</a:t>
-            </a:fld>
-            <a:endParaRPr lang="en-US" dirty="0"/>
-          </a:p>
-        </p:txBody>
-      </p:sp>
-    </p:spTree>
-    <p:extLst>
-      <p:ext uri="{BB962C8B-B14F-4D97-AF65-F5344CB8AC3E}">
         <p14:creationId xmlns:p14="http://schemas.microsoft.com/office/powerpoint/2010/main" val="580674313"/>
-      </p:ext>
-    </p:extLst>
-  </p:cSld>
-  <p:clrMapOvr>
-    <a:masterClrMapping/>
-  </p:clrMapOvr>
-  <p:timing>
-    <p:tnLst>
-      <p:par>
-        <p:cTn id="1" dur="indefinite" restart="never" nodeType="tmRoot"/>
-      </p:par>
-    </p:tnLst>
-  </p:timing>
-</p:sld>
-</file>
-
-<file path=ppt/slides/slide4.xml><?xml version="1.0" encoding="utf-8"?>
-<p:sld xmlns:a="http://schemas.openxmlformats.org/drawingml/2006/main" xmlns:r="http://schemas.openxmlformats.org/officeDocument/2006/relationships" xmlns:p="http://schemas.openxmlformats.org/presentationml/2006/main">
-  <p:cSld>
-    <p:spTree>
-      <p:nvGrpSpPr>
-        <p:cNvPr id="1" name=""/>
-        <p:cNvGrpSpPr/>
-        <p:nvPr/>
-      </p:nvGrpSpPr>
-      <p:grpSpPr>
-        <a:xfrm>
-          <a:off x="0" y="0"/>
-          <a:ext cx="0" cy="0"/>
-          <a:chOff x="0" y="0"/>
-          <a:chExt cx="0" cy="0"/>
-        </a:xfrm>
-      </p:grpSpPr>
-      <p:sp>
-        <p:nvSpPr>
-          <p:cNvPr id="2" name="Title 1"/>
-          <p:cNvSpPr>
-            <a:spLocks noGrp="1"/>
-          </p:cNvSpPr>
-          <p:nvPr>
-            <p:ph type="title"/>
-          </p:nvPr>
-        </p:nvSpPr>
-        <p:spPr/>
-        <p:txBody>
-          <a:bodyPr/>
-          <a:lstStyle/>
-          <a:p>
-            <a:r>
-              <a:rPr lang="en-US" dirty="0" smtClean="0"/>
-              <a:t>Who participated?</a:t>
-            </a:r>
-            <a:endParaRPr lang="en-US" dirty="0"/>
-          </a:p>
-        </p:txBody>
-      </p:sp>
-      <p:sp>
-        <p:nvSpPr>
-          <p:cNvPr id="3" name="Content Placeholder 2"/>
-          <p:cNvSpPr>
-            <a:spLocks noGrp="1"/>
-          </p:cNvSpPr>
-          <p:nvPr>
-            <p:ph sz="quarter" idx="1"/>
-          </p:nvPr>
-        </p:nvSpPr>
-        <p:spPr>
-          <a:xfrm>
-            <a:off x="1371600" y="2590800"/>
-            <a:ext cx="6169152" cy="1066800"/>
-          </a:xfrm>
-        </p:spPr>
-        <p:txBody>
-          <a:bodyPr>
-            <a:normAutofit/>
-          </a:bodyPr>
-          <a:lstStyle/>
-          <a:p>
-            <a:pPr marL="0" indent="0">
-              <a:buNone/>
-            </a:pPr>
-            <a:endParaRPr lang="en-US" sz="4000" dirty="0" smtClean="0"/>
-          </a:p>
-        </p:txBody>
-      </p:sp>
-      <p:sp>
-        <p:nvSpPr>
-          <p:cNvPr id="5" name="Slide Number Placeholder 4"/>
-          <p:cNvSpPr>
-            <a:spLocks noGrp="1"/>
-          </p:cNvSpPr>
-          <p:nvPr>
-            <p:ph type="sldNum" sz="quarter" idx="12"/>
-          </p:nvPr>
-        </p:nvSpPr>
-        <p:spPr/>
-        <p:txBody>
-          <a:bodyPr>
-            <a:normAutofit fontScale="85000" lnSpcReduction="20000"/>
-          </a:bodyPr>
-          <a:lstStyle/>
-          <a:p>
-            <a:fld id="{0550DE80-A55D-4FEA-ABCE-0175392B4432}" type="slidenum">
-              <a:rPr lang="en-US" smtClean="0"/>
-              <a:t>4</a:t>
-            </a:fld>
-            <a:endParaRPr lang="en-US" dirty="0"/>
-          </a:p>
-        </p:txBody>
-      </p:sp>
-      <p:sp>
-        <p:nvSpPr>
-          <p:cNvPr id="6" name="Content Placeholder 2"/>
-          <p:cNvSpPr txBox="1">
-            <a:spLocks/>
-          </p:cNvSpPr>
-          <p:nvPr/>
-        </p:nvSpPr>
-        <p:spPr>
-          <a:xfrm>
-            <a:off x="1447800" y="4191000"/>
-            <a:ext cx="6169152" cy="1066800"/>
-          </a:xfrm>
-          <a:prstGeom prst="rect">
-            <a:avLst/>
-          </a:prstGeom>
-        </p:spPr>
-        <p:txBody>
-          <a:bodyPr vert="horz">
-            <a:normAutofit fontScale="92500" lnSpcReduction="20000"/>
-          </a:bodyPr>
-          <a:lstStyle>
-            <a:lvl1pPr marL="320040" indent="-320040" algn="l" rtl="0" eaLnBrk="1" latinLnBrk="0" hangingPunct="1">
-              <a:spcBef>
-                <a:spcPts val="700"/>
-              </a:spcBef>
-              <a:buClr>
-                <a:schemeClr val="accent2"/>
-              </a:buClr>
-              <a:buSzPct val="60000"/>
-              <a:buFont typeface="Wingdings"/>
-              <a:buChar char=""/>
-              <a:defRPr kumimoji="0" sz="2900" kern="1200">
-                <a:solidFill>
-                  <a:schemeClr val="tx1"/>
-                </a:solidFill>
-                <a:latin typeface="+mn-lt"/>
-                <a:ea typeface="+mn-ea"/>
-                <a:cs typeface="+mn-cs"/>
-              </a:defRPr>
-            </a:lvl1pPr>
-            <a:lvl2pPr marL="640080" indent="-274320" algn="l" rtl="0" eaLnBrk="1" latinLnBrk="0" hangingPunct="1">
-              <a:spcBef>
-                <a:spcPts val="550"/>
-              </a:spcBef>
-              <a:buClr>
-                <a:schemeClr val="accent1"/>
-              </a:buClr>
-              <a:buSzPct val="70000"/>
-              <a:buFont typeface="Wingdings 2"/>
-              <a:buChar char=""/>
-              <a:defRPr kumimoji="0" sz="2600" kern="1200">
-                <a:solidFill>
-                  <a:schemeClr val="tx1"/>
-                </a:solidFill>
-                <a:latin typeface="+mn-lt"/>
-                <a:ea typeface="+mn-ea"/>
-                <a:cs typeface="+mn-cs"/>
-              </a:defRPr>
-            </a:lvl2pPr>
-            <a:lvl3pPr marL="914400" indent="-228600" algn="l" rtl="0" eaLnBrk="1" latinLnBrk="0" hangingPunct="1">
-              <a:spcBef>
-                <a:spcPts val="500"/>
-              </a:spcBef>
-              <a:buClr>
-                <a:schemeClr val="accent2"/>
-              </a:buClr>
-              <a:buSzPct val="75000"/>
-              <a:buFont typeface="Wingdings"/>
-              <a:buChar char=""/>
-              <a:defRPr kumimoji="0" sz="2300" kern="1200">
-                <a:solidFill>
-                  <a:schemeClr val="tx1"/>
-                </a:solidFill>
-                <a:latin typeface="+mn-lt"/>
-                <a:ea typeface="+mn-ea"/>
-                <a:cs typeface="+mn-cs"/>
-              </a:defRPr>
-            </a:lvl3pPr>
-            <a:lvl4pPr marL="1371600" indent="-228600" algn="l" rtl="0" eaLnBrk="1" latinLnBrk="0" hangingPunct="1">
-              <a:spcBef>
-                <a:spcPts val="400"/>
-              </a:spcBef>
-              <a:buClr>
-                <a:schemeClr val="accent3"/>
-              </a:buClr>
-              <a:buSzPct val="75000"/>
-              <a:buFont typeface="Wingdings"/>
-              <a:buChar char=""/>
-              <a:defRPr kumimoji="0" sz="2000" kern="1200">
-                <a:solidFill>
-                  <a:schemeClr val="tx1"/>
-                </a:solidFill>
-                <a:latin typeface="+mn-lt"/>
-                <a:ea typeface="+mn-ea"/>
-                <a:cs typeface="+mn-cs"/>
-              </a:defRPr>
-            </a:lvl4pPr>
-            <a:lvl5pPr marL="1828800" indent="-228600" algn="l" rtl="0" eaLnBrk="1" latinLnBrk="0" hangingPunct="1">
-              <a:spcBef>
-                <a:spcPts val="400"/>
-              </a:spcBef>
-              <a:buClr>
-                <a:schemeClr val="accent4"/>
-              </a:buClr>
-              <a:buSzPct val="65000"/>
-              <a:buFont typeface="Wingdings"/>
-              <a:buChar char=""/>
-              <a:defRPr kumimoji="0" sz="2000" kern="1200">
-                <a:solidFill>
-                  <a:schemeClr val="tx1"/>
-                </a:solidFill>
-                <a:latin typeface="+mn-lt"/>
-                <a:ea typeface="+mn-ea"/>
-                <a:cs typeface="+mn-cs"/>
-              </a:defRPr>
-            </a:lvl5pPr>
-            <a:lvl6pPr marL="2103120" indent="-228600" algn="l" rtl="0" eaLnBrk="1" latinLnBrk="0" hangingPunct="1">
-              <a:spcBef>
-                <a:spcPct val="20000"/>
-              </a:spcBef>
-              <a:buClr>
-                <a:schemeClr val="accent1"/>
-              </a:buClr>
-              <a:buFont typeface="Wingdings"/>
-              <a:buChar char="§"/>
-              <a:defRPr kumimoji="0" sz="1800" kern="1200" baseline="0">
-                <a:solidFill>
-                  <a:schemeClr val="tx1"/>
-                </a:solidFill>
-                <a:latin typeface="+mn-lt"/>
-                <a:ea typeface="+mn-ea"/>
-                <a:cs typeface="+mn-cs"/>
-              </a:defRPr>
-            </a:lvl6pPr>
-            <a:lvl7pPr marL="2377440" indent="-228600" algn="l" rtl="0" eaLnBrk="1" latinLnBrk="0" hangingPunct="1">
-              <a:spcBef>
-                <a:spcPct val="20000"/>
-              </a:spcBef>
-              <a:buClr>
-                <a:schemeClr val="accent2"/>
-              </a:buClr>
-              <a:buFont typeface="Wingdings"/>
-              <a:buChar char="§"/>
-              <a:defRPr kumimoji="0" sz="1800" kern="1200" baseline="0">
-                <a:solidFill>
-                  <a:schemeClr val="tx1"/>
-                </a:solidFill>
-                <a:latin typeface="+mn-lt"/>
-                <a:ea typeface="+mn-ea"/>
-                <a:cs typeface="+mn-cs"/>
-              </a:defRPr>
-            </a:lvl7pPr>
-            <a:lvl8pPr marL="2651760" indent="-228600" algn="l" rtl="0" eaLnBrk="1" latinLnBrk="0" hangingPunct="1">
-              <a:spcBef>
-                <a:spcPct val="20000"/>
-              </a:spcBef>
-              <a:buClr>
-                <a:schemeClr val="accent3"/>
-              </a:buClr>
-              <a:buFont typeface="Wingdings"/>
-              <a:buChar char="§"/>
-              <a:defRPr kumimoji="0" sz="1800" kern="1200" baseline="0">
-                <a:solidFill>
-                  <a:schemeClr val="tx1"/>
-                </a:solidFill>
-                <a:latin typeface="+mn-lt"/>
-                <a:ea typeface="+mn-ea"/>
-                <a:cs typeface="+mn-cs"/>
-              </a:defRPr>
-            </a:lvl8pPr>
-            <a:lvl9pPr marL="2926080" indent="-228600" algn="l" rtl="0" eaLnBrk="1" latinLnBrk="0" hangingPunct="1">
-              <a:spcBef>
-                <a:spcPct val="20000"/>
-              </a:spcBef>
-              <a:buClr>
-                <a:schemeClr val="accent4"/>
-              </a:buClr>
-              <a:buFont typeface="Wingdings"/>
-              <a:buChar char="§"/>
-              <a:defRPr kumimoji="0" sz="1800" kern="1200" baseline="0">
-                <a:solidFill>
-                  <a:schemeClr val="tx1"/>
-                </a:solidFill>
-                <a:latin typeface="+mn-lt"/>
-                <a:ea typeface="+mn-ea"/>
-                <a:cs typeface="+mn-cs"/>
-              </a:defRPr>
-            </a:lvl9pPr>
-          </a:lstStyle>
-          <a:p>
-            <a:pPr marL="0" indent="0">
-              <a:buNone/>
-            </a:pPr>
-            <a:r>
-              <a:t>32%</a:t>
-            </a:r>
-          </a:p>
-        </p:txBody>
-      </p:sp>
-    </p:spTree>
-    <p:extLst>
-      <p:ext uri="{BB962C8B-B14F-4D97-AF65-F5344CB8AC3E}">
-        <p14:creationId xmlns:p14="http://schemas.microsoft.com/office/powerpoint/2010/main" val="2841723979"/>
-      </p:ext>
-    </p:extLst>
-  </p:cSld>
-  <p:clrMapOvr>
-    <a:masterClrMapping/>
-  </p:clrMapOvr>
-  <p:timing>
-    <p:tnLst>
-      <p:par>
-        <p:cTn id="1" dur="indefinite" restart="never" nodeType="tmRoot"/>
-      </p:par>
-    </p:tnLst>
-  </p:timing>
-</p:sld>
-</file>
-
-<file path=ppt/slides/slide5.xml><?xml version="1.0" encoding="utf-8"?>
-<p:sld xmlns:a="http://schemas.openxmlformats.org/drawingml/2006/main" xmlns:r="http://schemas.openxmlformats.org/officeDocument/2006/relationships" xmlns:p="http://schemas.openxmlformats.org/presentationml/2006/main">
-  <p:cSld>
-    <p:spTree>
-      <p:nvGrpSpPr>
-        <p:cNvPr id="1" name=""/>
-        <p:cNvGrpSpPr/>
-        <p:nvPr/>
-      </p:nvGrpSpPr>
-      <p:grpSpPr>
-        <a:xfrm>
-          <a:off x="0" y="0"/>
-          <a:ext cx="0" cy="0"/>
-          <a:chOff x="0" y="0"/>
-          <a:chExt cx="0" cy="0"/>
-        </a:xfrm>
-      </p:grpSpPr>
-      <p:sp>
-        <p:nvSpPr>
-          <p:cNvPr id="2" name="Title 1"/>
-          <p:cNvSpPr>
-            <a:spLocks noGrp="1"/>
-          </p:cNvSpPr>
-          <p:nvPr>
-            <p:ph type="title"/>
-          </p:nvPr>
-        </p:nvSpPr>
-        <p:spPr/>
-        <p:txBody>
-          <a:bodyPr/>
-          <a:lstStyle/>
-          <a:p>
-            <a:r>
-              <a:rPr lang="en-US" dirty="0" smtClean="0"/>
-              <a:t>Who participated?</a:t>
-            </a:r>
-            <a:endParaRPr lang="en-US" dirty="0"/>
-          </a:p>
-        </p:txBody>
-      </p:sp>
-      <p:sp>
-        <p:nvSpPr>
-          <p:cNvPr id="3" name="Content Placeholder 2"/>
-          <p:cNvSpPr>
-            <a:spLocks noGrp="1"/>
-          </p:cNvSpPr>
-          <p:nvPr>
-            <p:ph sz="quarter" idx="1"/>
-          </p:nvPr>
-        </p:nvSpPr>
-        <p:spPr>
-          <a:xfrm>
-            <a:off x="381000" y="1600200"/>
-            <a:ext cx="8153400" cy="3886198"/>
-          </a:xfrm>
-        </p:spPr>
-        <p:txBody>
-          <a:bodyPr>
-            <a:normAutofit/>
-          </a:bodyPr>
-          <a:lstStyle/>
-          <a:p>
-            <a:pPr marL="0" indent="0">
-              <a:buNone/>
-            </a:pPr>
-            <a:endParaRPr lang="en-US" sz="4000" dirty="0" smtClean="0"/>
-          </a:p>
-        </p:txBody>
-      </p:sp>
-      <p:sp>
-        <p:nvSpPr>
-          <p:cNvPr id="5" name="Slide Number Placeholder 4"/>
-          <p:cNvSpPr>
-            <a:spLocks noGrp="1"/>
-          </p:cNvSpPr>
-          <p:nvPr>
-            <p:ph type="sldNum" sz="quarter" idx="12"/>
-          </p:nvPr>
-        </p:nvSpPr>
-        <p:spPr/>
-        <p:txBody>
-          <a:bodyPr>
-            <a:normAutofit fontScale="85000" lnSpcReduction="20000"/>
-          </a:bodyPr>
-          <a:lstStyle/>
-          <a:p>
-            <a:fld id="{0550DE80-A55D-4FEA-ABCE-0175392B4432}" type="slidenum">
-              <a:rPr lang="en-US" smtClean="0"/>
-              <a:t>5</a:t>
-            </a:fld>
-            <a:endParaRPr lang="en-US" dirty="0"/>
-          </a:p>
-        </p:txBody>
-      </p:sp>
-      <p:graphicFrame>
-        <p:nvGraphicFramePr>
-          <p:cNvPr id="4" name="Chart 3"/>
-          <p:cNvGraphicFramePr>
-            <a:graphicFrameLocks noGrp="1"/>
-          </p:cNvGraphicFramePr>
-          <p:nvPr/>
-        </p:nvGraphicFramePr>
-        <p:xfrm>
-          <a:off x="1828800" y="1828800"/>
-          <a:ext cx="2743200" cy="3886198"/>
-        </p:xfrm>
-        <a:graphic>
-          <a:graphicData uri="http://schemas.openxmlformats.org/drawingml/2006/chart">
-            <c:chart xmlns:c="http://schemas.openxmlformats.org/drawingml/2006/chart" r:id="rId2"/>
-          </a:graphicData>
-        </a:graphic>
-      </p:graphicFrame>
-    </p:spTree>
-    <p:extLst>
-      <p:ext uri="{BB962C8B-B14F-4D97-AF65-F5344CB8AC3E}">
-        <p14:creationId xmlns:p14="http://schemas.microsoft.com/office/powerpoint/2010/main" val="1597361193"/>
-      </p:ext>
-    </p:extLst>
-  </p:cSld>
-  <p:clrMapOvr>
-    <a:masterClrMapping/>
-  </p:clrMapOvr>
-  <p:timing>
-    <p:tnLst>
-      <p:par>
-        <p:cTn id="1" dur="indefinite" restart="never" nodeType="tmRoot"/>
-      </p:par>
-    </p:tnLst>
-  </p:timing>
-</p:sld>
-</file>
-
-<file path=ppt/slides/slide6.xml><?xml version="1.0" encoding="utf-8"?>
-<p:sld xmlns:a="http://schemas.openxmlformats.org/drawingml/2006/main" xmlns:r="http://schemas.openxmlformats.org/officeDocument/2006/relationships" xmlns:p="http://schemas.openxmlformats.org/presentationml/2006/main">
-  <p:cSld>
-    <p:spTree>
-      <p:nvGrpSpPr>
-        <p:cNvPr id="1" name=""/>
-        <p:cNvGrpSpPr/>
-        <p:nvPr/>
-      </p:nvGrpSpPr>
-      <p:grpSpPr>
-        <a:xfrm>
-          <a:off x="0" y="0"/>
-          <a:ext cx="0" cy="0"/>
-          <a:chOff x="0" y="0"/>
-          <a:chExt cx="0" cy="0"/>
-        </a:xfrm>
-      </p:grpSpPr>
-      <p:sp>
-        <p:nvSpPr>
-          <p:cNvPr id="2" name="Title 1"/>
-          <p:cNvSpPr>
-            <a:spLocks noGrp="1"/>
-          </p:cNvSpPr>
-          <p:nvPr>
-            <p:ph type="title"/>
-          </p:nvPr>
-        </p:nvSpPr>
-        <p:spPr/>
-        <p:txBody>
-          <a:bodyPr/>
-          <a:lstStyle/>
-          <a:p>
-            <a:r>
-              <a:rPr lang="en-US" dirty="0" smtClean="0"/>
-              <a:t>Who participated?</a:t>
-            </a:r>
-            <a:endParaRPr lang="en-US" dirty="0"/>
-          </a:p>
-        </p:txBody>
-      </p:sp>
-      <p:sp>
-        <p:nvSpPr>
-          <p:cNvPr id="3" name="Content Placeholder 2"/>
-          <p:cNvSpPr>
-            <a:spLocks noGrp="1"/>
-          </p:cNvSpPr>
-          <p:nvPr>
-            <p:ph sz="quarter" idx="1"/>
-          </p:nvPr>
-        </p:nvSpPr>
-        <p:spPr>
-          <a:xfrm>
-            <a:off x="612648" y="1600200"/>
-            <a:ext cx="8153400" cy="3886198"/>
-          </a:xfrm>
-        </p:spPr>
-        <p:txBody>
-          <a:bodyPr>
-            <a:normAutofit/>
-          </a:bodyPr>
-          <a:lstStyle/>
-          <a:p>
-            <a:pPr marL="0" indent="0">
-              <a:buNone/>
-            </a:pPr>
-          </a:p>
-        </p:txBody>
-      </p:sp>
-      <p:sp>
-        <p:nvSpPr>
-          <p:cNvPr id="5" name="Slide Number Placeholder 4"/>
-          <p:cNvSpPr>
-            <a:spLocks noGrp="1"/>
-          </p:cNvSpPr>
-          <p:nvPr>
-            <p:ph type="sldNum" sz="quarter" idx="12"/>
-          </p:nvPr>
-        </p:nvSpPr>
-        <p:spPr/>
-        <p:txBody>
-          <a:bodyPr>
-            <a:normAutofit fontScale="85000" lnSpcReduction="20000"/>
-          </a:bodyPr>
-          <a:lstStyle/>
-          <a:p>
-            <a:fld id="{0550DE80-A55D-4FEA-ABCE-0175392B4432}" type="slidenum">
-              <a:rPr lang="en-US" smtClean="0"/>
-              <a:t>6</a:t>
-            </a:fld>
-            <a:endParaRPr lang="en-US" dirty="0"/>
-          </a:p>
-        </p:txBody>
-      </p:sp>
-      <p:graphicFrame>
-        <p:nvGraphicFramePr>
-          <p:cNvPr id="4" name="Chart 3"/>
-          <p:cNvGraphicFramePr>
-            <a:graphicFrameLocks noGrp="1"/>
-          </p:cNvGraphicFramePr>
-          <p:nvPr/>
-        </p:nvGraphicFramePr>
-        <p:xfrm>
-          <a:off x="1828800" y="1828800"/>
-          <a:ext cx="2743200" cy="3886198"/>
-        </p:xfrm>
-        <a:graphic>
-          <a:graphicData uri="http://schemas.openxmlformats.org/drawingml/2006/chart">
-            <c:chart xmlns:c="http://schemas.openxmlformats.org/drawingml/2006/chart" r:id="rId2"/>
-          </a:graphicData>
-        </a:graphic>
-      </p:graphicFrame>
-    </p:spTree>
-    <p:extLst>
-      <p:ext uri="{BB962C8B-B14F-4D97-AF65-F5344CB8AC3E}">
-        <p14:creationId xmlns:p14="http://schemas.microsoft.com/office/powerpoint/2010/main" val="3209572625"/>
-      </p:ext>
-    </p:extLst>
-  </p:cSld>
-  <p:clrMapOvr>
-    <a:masterClrMapping/>
-  </p:clrMapOvr>
-  <p:timing>
-    <p:tnLst>
-      <p:par>
-        <p:cTn id="1" dur="indefinite" restart="never" nodeType="tmRoot"/>
-      </p:par>
-    </p:tnLst>
-  </p:timing>
-</p:sld>
-</file>
-
-<file path=ppt/slides/slide7.xml><?xml version="1.0" encoding="utf-8"?>
-<p:sld xmlns:a="http://schemas.openxmlformats.org/drawingml/2006/main" xmlns:r="http://schemas.openxmlformats.org/officeDocument/2006/relationships" xmlns:p="http://schemas.openxmlformats.org/presentationml/2006/main">
-  <p:cSld>
-    <p:spTree>
-      <p:nvGrpSpPr>
-        <p:cNvPr id="1" name=""/>
-        <p:cNvGrpSpPr/>
-        <p:nvPr/>
-      </p:nvGrpSpPr>
-      <p:grpSpPr>
-        <a:xfrm>
-          <a:off x="0" y="0"/>
-          <a:ext cx="0" cy="0"/>
-          <a:chOff x="0" y="0"/>
-          <a:chExt cx="0" cy="0"/>
-        </a:xfrm>
-      </p:grpSpPr>
-      <p:sp>
-        <p:nvSpPr>
-          <p:cNvPr id="2" name="Title 1"/>
-          <p:cNvSpPr>
-            <a:spLocks noGrp="1"/>
-          </p:cNvSpPr>
-          <p:nvPr>
-            <p:ph type="title"/>
-          </p:nvPr>
-        </p:nvSpPr>
-        <p:spPr/>
-        <p:txBody>
-          <a:bodyPr/>
-          <a:lstStyle/>
-          <a:p>
-            <a:r>
-              <a:rPr lang="en-US" dirty="0" smtClean="0"/>
-              <a:t>Resources</a:t>
-            </a:r>
-            <a:endParaRPr lang="en-US" dirty="0"/>
-          </a:p>
-        </p:txBody>
-      </p:sp>
-      <p:sp>
-        <p:nvSpPr>
-          <p:cNvPr id="3" name="Content Placeholder 2"/>
-          <p:cNvSpPr>
-            <a:spLocks noGrp="1"/>
-          </p:cNvSpPr>
-          <p:nvPr>
-            <p:ph sz="quarter" idx="1"/>
-          </p:nvPr>
-        </p:nvSpPr>
-        <p:spPr>
-          <a:xfrm>
-            <a:off x="612648" y="1600200"/>
-            <a:ext cx="8150352" cy="4800600"/>
-          </a:xfrm>
-        </p:spPr>
-        <p:txBody>
-          <a:bodyPr>
-            <a:normAutofit fontScale="77500" lnSpcReduction="20000"/>
-          </a:bodyPr>
-          <a:lstStyle/>
-          <a:p>
-            <a:r>
-              <a:rPr lang="en-US" sz="3100" dirty="0" smtClean="0"/>
-              <a:t>Managing </a:t>
-            </a:r>
-            <a:r>
-              <a:rPr lang="en-US" sz="3100" dirty="0"/>
-              <a:t>Overweight and Obesity in Adults: Systematic Evidence </a:t>
-            </a:r>
-            <a:r>
-              <a:rPr lang="en-US" sz="3100" dirty="0" smtClean="0"/>
-              <a:t>Review from </a:t>
-            </a:r>
-            <a:r>
-              <a:rPr lang="en-US" sz="3100" dirty="0"/>
-              <a:t>the Obesity Expert Panel. </a:t>
-            </a:r>
-            <a:r>
-              <a:rPr lang="en-US" sz="3100" u="sng" dirty="0" smtClean="0">
-                <a:hlinkClick r:id="rId3" tooltip="Link to External Web Site"/>
-              </a:rPr>
-              <a:t>www.nhlbi.nih.gov/sites/www.nhlbi.nih.gov/files/obesity-evidence-review.pdf[PDF </a:t>
-            </a:r>
-            <a:r>
-              <a:rPr lang="en-US" sz="3100" u="sng" dirty="0">
-                <a:hlinkClick r:id="rId3" tooltip="Link to External Web Site"/>
-              </a:rPr>
-              <a:t>- 93KB]</a:t>
-            </a:r>
-            <a:endParaRPr lang="en-US" sz="3100" dirty="0"/>
-          </a:p>
-          <a:p>
-            <a:r>
-              <a:rPr lang="en-US" sz="3100" dirty="0" smtClean="0"/>
-              <a:t>Clinical </a:t>
-            </a:r>
-            <a:r>
-              <a:rPr lang="en-US" sz="3100" dirty="0"/>
-              <a:t>Guidelines on the Identification, Evaluation, and Treatment of Overweight and Obesity in </a:t>
-            </a:r>
-            <a:r>
-              <a:rPr lang="en-US" sz="3100" dirty="0" smtClean="0"/>
-              <a:t>Adults</a:t>
-            </a:r>
-            <a:r>
-              <a:rPr lang="en-US" sz="3100" u="sng" dirty="0" smtClean="0">
-                <a:hlinkClick r:id="rId4" tooltip="Link to External Web Site"/>
-              </a:rPr>
-              <a:t> www.nhlbi.nih.gov/files/docs/guidelines/ob_gdlns.pdf[PDF </a:t>
-            </a:r>
-            <a:r>
-              <a:rPr lang="en-US" sz="3100" u="sng" dirty="0">
-                <a:hlinkClick r:id="rId4" tooltip="Link to External Web Site"/>
-              </a:rPr>
-              <a:t>- 2MB]</a:t>
-            </a:r>
-            <a:endParaRPr lang="en-US" sz="3100" dirty="0"/>
-          </a:p>
-          <a:p>
-            <a:r>
-              <a:rPr lang="en-US" sz="3100" dirty="0" smtClean="0"/>
-              <a:t>U.S</a:t>
-            </a:r>
-            <a:r>
-              <a:rPr lang="en-US" sz="3100" dirty="0"/>
-              <a:t>. Department of Health and Human </a:t>
-            </a:r>
-            <a:r>
-              <a:rPr lang="en-US" sz="3100" dirty="0" smtClean="0"/>
-              <a:t>Services, Office </a:t>
-            </a:r>
-            <a:r>
-              <a:rPr lang="en-US" sz="3100" dirty="0"/>
-              <a:t>of Disease Prevention and Health </a:t>
-            </a:r>
-            <a:r>
-              <a:rPr lang="en-US" sz="3100" dirty="0" smtClean="0"/>
-              <a:t>Promotion, </a:t>
-            </a:r>
-            <a:r>
-              <a:rPr lang="en-US" sz="3100" i="1" dirty="0"/>
-              <a:t>2008 Physical Activity Guidelines for </a:t>
-            </a:r>
-            <a:r>
-              <a:rPr lang="en-US" sz="3100" i="1" dirty="0" smtClean="0"/>
-              <a:t>Americans</a:t>
-            </a:r>
-          </a:p>
-          <a:p>
-            <a:r>
-              <a:rPr lang="en-US" sz="3100" dirty="0" smtClean="0"/>
-              <a:t>My Plate </a:t>
-            </a:r>
-            <a:r>
-              <a:rPr lang="en-US" sz="3100" dirty="0" smtClean="0">
-                <a:hlinkClick r:id="rId5"/>
-              </a:rPr>
-              <a:t>www.choosemyplate.gov</a:t>
-            </a:r>
-            <a:endParaRPr lang="en-US" sz="3100" dirty="0" smtClean="0"/>
-          </a:p>
-          <a:p>
-            <a:r>
-              <a:rPr lang="en-US" sz="3100" dirty="0" smtClean="0"/>
-              <a:t>Center for Disease Control </a:t>
-            </a:r>
-          </a:p>
-          <a:p>
-            <a:r>
-              <a:rPr lang="en-US" sz="3100" dirty="0" smtClean="0"/>
-              <a:t>Harvard School of Public Health</a:t>
-            </a:r>
-          </a:p>
-          <a:p>
-            <a:endParaRPr lang="en-US" dirty="0"/>
-          </a:p>
-          <a:p>
-            <a:endParaRPr lang="en-US" dirty="0" smtClean="0"/>
-          </a:p>
-          <a:p>
-            <a:endParaRPr lang="en-US" dirty="0"/>
-          </a:p>
-        </p:txBody>
-      </p:sp>
-      <p:sp>
-        <p:nvSpPr>
-          <p:cNvPr id="5" name="Slide Number Placeholder 4"/>
-          <p:cNvSpPr>
-            <a:spLocks noGrp="1"/>
-          </p:cNvSpPr>
-          <p:nvPr>
-            <p:ph type="sldNum" sz="quarter" idx="12"/>
-          </p:nvPr>
-        </p:nvSpPr>
-        <p:spPr/>
-        <p:txBody>
-          <a:bodyPr>
-            <a:normAutofit fontScale="85000" lnSpcReduction="20000"/>
-          </a:bodyPr>
-          <a:lstStyle/>
-          <a:p>
-            <a:fld id="{0550DE80-A55D-4FEA-ABCE-0175392B4432}" type="slidenum">
-              <a:rPr lang="en-US" smtClean="0"/>
-              <a:t>7</a:t>
-            </a:fld>
-            <a:endParaRPr lang="en-US" dirty="0"/>
-          </a:p>
-        </p:txBody>
-      </p:sp>
-    </p:spTree>
-    <p:extLst>
-      <p:ext uri="{BB962C8B-B14F-4D97-AF65-F5344CB8AC3E}">
-        <p14:creationId xmlns:p14="http://schemas.microsoft.com/office/powerpoint/2010/main" val="20209268"/>
       </p:ext>
     </p:extLst>
   </p:cSld>

</xml_diff>

<commit_message>
all columns are now addressed by name, not by number
</commit_message>
<xml_diff>
--- a/exampleOutput.pptx
+++ b/exampleOutput.pptx
@@ -5,13 +5,19 @@
     <p:sldMasterId id="2147483996" r:id="rId1"/>
   </p:sldMasterIdLst>
   <p:notesMasterIdLst>
-    <p:notesMasterId r:id="rId3"/>
+    <p:notesMasterId r:id="rId9"/>
   </p:notesMasterIdLst>
   <p:handoutMasterIdLst>
-    <p:handoutMasterId r:id="rId4"/>
+    <p:handoutMasterId r:id="rId10"/>
   </p:handoutMasterIdLst>
   <p:sldIdLst>
-    <p:sldId id="259" r:id="rId2"/>
+    <p:sldId id="256" r:id="rId2"/>
+    <p:sldId id="273" r:id="rId3"/>
+    <p:sldId id="276" r:id="rId4"/>
+    <p:sldId id="259" r:id="rId5"/>
+    <p:sldId id="274" r:id="rId6"/>
+    <p:sldId id="275" r:id="rId7"/>
+    <p:sldId id="258" r:id="rId8"/>
   </p:sldIdLst>
   <p:sldSz cx="9144000" cy="6858000" type="screen4x3"/>
   <p:notesSz cx="9296400" cy="7010400"/>
@@ -129,6 +135,526 @@
 </p:presentation>
 </file>
 
+<file path=ppt/charts/chart1.xml><?xml version="1.0" encoding="utf-8"?>
+<c:chartSpace xmlns:c="http://schemas.openxmlformats.org/drawingml/2006/chart" xmlns:a="http://schemas.openxmlformats.org/drawingml/2006/main" xmlns:r="http://schemas.openxmlformats.org/officeDocument/2006/relationships">
+  <c:chart>
+    <c:plotArea>
+      <c:pieChart>
+        <c:varyColors val="1"/>
+        <c:ser>
+          <c:idx val="0"/>
+          <c:order val="0"/>
+          <c:tx>
+            <c:strRef>
+              <c:f>Sheet1!$B$1</c:f>
+              <c:strCache>
+                <c:ptCount val="1"/>
+                <c:pt idx="0">
+                  <c:v>Series 1</c:v>
+                </c:pt>
+              </c:strCache>
+            </c:strRef>
+          </c:tx>
+          <c:cat>
+            <c:strRef>
+              <c:f>Sheet1!$A$2:$A$3</c:f>
+              <c:strCache>
+                <c:ptCount val="2"/>
+                <c:pt idx="0">
+                  <c:v>male</c:v>
+                </c:pt>
+                <c:pt idx="1">
+                  <c:v>female</c:v>
+                </c:pt>
+              </c:strCache>
+            </c:strRef>
+          </c:cat>
+          <c:val>
+            <c:numRef>
+              <c:f>Sheet1!$B$2:$B$3</c:f>
+              <c:numCache>
+                <c:formatCode>General</c:formatCode>
+                <c:ptCount val="2"/>
+                <c:pt idx="0">
+                  <c:v>16</c:v>
+                </c:pt>
+                <c:pt idx="1">
+                  <c:v>32</c:v>
+                </c:pt>
+              </c:numCache>
+            </c:numRef>
+          </c:val>
+        </c:ser>
+        <c:dLbls>
+          <c:numFmt formatCode="0%" sourceLinked="0"/>
+          <c:dLblPos val="outEnd"/>
+          <c:showLegendKey val="0"/>
+          <c:showVal val="1"/>
+          <c:showCatName val="0"/>
+          <c:showSerName val="0"/>
+          <c:showPercent val="0"/>
+          <c:showBubbleSize val="0"/>
+        </c:dLbls>
+      </c:pieChart>
+    </c:plotArea>
+    <c:legend>
+      <c:legendPos val="b"/>
+      <c:overlay val="0"/>
+    </c:legend>
+  </c:chart>
+  <c:txPr>
+    <a:bodyPr/>
+    <a:lstStyle/>
+    <a:p>
+      <a:pPr>
+        <a:defRPr sz="1800"/>
+      </a:pPr>
+      <a:endParaRPr lang="en-US"/>
+    </a:p>
+  </c:txPr>
+  <c:externalData r:id="rId1">
+    <c:autoUpdate val="0"/>
+  </c:externalData>
+</c:chartSpace>
+</file>
+
+<file path=ppt/charts/chart2.xml><?xml version="1.0" encoding="utf-8"?>
+<c:chartSpace xmlns:c="http://schemas.openxmlformats.org/drawingml/2006/chart" xmlns:a="http://schemas.openxmlformats.org/drawingml/2006/main" xmlns:r="http://schemas.openxmlformats.org/officeDocument/2006/relationships">
+  <c:chart>
+    <c:plotArea>
+      <c:lineChart>
+        <c:grouping val="standard"/>
+        <c:ser>
+          <c:idx val="0"/>
+          <c:order val="0"/>
+          <c:tx>
+            <c:strRef>
+              <c:f>Sheet1!$B$1</c:f>
+              <c:strCache>
+                <c:ptCount val="1"/>
+                <c:pt idx="0">
+                  <c:v>F`</c:v>
+                </c:pt>
+              </c:strCache>
+            </c:strRef>
+          </c:tx>
+          <c:marker>
+            <c:symbol val="none"/>
+          </c:marker>
+          <c:cat>
+            <c:strRef>
+              <c:f>Sheet1!$A$2:$A$4</c:f>
+              <c:strCache>
+                <c:ptCount val="3"/>
+                <c:pt idx="0">
+                  <c:v>2016</c:v>
+                </c:pt>
+                <c:pt idx="1">
+                  <c:v>2015</c:v>
+                </c:pt>
+                <c:pt idx="2">
+                  <c:v>2014</c:v>
+                </c:pt>
+              </c:strCache>
+            </c:strRef>
+          </c:cat>
+          <c:val>
+            <c:numRef>
+              <c:f>Sheet1!$B$2:$B$4</c:f>
+              <c:numCache>
+                <c:formatCode>General</c:formatCode>
+                <c:ptCount val="3"/>
+                <c:pt idx="0">
+                  <c:v>0</c:v>
+                </c:pt>
+                <c:pt idx="1">
+                  <c:v>0</c:v>
+                </c:pt>
+                <c:pt idx="2">
+                  <c:v>1</c:v>
+                </c:pt>
+              </c:numCache>
+            </c:numRef>
+          </c:val>
+          <c:smooth val="0"/>
+        </c:ser>
+        <c:ser>
+          <c:idx val="1"/>
+          <c:order val="1"/>
+          <c:tx>
+            <c:strRef>
+              <c:f>Sheet1!$C$1</c:f>
+              <c:strCache>
+                <c:ptCount val="1"/>
+                <c:pt idx="0">
+                  <c:v>M,</c:v>
+                </c:pt>
+              </c:strCache>
+            </c:strRef>
+          </c:tx>
+          <c:marker>
+            <c:symbol val="none"/>
+          </c:marker>
+          <c:cat>
+            <c:strRef>
+              <c:f>Sheet1!$A$2:$A$4</c:f>
+              <c:strCache>
+                <c:ptCount val="3"/>
+                <c:pt idx="0">
+                  <c:v>2016</c:v>
+                </c:pt>
+                <c:pt idx="1">
+                  <c:v>2015</c:v>
+                </c:pt>
+                <c:pt idx="2">
+                  <c:v>2014</c:v>
+                </c:pt>
+              </c:strCache>
+            </c:strRef>
+          </c:cat>
+          <c:val>
+            <c:numRef>
+              <c:f>Sheet1!$C$2:$C$4</c:f>
+              <c:numCache>
+                <c:formatCode>General</c:formatCode>
+                <c:ptCount val="3"/>
+                <c:pt idx="0">
+                  <c:v>0</c:v>
+                </c:pt>
+                <c:pt idx="1">
+                  <c:v>0</c:v>
+                </c:pt>
+                <c:pt idx="2">
+                  <c:v>1</c:v>
+                </c:pt>
+              </c:numCache>
+            </c:numRef>
+          </c:val>
+          <c:smooth val="0"/>
+        </c:ser>
+        <c:ser>
+          <c:idx val="2"/>
+          <c:order val="2"/>
+          <c:tx>
+            <c:strRef>
+              <c:f>Sheet1!$D$1</c:f>
+              <c:strCache>
+                <c:ptCount val="1"/>
+                <c:pt idx="0">
+                  <c:v>male</c:v>
+                </c:pt>
+              </c:strCache>
+            </c:strRef>
+          </c:tx>
+          <c:marker>
+            <c:symbol val="none"/>
+          </c:marker>
+          <c:cat>
+            <c:strRef>
+              <c:f>Sheet1!$A$2:$A$4</c:f>
+              <c:strCache>
+                <c:ptCount val="3"/>
+                <c:pt idx="0">
+                  <c:v>2016</c:v>
+                </c:pt>
+                <c:pt idx="1">
+                  <c:v>2015</c:v>
+                </c:pt>
+                <c:pt idx="2">
+                  <c:v>2014</c:v>
+                </c:pt>
+              </c:strCache>
+            </c:strRef>
+          </c:cat>
+          <c:val>
+            <c:numRef>
+              <c:f>Sheet1!$D$2:$D$4</c:f>
+              <c:numCache>
+                <c:formatCode>General</c:formatCode>
+                <c:ptCount val="3"/>
+                <c:pt idx="0">
+                  <c:v>16</c:v>
+                </c:pt>
+                <c:pt idx="1">
+                  <c:v>18</c:v>
+                </c:pt>
+                <c:pt idx="2">
+                  <c:v>15</c:v>
+                </c:pt>
+              </c:numCache>
+            </c:numRef>
+          </c:val>
+          <c:smooth val="0"/>
+        </c:ser>
+        <c:ser>
+          <c:idx val="3"/>
+          <c:order val="3"/>
+          <c:tx>
+            <c:strRef>
+              <c:f>Sheet1!$E$1</c:f>
+              <c:strCache>
+                <c:ptCount val="1"/>
+                <c:pt idx="0">
+                  <c:v>Male</c:v>
+                </c:pt>
+              </c:strCache>
+            </c:strRef>
+          </c:tx>
+          <c:marker>
+            <c:symbol val="none"/>
+          </c:marker>
+          <c:cat>
+            <c:strRef>
+              <c:f>Sheet1!$A$2:$A$4</c:f>
+              <c:strCache>
+                <c:ptCount val="3"/>
+                <c:pt idx="0">
+                  <c:v>2016</c:v>
+                </c:pt>
+                <c:pt idx="1">
+                  <c:v>2015</c:v>
+                </c:pt>
+                <c:pt idx="2">
+                  <c:v>2014</c:v>
+                </c:pt>
+              </c:strCache>
+            </c:strRef>
+          </c:cat>
+          <c:val>
+            <c:numRef>
+              <c:f>Sheet1!$E$2:$E$4</c:f>
+              <c:numCache>
+                <c:formatCode>General</c:formatCode>
+                <c:ptCount val="3"/>
+                <c:pt idx="0">
+                  <c:v>0</c:v>
+                </c:pt>
+                <c:pt idx="1">
+                  <c:v>0</c:v>
+                </c:pt>
+                <c:pt idx="2">
+                  <c:v>1</c:v>
+                </c:pt>
+              </c:numCache>
+            </c:numRef>
+          </c:val>
+          <c:smooth val="0"/>
+        </c:ser>
+        <c:ser>
+          <c:idx val="4"/>
+          <c:order val="4"/>
+          <c:tx>
+            <c:strRef>
+              <c:f>Sheet1!$F$1</c:f>
+              <c:strCache>
+                <c:ptCount val="1"/>
+                <c:pt idx="0">
+                  <c:v>female</c:v>
+                </c:pt>
+              </c:strCache>
+            </c:strRef>
+          </c:tx>
+          <c:marker>
+            <c:symbol val="none"/>
+          </c:marker>
+          <c:cat>
+            <c:strRef>
+              <c:f>Sheet1!$A$2:$A$4</c:f>
+              <c:strCache>
+                <c:ptCount val="3"/>
+                <c:pt idx="0">
+                  <c:v>2016</c:v>
+                </c:pt>
+                <c:pt idx="1">
+                  <c:v>2015</c:v>
+                </c:pt>
+                <c:pt idx="2">
+                  <c:v>2014</c:v>
+                </c:pt>
+              </c:strCache>
+            </c:strRef>
+          </c:cat>
+          <c:val>
+            <c:numRef>
+              <c:f>Sheet1!$F$2:$F$4</c:f>
+              <c:numCache>
+                <c:formatCode>General</c:formatCode>
+                <c:ptCount val="3"/>
+                <c:pt idx="0">
+                  <c:v>32</c:v>
+                </c:pt>
+                <c:pt idx="1">
+                  <c:v>31</c:v>
+                </c:pt>
+                <c:pt idx="2">
+                  <c:v>30</c:v>
+                </c:pt>
+              </c:numCache>
+            </c:numRef>
+          </c:val>
+          <c:smooth val="0"/>
+        </c:ser>
+        <c:marker val="1"/>
+        <c:axId val="2118791784"/>
+        <c:axId val="2140495176"/>
+      </c:lineChart>
+      <c:catAx>
+        <c:axId val="2118791784"/>
+        <c:scaling/>
+        <c:delete val="0"/>
+        <c:axPos val="b"/>
+        <c:majorTickMark val="out"/>
+        <c:minorTickMark val="none"/>
+        <c:tickLblPos val="nextTo"/>
+        <c:crossAx val="2140495176"/>
+        <c:crosses val="autoZero"/>
+        <c:lblAlgn val="ctr"/>
+        <c:lblOffset val="100"/>
+        <c:noMultiLvlLbl val="0"/>
+      </c:catAx>
+      <c:valAx>
+        <c:axId val="2140495176"/>
+        <c:scaling/>
+        <c:delete val="0"/>
+        <c:axPos val="l"/>
+        <c:majorGridlines/>
+        <c:majorTickMark val="out"/>
+        <c:minorTickMark val="none"/>
+        <c:tickLblPos val="nextTo"/>
+        <c:crossAx val="2118791784"/>
+        <c:crosses val="autoZero"/>
+      </c:valAx>
+    </c:plotArea>
+    <c:legend>
+      <c:overlay val="0"/>
+    </c:legend>
+  </c:chart>
+  <c:txPr>
+    <a:bodyPr/>
+    <a:lstStyle/>
+    <a:p>
+      <a:pPr>
+        <a:defRPr sz="1800"/>
+      </a:pPr>
+      <a:endParaRPr lang="en-US"/>
+    </a:p>
+  </c:txPr>
+  <c:externalData r:id="rId1">
+    <c:autoUpdate val="0"/>
+  </c:externalData>
+</c:chartSpace>
+</file>
+
+<file path=ppt/charts/chart3.xml><?xml version="1.0" encoding="utf-8"?>
+<c:chartSpace xmlns:c="http://schemas.openxmlformats.org/drawingml/2006/chart" xmlns:a="http://schemas.openxmlformats.org/drawingml/2006/main" xmlns:r="http://schemas.openxmlformats.org/officeDocument/2006/relationships">
+  <c:chart>
+    <c:plotArea>
+      <c:barChart>
+        <c:barDir val="col"/>
+        <c:grouping val="clustered"/>
+        <c:ser>
+          <c:idx val="0"/>
+          <c:order val="0"/>
+          <c:tx>
+            <c:strRef>
+              <c:f>Sheet1!$B$1</c:f>
+              <c:strCache>
+                <c:ptCount val="1"/>
+                <c:pt idx="0">
+                  <c:v>Series 1</c:v>
+                </c:pt>
+              </c:strCache>
+            </c:strRef>
+          </c:tx>
+          <c:cat>
+            <c:strRef>
+              <c:f>Sheet1!$A$2:$A$5</c:f>
+              <c:strCache>
+                <c:ptCount val="4"/>
+                <c:pt idx="0">
+                  <c:v>Optimal</c:v>
+                </c:pt>
+                <c:pt idx="1">
+                  <c:v>LESS THAN OPTIMAL</c:v>
+                </c:pt>
+                <c:pt idx="2">
+                  <c:v>Low</c:v>
+                </c:pt>
+                <c:pt idx="3">
+                  <c:v>LESS THAN OPTIAL</c:v>
+                </c:pt>
+              </c:strCache>
+            </c:strRef>
+          </c:cat>
+          <c:val>
+            <c:numRef>
+              <c:f>Sheet1!$B$2:$B$5</c:f>
+              <c:numCache>
+                <c:formatCode>General</c:formatCode>
+                <c:ptCount val="4"/>
+                <c:pt idx="0">
+                  <c:v>19</c:v>
+                </c:pt>
+                <c:pt idx="1">
+                  <c:v>12</c:v>
+                </c:pt>
+                <c:pt idx="2">
+                  <c:v>16</c:v>
+                </c:pt>
+                <c:pt idx="3">
+                  <c:v>1</c:v>
+                </c:pt>
+              </c:numCache>
+            </c:numRef>
+          </c:val>
+        </c:ser>
+        <c:axId val="-2068027336"/>
+        <c:axId val="-2113994440"/>
+      </c:barChart>
+      <c:catAx>
+        <c:axId val="-2068027336"/>
+        <c:scaling/>
+        <c:delete val="0"/>
+        <c:axPos val="b"/>
+        <c:majorTickMark val="out"/>
+        <c:minorTickMark val="none"/>
+        <c:tickLblPos val="nextTo"/>
+        <c:crossAx val="-2113994440"/>
+        <c:crosses val="autoZero"/>
+        <c:lblAlgn val="ctr"/>
+        <c:lblOffset val="100"/>
+        <c:noMultiLvlLbl val="0"/>
+      </c:catAx>
+      <c:valAx>
+        <c:axId val="-2113994440"/>
+        <c:scaling/>
+        <c:delete val="0"/>
+        <c:axPos val="l"/>
+        <c:majorGridlines/>
+        <c:majorTickMark val="out"/>
+        <c:minorTickMark val="none"/>
+        <c:tickLblPos val="nextTo"/>
+        <c:crossAx val="-2068027336"/>
+        <c:crosses val="autoZero"/>
+      </c:valAx>
+    </c:plotArea>
+  </c:chart>
+  <c:txPr>
+    <a:bodyPr/>
+    <a:lstStyle/>
+    <a:p>
+      <a:pPr>
+        <a:defRPr sz="1800"/>
+      </a:pPr>
+      <a:endParaRPr lang="en-US"/>
+    </a:p>
+  </c:txPr>
+  <c:externalData r:id="rId1">
+    <c:autoUpdate val="0"/>
+  </c:externalData>
+</c:chartSpace>
+</file>
+
 <file path=ppt/handoutMasters/handoutMaster1.xml><?xml version="1.0" encoding="utf-8"?>
 <p:handoutMaster xmlns:a="http://schemas.openxmlformats.org/drawingml/2006/main" xmlns:r="http://schemas.openxmlformats.org/officeDocument/2006/relationships" xmlns:p="http://schemas.openxmlformats.org/presentationml/2006/main">
   <p:cSld>
@@ -211,7 +737,7 @@
           <a:p>
             <a:fld id="{AAB9D47E-67C1-4E1B-91B6-1C4A4CD91A70}" type="datetimeFigureOut">
               <a:rPr lang="en-US" smtClean="0"/>
-              <a:t>11/27/2016</a:t>
+              <a:t>11/29/2016</a:t>
             </a:fld>
             <a:endParaRPr lang="en-US" dirty="0"/>
           </a:p>
@@ -376,7 +902,7 @@
           <a:p>
             <a:fld id="{D43B9A28-89AB-4FF7-B6F7-B576186B66F1}" type="datetimeFigureOut">
               <a:rPr lang="en-US" smtClean="0"/>
-              <a:t>11/27/2016</a:t>
+              <a:t>11/29/2016</a:t>
             </a:fld>
             <a:endParaRPr lang="en-US" dirty="0"/>
           </a:p>
@@ -644,6 +1170,98 @@
 </p:notesMaster>
 </file>
 
+<file path=ppt/notesSlides/notesSlide1.xml><?xml version="1.0" encoding="utf-8"?>
+<p:notes xmlns:a="http://schemas.openxmlformats.org/drawingml/2006/main" xmlns:r="http://schemas.openxmlformats.org/officeDocument/2006/relationships" xmlns:p="http://schemas.openxmlformats.org/presentationml/2006/main">
+  <p:cSld>
+    <p:spTree>
+      <p:nvGrpSpPr>
+        <p:cNvPr id="1" name=""/>
+        <p:cNvGrpSpPr/>
+        <p:nvPr/>
+      </p:nvGrpSpPr>
+      <p:grpSpPr>
+        <a:xfrm>
+          <a:off x="0" y="0"/>
+          <a:ext cx="0" cy="0"/>
+          <a:chOff x="0" y="0"/>
+          <a:chExt cx="0" cy="0"/>
+        </a:xfrm>
+      </p:grpSpPr>
+      <p:sp>
+        <p:nvSpPr>
+          <p:cNvPr id="2" name="Slide Image Placeholder 1"/>
+          <p:cNvSpPr>
+            <a:spLocks noGrp="1" noRot="1" noChangeAspect="1"/>
+          </p:cNvSpPr>
+          <p:nvPr>
+            <p:ph type="sldImg"/>
+          </p:nvPr>
+        </p:nvSpPr>
+        <p:spPr/>
+      </p:sp>
+      <p:sp>
+        <p:nvSpPr>
+          <p:cNvPr id="3" name="Notes Placeholder 2"/>
+          <p:cNvSpPr>
+            <a:spLocks noGrp="1"/>
+          </p:cNvSpPr>
+          <p:nvPr>
+            <p:ph type="body" idx="1"/>
+          </p:nvPr>
+        </p:nvSpPr>
+        <p:spPr/>
+        <p:txBody>
+          <a:bodyPr/>
+          <a:lstStyle/>
+          <a:p>
+            <a:r>
+              <a:rPr lang="en-US" dirty="0" smtClean="0"/>
+              <a:t>SB Note: I’d like</a:t>
+            </a:r>
+            <a:r>
+              <a:rPr lang="en-US" baseline="0" dirty="0" smtClean="0"/>
+              <a:t> this page to be about where we got the info.  But also where they can go to read more. What others should we include?  What would be nice, actually, is if we had a resource page for each factor we tested and we could put it at the bottom of each slide!</a:t>
+            </a:r>
+            <a:endParaRPr lang="en-US" dirty="0"/>
+          </a:p>
+        </p:txBody>
+      </p:sp>
+      <p:sp>
+        <p:nvSpPr>
+          <p:cNvPr id="4" name="Slide Number Placeholder 3"/>
+          <p:cNvSpPr>
+            <a:spLocks noGrp="1"/>
+          </p:cNvSpPr>
+          <p:nvPr>
+            <p:ph type="sldNum" sz="quarter" idx="10"/>
+          </p:nvPr>
+        </p:nvSpPr>
+        <p:spPr/>
+        <p:txBody>
+          <a:bodyPr/>
+          <a:lstStyle/>
+          <a:p>
+            <a:fld id="{3F33A409-1646-4137-A75F-3A02A90E5C52}" type="slidenum">
+              <a:rPr lang="en-US" smtClean="0"/>
+              <a:t>7</a:t>
+            </a:fld>
+            <a:endParaRPr lang="en-US" dirty="0"/>
+          </a:p>
+        </p:txBody>
+      </p:sp>
+    </p:spTree>
+    <p:extLst>
+      <p:ext uri="{BB962C8B-B14F-4D97-AF65-F5344CB8AC3E}">
+        <p14:creationId xmlns:p14="http://schemas.microsoft.com/office/powerpoint/2010/main" val="3005467066"/>
+      </p:ext>
+    </p:extLst>
+  </p:cSld>
+  <p:clrMapOvr>
+    <a:masterClrMapping/>
+  </p:clrMapOvr>
+</p:notes>
+</file>
+
 <file path=ppt/slideLayouts/slideLayout1.xml><?xml version="1.0" encoding="utf-8"?>
 <p:sldLayout xmlns:a="http://schemas.openxmlformats.org/drawingml/2006/main" xmlns:r="http://schemas.openxmlformats.org/officeDocument/2006/relationships" xmlns:p="http://schemas.openxmlformats.org/presentationml/2006/main" showMasterSp="0" type="title" preserve="1">
   <p:cSld name="Title Slide">
@@ -935,7 +1553,7 @@
           <a:p>
             <a:fld id="{EB9FD57E-C399-49A5-9E41-A3349D7DE35B}" type="datetime1">
               <a:rPr lang="en-US" smtClean="0"/>
-              <a:t>11/27/2016</a:t>
+              <a:t>11/29/2016</a:t>
             </a:fld>
             <a:endParaRPr lang="en-US" dirty="0"/>
           </a:p>
@@ -1126,7 +1744,7 @@
           <a:p>
             <a:fld id="{FCEC67C6-3403-4BFB-8B45-9DB8B05CDF67}" type="datetime1">
               <a:rPr lang="en-US" smtClean="0"/>
-              <a:t>11/27/2016</a:t>
+              <a:t>11/29/2016</a:t>
             </a:fld>
             <a:endParaRPr lang="en-US" dirty="0"/>
           </a:p>
@@ -1311,7 +1929,7 @@
           <a:p>
             <a:fld id="{12BE4818-FD7D-4705-B5B3-0E204E7B8767}" type="datetime1">
               <a:rPr lang="en-US" smtClean="0"/>
-              <a:t>11/27/2016</a:t>
+              <a:t>11/29/2016</a:t>
             </a:fld>
             <a:endParaRPr lang="en-US" dirty="0"/>
           </a:p>
@@ -1574,7 +2192,7 @@
           <a:p>
             <a:fld id="{461E0769-57AC-4935-8715-988FC8288D8B}" type="datetime1">
               <a:rPr lang="en-US" smtClean="0"/>
-              <a:t>11/27/2016</a:t>
+              <a:t>11/29/2016</a:t>
             </a:fld>
             <a:endParaRPr lang="en-US" dirty="0"/>
           </a:p>
@@ -1990,7 +2608,7 @@
           <a:p>
             <a:fld id="{CB4DF6D8-D059-4E6F-9489-47A7683AE661}" type="datetime1">
               <a:rPr lang="en-US" smtClean="0"/>
-              <a:t>11/27/2016</a:t>
+              <a:t>11/29/2016</a:t>
             </a:fld>
             <a:endParaRPr lang="en-US" dirty="0"/>
           </a:p>
@@ -2232,7 +2850,7 @@
           <a:p>
             <a:fld id="{3DF2A073-D756-4989-BBD7-7130788C34CA}" type="datetime1">
               <a:rPr lang="en-US" smtClean="0"/>
-              <a:t>11/27/2016</a:t>
+              <a:t>11/29/2016</a:t>
             </a:fld>
             <a:endParaRPr lang="en-US" dirty="0"/>
           </a:p>
@@ -2468,7 +3086,7 @@
           <a:p>
             <a:fld id="{C7812262-0143-4593-8ABE-7E4B68DA324A}" type="datetime1">
               <a:rPr lang="en-US" smtClean="0"/>
-              <a:t>11/27/2016</a:t>
+              <a:t>11/29/2016</a:t>
             </a:fld>
             <a:endParaRPr lang="en-US" dirty="0"/>
           </a:p>
@@ -2663,7 +3281,7 @@
           <a:p>
             <a:fld id="{9444DF3C-DB17-4177-83A1-1F4CFF0BDA1F}" type="datetime1">
               <a:rPr lang="en-US" smtClean="0"/>
-              <a:t>11/27/2016</a:t>
+              <a:t>11/29/2016</a:t>
             </a:fld>
             <a:endParaRPr lang="en-US" dirty="0"/>
           </a:p>
@@ -2761,7 +3379,7 @@
           <a:p>
             <a:fld id="{F6C8DF98-0850-4199-9763-F5AC2123D534}" type="datetime1">
               <a:rPr lang="en-US" smtClean="0"/>
-              <a:t>11/27/2016</a:t>
+              <a:t>11/29/2016</a:t>
             </a:fld>
             <a:endParaRPr lang="en-US" dirty="0"/>
           </a:p>
@@ -2897,7 +3515,7 @@
           <a:p>
             <a:fld id="{01D547BE-D041-448C-ACAF-73E0E93ABA79}" type="datetime1">
               <a:rPr lang="en-US" smtClean="0"/>
-              <a:t>11/27/2016</a:t>
+              <a:t>11/29/2016</a:t>
             </a:fld>
             <a:endParaRPr lang="en-US" dirty="0"/>
           </a:p>
@@ -3415,7 +4033,7 @@
           <a:p>
             <a:fld id="{578863BF-C007-49B5-9EBC-83335D3595B0}" type="datetime1">
               <a:rPr lang="en-US" smtClean="0"/>
-              <a:t>11/27/2016</a:t>
+              <a:t>11/29/2016</a:t>
             </a:fld>
             <a:endParaRPr lang="en-US" dirty="0"/>
           </a:p>
@@ -3676,7 +4294,7 @@
           <a:p>
             <a:fld id="{3AD18C84-CE91-4C35-A0EF-F805A78F094C}" type="datetime1">
               <a:rPr lang="en-US" smtClean="0"/>
-              <a:t>11/27/2016</a:t>
+              <a:t>11/29/2016</a:t>
             </a:fld>
             <a:endParaRPr lang="en-US" dirty="0"/>
           </a:p>
@@ -4223,6 +4841,96 @@
             <a:spLocks noGrp="1"/>
           </p:cNvSpPr>
           <p:nvPr>
+            <p:ph type="ctrTitle"/>
+          </p:nvPr>
+        </p:nvSpPr>
+        <p:spPr>
+          <a:xfrm>
+            <a:off x="0" y="4038600"/>
+            <a:ext cx="7848600" cy="1828800"/>
+          </a:xfrm>
+        </p:spPr>
+        <p:txBody>
+          <a:bodyPr>
+            <a:normAutofit fontScale="90000"/>
+          </a:bodyPr>
+          <a:lstStyle/>
+          <a:p>
+            <a:r>
+              <a:rPr lang="en-US" dirty="0" smtClean="0"/>
+              <a:t>White Castle Biometric Health Screening Aggregate Summary</a:t>
+            </a:r>
+            <a:endParaRPr lang="en-US" dirty="0"/>
+          </a:p>
+        </p:txBody>
+      </p:sp>
+      <p:sp>
+        <p:nvSpPr>
+          <p:cNvPr id="3" name="Subtitle 2"/>
+          <p:cNvSpPr>
+            <a:spLocks noGrp="1"/>
+          </p:cNvSpPr>
+          <p:nvPr>
+            <p:ph type="subTitle" idx="1"/>
+          </p:nvPr>
+        </p:nvSpPr>
+        <p:spPr/>
+        <p:txBody>
+          <a:bodyPr/>
+          <a:lstStyle/>
+          <a:p>
+            <a:r>
+              <a:rPr lang="en-US" dirty="0" smtClean="0"/>
+              <a:t>Compiled by LifeCare Alliance</a:t>
+            </a:r>
+            <a:endParaRPr lang="en-US" dirty="0"/>
+          </a:p>
+        </p:txBody>
+      </p:sp>
+    </p:spTree>
+    <p:extLst>
+      <p:ext uri="{BB962C8B-B14F-4D97-AF65-F5344CB8AC3E}">
+        <p14:creationId xmlns:p14="http://schemas.microsoft.com/office/powerpoint/2010/main" val="3398785662"/>
+      </p:ext>
+    </p:extLst>
+  </p:cSld>
+  <p:clrMapOvr>
+    <a:masterClrMapping/>
+  </p:clrMapOvr>
+  <p:timing>
+    <p:tnLst>
+      <p:par>
+        <p:cTn id="1" dur="indefinite" restart="never" nodeType="tmRoot"/>
+      </p:par>
+    </p:tnLst>
+  </p:timing>
+</p:sld>
+</file>
+
+<file path=ppt/slides/slide2.xml><?xml version="1.0" encoding="utf-8"?>
+<p:sld xmlns:a="http://schemas.openxmlformats.org/drawingml/2006/main" xmlns:r="http://schemas.openxmlformats.org/officeDocument/2006/relationships" xmlns:p="http://schemas.openxmlformats.org/presentationml/2006/main">
+  <p:cSld>
+    <p:spTree>
+      <p:nvGrpSpPr>
+        <p:cNvPr id="1" name=""/>
+        <p:cNvGrpSpPr/>
+        <p:nvPr/>
+      </p:nvGrpSpPr>
+      <p:grpSpPr>
+        <a:xfrm>
+          <a:off x="0" y="0"/>
+          <a:ext cx="0" cy="0"/>
+          <a:chOff x="0" y="0"/>
+          <a:chExt cx="0" cy="0"/>
+        </a:xfrm>
+      </p:grpSpPr>
+      <p:sp>
+        <p:nvSpPr>
+          <p:cNvPr id="2" name="Title 1"/>
+          <p:cNvSpPr>
+            <a:spLocks noGrp="1"/>
+          </p:cNvSpPr>
+          <p:nvPr>
             <p:ph type="title"/>
           </p:nvPr>
         </p:nvSpPr>
@@ -4236,6 +4944,34 @@
               <a:t>Who participated?</a:t>
             </a:r>
             <a:endParaRPr lang="en-US" dirty="0"/>
+          </a:p>
+        </p:txBody>
+      </p:sp>
+      <p:sp>
+        <p:nvSpPr>
+          <p:cNvPr id="3" name="Content Placeholder 2"/>
+          <p:cNvSpPr>
+            <a:spLocks noGrp="1"/>
+          </p:cNvSpPr>
+          <p:nvPr>
+            <p:ph sz="quarter" idx="1"/>
+          </p:nvPr>
+        </p:nvSpPr>
+        <p:spPr>
+          <a:xfrm>
+            <a:off x="381000" y="1600200"/>
+            <a:ext cx="8153400" cy="3886198"/>
+          </a:xfrm>
+        </p:spPr>
+        <p:txBody>
+          <a:bodyPr>
+            <a:normAutofit/>
+          </a:bodyPr>
+          <a:lstStyle/>
+          <a:p>
+            <a:pPr marL="0" indent="0">
+              <a:buNone/>
+            </a:pPr>
           </a:p>
         </p:txBody>
       </p:sp>
@@ -4258,7 +4994,7 @@
           <a:p>
             <a:fld id="{0550DE80-A55D-4FEA-ABCE-0175392B4432}" type="slidenum">
               <a:rPr lang="en-US" smtClean="0"/>
-              <a:t>1</a:t>
+              <a:t>2</a:t>
             </a:fld>
             <a:endParaRPr lang="en-US" dirty="0"/>
           </a:p>
@@ -4266,315 +5002,932 @@
       </p:sp>
       <p:graphicFrame>
         <p:nvGraphicFramePr>
-          <p:cNvPr id="4" name="Table 3"/>
+          <p:cNvPr id="4" name="Chart 3"/>
           <p:cNvGraphicFramePr>
             <a:graphicFrameLocks noGrp="1"/>
           </p:cNvGraphicFramePr>
-          <p:nvPr>
-            <p:extLst>
-              <p:ext uri="{D42A27DB-BD31-4B8C-83A1-F6EECF244321}">
-                <p14:modId xmlns:p14="http://schemas.microsoft.com/office/powerpoint/2010/main" val="4243160473"/>
-              </p:ext>
-            </p:extLst>
-          </p:nvPr>
+          <p:nvPr/>
         </p:nvGraphicFramePr>
         <p:xfrm>
-          <a:off x="1600200" y="4648200"/>
-          <a:ext cx="6096000" cy="3845560"/>
+          <a:off x="1828800" y="1828800"/>
+          <a:ext cx="2743200" cy="3886198"/>
         </p:xfrm>
         <a:graphic>
-          <a:graphicData uri="http://schemas.openxmlformats.org/drawingml/2006/table">
-            <a:tbl>
-              <a:tblPr firstRow="1" bandRow="1">
-                <a:tableStyleId>{5C22544A-7EE6-4342-B048-85BDC9FD1C3A}</a:tableStyleId>
-              </a:tblPr>
-              <a:tblGrid>
-                <a:gridCol w="1016000"/>
-                <a:gridCol w="1016000"/>
-                <a:gridCol w="1016000"/>
-                <a:gridCol w="1016000"/>
-                <a:gridCol w="1016000"/>
-                <a:gridCol w="1016000"/>
-              </a:tblGrid>
-              <a:tr h="370840">
-                <a:tc>
-                  <a:txBody>
-                    <a:bodyPr/>
-                    <a:lstStyle/>
-                    <a:p>
-                      <a:r>
-                        <a:rPr lang="en-US" dirty="0" err="1" smtClean="0"/>
-                        <a:t>qwer</a:t>
-                      </a:r>
-                      <a:endParaRPr lang="en-US" dirty="0"/>
-                    </a:p>
-                  </a:txBody>
-                  <a:tcPr/>
-                </a:tc>
-                <a:tc>
-                  <a:txBody>
-                    <a:bodyPr/>
-                    <a:lstStyle/>
-                    <a:p>
-                      <a:endParaRPr lang="en-US"/>
-                    </a:p>
-                  </a:txBody>
-                  <a:tcPr/>
-                </a:tc>
-                <a:tc>
-                  <a:txBody>
-                    <a:bodyPr/>
-                    <a:lstStyle/>
-                    <a:p>
-                      <a:endParaRPr lang="en-US"/>
-                    </a:p>
-                  </a:txBody>
-                  <a:tcPr/>
-                </a:tc>
-                <a:tc>
-                  <a:txBody>
-                    <a:bodyPr/>
-                    <a:lstStyle/>
-                    <a:p>
-                      <a:endParaRPr lang="en-US"/>
-                    </a:p>
-                  </a:txBody>
-                  <a:tcPr/>
-                </a:tc>
-                <a:tc>
-                  <a:txBody>
-                    <a:bodyPr/>
-                    <a:lstStyle/>
-                    <a:p>
-                      <a:endParaRPr lang="en-US"/>
-                    </a:p>
-                  </a:txBody>
-                  <a:tcPr/>
-                </a:tc>
-                <a:tc>
-                  <a:txBody>
-                    <a:bodyPr/>
-                    <a:lstStyle/>
-                    <a:p>
-                      <a:endParaRPr lang="en-US"/>
-                    </a:p>
-                  </a:txBody>
-                  <a:tcPr/>
-                </a:tc>
-              </a:tr>
-              <a:tr h="370840">
-                <a:tc>
-                  <a:txBody>
-                    <a:bodyPr/>
-                    <a:lstStyle/>
-                    <a:p>
-                      <a:r>
-                        <a:rPr lang="en-US" dirty="0" err="1" smtClean="0"/>
-                        <a:t>asdf</a:t>
-                      </a:r>
-                      <a:endParaRPr lang="en-US" dirty="0"/>
-                    </a:p>
-                  </a:txBody>
-                  <a:tcPr/>
-                </a:tc>
-                <a:tc>
-                  <a:txBody>
-                    <a:bodyPr/>
-                    <a:lstStyle/>
-                    <a:p>
-                      <a:r>
-                        <a:t>32%</a:t>
-                      </a:r>
-                      <a:endParaRPr lang="en-US" dirty="0"/>
-                    </a:p>
-                  </a:txBody>
-                  <a:tcPr/>
-                </a:tc>
-                <a:tc>
-                  <a:txBody>
-                    <a:bodyPr/>
-                    <a:lstStyle/>
-                    <a:p>
-                      <a:pPr marL="0" marR="0" indent="0" algn="l" defTabSz="914400" rtl="0" eaLnBrk="1" fontAlgn="auto" latinLnBrk="0" hangingPunct="1">
-                        <a:lnSpc>
-                          <a:spcPct val="100000"/>
-                        </a:lnSpc>
-                        <a:spcBef>
-                          <a:spcPts val="0"/>
-                        </a:spcBef>
-                        <a:spcAft>
-                          <a:spcPts val="0"/>
-                        </a:spcAft>
-                        <a:buClrTx/>
-                        <a:buSzTx/>
-                        <a:buFontTx/>
-                        <a:buNone/>
-                        <a:tabLst/>
-                        <a:defRPr/>
-                      </a:pPr>
-                      <a:r>
-                        <a:t>28%</a:t>
-                      </a:r>
-                      <a:br/>
-                      <a:endParaRPr lang="en-US" dirty="0" smtClean="0"/>
-                    </a:p>
-                  </a:txBody>
-                  <a:tcPr/>
-                </a:tc>
-                <a:tc>
-                  <a:txBody>
-                    <a:bodyPr/>
-                    <a:lstStyle/>
-                    <a:p>
-                      <a:r>
-                        <a:t>36%</a:t>
-                      </a:r>
-                      <a:br/>
-                      <a:endParaRPr lang="en-US" dirty="0" smtClean="0"/>
-                    </a:p>
-                  </a:txBody>
-                  <a:tcPr/>
-                </a:tc>
-                <a:tc>
-                  <a:txBody>
-                    <a:bodyPr/>
-                    <a:lstStyle/>
-                    <a:p>
-                      <a:endParaRPr lang="en-US"/>
-                    </a:p>
-                  </a:txBody>
-                  <a:tcPr/>
-                </a:tc>
-                <a:tc>
-                  <a:txBody>
-                    <a:bodyPr/>
-                    <a:lstStyle/>
-                    <a:p>
-                      <a:endParaRPr lang="en-US"/>
-                    </a:p>
-                  </a:txBody>
-                  <a:tcPr/>
-                </a:tc>
-              </a:tr>
-              <a:tr h="370840">
-                <a:tc>
-                  <a:txBody>
-                    <a:bodyPr/>
-                    <a:lstStyle/>
-                    <a:p>
-                      <a:r>
-                        <a:rPr lang="en-US" dirty="0" err="1" smtClean="0"/>
-                        <a:t>zxcv</a:t>
-                      </a:r>
-                      <a:endParaRPr lang="en-US" dirty="0"/>
-                    </a:p>
-                  </a:txBody>
-                  <a:tcPr/>
-                </a:tc>
-                <a:tc>
-                  <a:txBody>
-                    <a:bodyPr/>
-                    <a:lstStyle/>
-                    <a:p>
-                      <a:r>
-                        <a:t>65%</a:t>
-                      </a:r>
-                      <a:endParaRPr lang="en-US" sz="800" dirty="0"/>
-                    </a:p>
-                  </a:txBody>
-                  <a:tcPr/>
-                </a:tc>
-                <a:tc>
-                  <a:txBody>
-                    <a:bodyPr/>
-                    <a:lstStyle/>
-                    <a:p>
-                      <a:pPr marL="0" marR="0" indent="0" algn="l" defTabSz="914400" rtl="0" eaLnBrk="1" fontAlgn="auto" latinLnBrk="0" hangingPunct="1">
-                        <a:lnSpc>
-                          <a:spcPct val="100000"/>
-                        </a:lnSpc>
-                        <a:spcBef>
-                          <a:spcPts val="0"/>
-                        </a:spcBef>
-                        <a:spcAft>
-                          <a:spcPts val="0"/>
-                        </a:spcAft>
-                        <a:buClrTx/>
-                        <a:buSzTx/>
-                        <a:buFontTx/>
-                        <a:buNone/>
-                        <a:tabLst/>
-                        <a:defRPr/>
-                      </a:pPr>
-                      <a:r>
-                        <a:t>NO OUTPUT TEXT CREATED</a:t>
-                      </a:r>
-                      <a:br/>
-                      <a:endParaRPr lang="en-US" dirty="0" smtClean="0"/>
-                    </a:p>
-                  </a:txBody>
-                  <a:tcPr/>
-                </a:tc>
-                <a:tc>
-                  <a:txBody>
-                    <a:bodyPr/>
-                    <a:lstStyle/>
-                    <a:p>
-                      <a:pPr marL="0" marR="0" indent="0" algn="l" defTabSz="914400" rtl="0" eaLnBrk="1" fontAlgn="auto" latinLnBrk="0" hangingPunct="1">
-                        <a:lnSpc>
-                          <a:spcPct val="100000"/>
-                        </a:lnSpc>
-                        <a:spcBef>
-                          <a:spcPts val="0"/>
-                        </a:spcBef>
-                        <a:spcAft>
-                          <a:spcPts val="0"/>
-                        </a:spcAft>
-                        <a:buClrTx/>
-                        <a:buSzTx/>
-                        <a:buFontTx/>
-                        <a:buNone/>
-                        <a:tabLst/>
-                        <a:defRPr/>
-                      </a:pPr>
-                      <a:r>
-                        <a:t>62%</a:t>
-                      </a:r>
-                      <a:br/>
-                      <a:endParaRPr lang="en-US" dirty="0" smtClean="0"/>
-                    </a:p>
-                  </a:txBody>
-                  <a:tcPr/>
-                </a:tc>
-                <a:tc>
-                  <a:txBody>
-                    <a:bodyPr/>
-                    <a:lstStyle/>
-                    <a:p>
-                      <a:endParaRPr lang="en-US"/>
-                    </a:p>
-                  </a:txBody>
-                  <a:tcPr/>
-                </a:tc>
-                <a:tc>
-                  <a:txBody>
-                    <a:bodyPr/>
-                    <a:lstStyle/>
-                    <a:p>
-                      <a:endParaRPr lang="en-US" dirty="0"/>
-                    </a:p>
-                  </a:txBody>
-                  <a:tcPr/>
-                </a:tc>
-              </a:tr>
-            </a:tbl>
+          <a:graphicData uri="http://schemas.openxmlformats.org/drawingml/2006/chart">
+            <c:chart xmlns:c="http://schemas.openxmlformats.org/drawingml/2006/chart" r:id="rId2"/>
           </a:graphicData>
         </a:graphic>
       </p:graphicFrame>
     </p:spTree>
     <p:extLst>
       <p:ext uri="{BB962C8B-B14F-4D97-AF65-F5344CB8AC3E}">
+        <p14:creationId xmlns:p14="http://schemas.microsoft.com/office/powerpoint/2010/main" val="1597361193"/>
+      </p:ext>
+    </p:extLst>
+  </p:cSld>
+  <p:clrMapOvr>
+    <a:masterClrMapping/>
+  </p:clrMapOvr>
+  <p:timing>
+    <p:tnLst>
+      <p:par>
+        <p:cTn id="1" dur="indefinite" restart="never" nodeType="tmRoot"/>
+      </p:par>
+    </p:tnLst>
+  </p:timing>
+</p:sld>
+</file>
+
+<file path=ppt/slides/slide3.xml><?xml version="1.0" encoding="utf-8"?>
+<p:sld xmlns:a="http://schemas.openxmlformats.org/drawingml/2006/main" xmlns:r="http://schemas.openxmlformats.org/officeDocument/2006/relationships" xmlns:p="http://schemas.openxmlformats.org/presentationml/2006/main">
+  <p:cSld>
+    <p:spTree>
+      <p:nvGrpSpPr>
+        <p:cNvPr id="1" name=""/>
+        <p:cNvGrpSpPr/>
+        <p:nvPr/>
+      </p:nvGrpSpPr>
+      <p:grpSpPr>
+        <a:xfrm>
+          <a:off x="0" y="0"/>
+          <a:ext cx="0" cy="0"/>
+          <a:chOff x="0" y="0"/>
+          <a:chExt cx="0" cy="0"/>
+        </a:xfrm>
+      </p:grpSpPr>
+      <p:sp>
+        <p:nvSpPr>
+          <p:cNvPr id="2" name="Title 1"/>
+          <p:cNvSpPr>
+            <a:spLocks noGrp="1"/>
+          </p:cNvSpPr>
+          <p:nvPr>
+            <p:ph type="title"/>
+          </p:nvPr>
+        </p:nvSpPr>
+        <p:spPr/>
+        <p:txBody>
+          <a:bodyPr/>
+          <a:lstStyle/>
+          <a:p>
+            <a:endParaRPr lang="en-US"/>
+          </a:p>
+        </p:txBody>
+      </p:sp>
+      <p:sp>
+        <p:nvSpPr>
+          <p:cNvPr id="3" name="Slide Number Placeholder 2"/>
+          <p:cNvSpPr>
+            <a:spLocks noGrp="1"/>
+          </p:cNvSpPr>
+          <p:nvPr>
+            <p:ph type="sldNum" sz="quarter" idx="12"/>
+          </p:nvPr>
+        </p:nvSpPr>
+        <p:spPr/>
+        <p:txBody>
+          <a:bodyPr>
+            <a:normAutofit fontScale="85000" lnSpcReduction="20000"/>
+          </a:bodyPr>
+          <a:lstStyle/>
+          <a:p>
+            <a:fld id="{0550DE80-A55D-4FEA-ABCE-0175392B4432}" type="slidenum">
+              <a:rPr lang="en-US" smtClean="0"/>
+              <a:t>3</a:t>
+            </a:fld>
+            <a:endParaRPr lang="en-US" dirty="0"/>
+          </a:p>
+        </p:txBody>
+      </p:sp>
+      <p:sp>
+        <p:nvSpPr>
+          <p:cNvPr id="4" name="Content Placeholder 3"/>
+          <p:cNvSpPr>
+            <a:spLocks noGrp="1"/>
+          </p:cNvSpPr>
+          <p:nvPr>
+            <p:ph sz="quarter" idx="1"/>
+          </p:nvPr>
+        </p:nvSpPr>
+        <p:spPr>
+          <a:xfrm>
+            <a:off x="1828800" y="2133600"/>
+            <a:ext cx="4575048" cy="2362200"/>
+          </a:xfrm>
+        </p:spPr>
+        <p:txBody>
+          <a:bodyPr/>
+          <a:lstStyle/>
+          <a:p/>
+        </p:txBody>
+      </p:sp>
+      <p:graphicFrame>
+        <p:nvGraphicFramePr>
+          <p:cNvPr id="5" name="Chart 4"/>
+          <p:cNvGraphicFramePr>
+            <a:graphicFrameLocks noGrp="1"/>
+          </p:cNvGraphicFramePr>
+          <p:nvPr/>
+        </p:nvGraphicFramePr>
+        <p:xfrm>
+          <a:off x="1828800" y="1828800"/>
+          <a:ext cx="2743200" cy="2362200"/>
+        </p:xfrm>
+        <a:graphic>
+          <a:graphicData uri="http://schemas.openxmlformats.org/drawingml/2006/chart">
+            <c:chart xmlns:c="http://schemas.openxmlformats.org/drawingml/2006/chart" r:id="rId2"/>
+          </a:graphicData>
+        </a:graphic>
+      </p:graphicFrame>
+    </p:spTree>
+    <p:extLst>
+      <p:ext uri="{BB962C8B-B14F-4D97-AF65-F5344CB8AC3E}">
+        <p14:creationId xmlns:p14="http://schemas.microsoft.com/office/powerpoint/2010/main" val="2054613054"/>
+      </p:ext>
+    </p:extLst>
+  </p:cSld>
+  <p:clrMapOvr>
+    <a:masterClrMapping/>
+  </p:clrMapOvr>
+</p:sld>
+</file>
+
+<file path=ppt/slides/slide4.xml><?xml version="1.0" encoding="utf-8"?>
+<p:sld xmlns:a="http://schemas.openxmlformats.org/drawingml/2006/main" xmlns:r="http://schemas.openxmlformats.org/officeDocument/2006/relationships" xmlns:p="http://schemas.openxmlformats.org/presentationml/2006/main">
+  <p:cSld>
+    <p:spTree>
+      <p:nvGrpSpPr>
+        <p:cNvPr id="1" name=""/>
+        <p:cNvGrpSpPr/>
+        <p:nvPr/>
+      </p:nvGrpSpPr>
+      <p:grpSpPr>
+        <a:xfrm>
+          <a:off x="0" y="0"/>
+          <a:ext cx="0" cy="0"/>
+          <a:chOff x="0" y="0"/>
+          <a:chExt cx="0" cy="0"/>
+        </a:xfrm>
+      </p:grpSpPr>
+      <p:sp>
+        <p:nvSpPr>
+          <p:cNvPr id="2" name="Title 1"/>
+          <p:cNvSpPr>
+            <a:spLocks noGrp="1"/>
+          </p:cNvSpPr>
+          <p:nvPr>
+            <p:ph type="title"/>
+          </p:nvPr>
+        </p:nvSpPr>
+        <p:spPr/>
+        <p:txBody>
+          <a:bodyPr/>
+          <a:lstStyle/>
+          <a:p>
+            <a:r>
+              <a:rPr lang="en-US" dirty="0" smtClean="0"/>
+              <a:t>Who participated?</a:t>
+            </a:r>
+            <a:endParaRPr lang="en-US" dirty="0"/>
+          </a:p>
+        </p:txBody>
+      </p:sp>
+      <p:sp>
+        <p:nvSpPr>
+          <p:cNvPr id="3" name="Content Placeholder 2"/>
+          <p:cNvSpPr>
+            <a:spLocks noGrp="1"/>
+          </p:cNvSpPr>
+          <p:nvPr>
+            <p:ph sz="quarter" idx="1"/>
+          </p:nvPr>
+        </p:nvSpPr>
+        <p:spPr>
+          <a:xfrm>
+            <a:off x="1524000" y="3352800"/>
+            <a:ext cx="6169152" cy="1066800"/>
+          </a:xfrm>
+        </p:spPr>
+        <p:txBody>
+          <a:bodyPr>
+            <a:normAutofit fontScale="62500" lnSpcReduction="20000"/>
+          </a:bodyPr>
+          <a:lstStyle/>
+          <a:p>
+            <a:pPr marL="0" indent="0">
+              <a:buNone/>
+            </a:pPr>
+            <a:r>
+              <a:t>Blah blah nospace38%nospace blah blah</a:t>
+            </a:r>
+            <a:endParaRPr lang="en-US" sz="4000" dirty="0"/>
+          </a:p>
+        </p:txBody>
+      </p:sp>
+      <p:sp>
+        <p:nvSpPr>
+          <p:cNvPr id="5" name="Slide Number Placeholder 4"/>
+          <p:cNvSpPr>
+            <a:spLocks noGrp="1"/>
+          </p:cNvSpPr>
+          <p:nvPr>
+            <p:ph type="sldNum" sz="quarter" idx="12"/>
+          </p:nvPr>
+        </p:nvSpPr>
+        <p:spPr/>
+        <p:txBody>
+          <a:bodyPr>
+            <a:normAutofit fontScale="85000" lnSpcReduction="20000"/>
+          </a:bodyPr>
+          <a:lstStyle/>
+          <a:p>
+            <a:fld id="{0550DE80-A55D-4FEA-ABCE-0175392B4432}" type="slidenum">
+              <a:rPr lang="en-US" smtClean="0"/>
+              <a:t>4</a:t>
+            </a:fld>
+            <a:endParaRPr lang="en-US" dirty="0"/>
+          </a:p>
+        </p:txBody>
+      </p:sp>
+    </p:spTree>
+    <p:extLst>
+      <p:ext uri="{BB962C8B-B14F-4D97-AF65-F5344CB8AC3E}">
         <p14:creationId xmlns:p14="http://schemas.microsoft.com/office/powerpoint/2010/main" val="580674313"/>
+      </p:ext>
+    </p:extLst>
+  </p:cSld>
+  <p:clrMapOvr>
+    <a:masterClrMapping/>
+  </p:clrMapOvr>
+  <p:timing>
+    <p:tnLst>
+      <p:par>
+        <p:cTn id="1" dur="indefinite" restart="never" nodeType="tmRoot"/>
+      </p:par>
+    </p:tnLst>
+  </p:timing>
+</p:sld>
+</file>
+
+<file path=ppt/slides/slide5.xml><?xml version="1.0" encoding="utf-8"?>
+<p:sld xmlns:a="http://schemas.openxmlformats.org/drawingml/2006/main" xmlns:r="http://schemas.openxmlformats.org/officeDocument/2006/relationships" xmlns:p="http://schemas.openxmlformats.org/presentationml/2006/main">
+  <p:cSld>
+    <p:spTree>
+      <p:nvGrpSpPr>
+        <p:cNvPr id="1" name=""/>
+        <p:cNvGrpSpPr/>
+        <p:nvPr/>
+      </p:nvGrpSpPr>
+      <p:grpSpPr>
+        <a:xfrm>
+          <a:off x="0" y="0"/>
+          <a:ext cx="0" cy="0"/>
+          <a:chOff x="0" y="0"/>
+          <a:chExt cx="0" cy="0"/>
+        </a:xfrm>
+      </p:grpSpPr>
+      <p:sp>
+        <p:nvSpPr>
+          <p:cNvPr id="2" name="Title 1"/>
+          <p:cNvSpPr>
+            <a:spLocks noGrp="1"/>
+          </p:cNvSpPr>
+          <p:nvPr>
+            <p:ph type="title"/>
+          </p:nvPr>
+        </p:nvSpPr>
+        <p:spPr/>
+        <p:txBody>
+          <a:bodyPr/>
+          <a:lstStyle/>
+          <a:p>
+            <a:r>
+              <a:rPr lang="en-US" dirty="0" smtClean="0"/>
+              <a:t>Who participated?</a:t>
+            </a:r>
+            <a:endParaRPr lang="en-US" dirty="0"/>
+          </a:p>
+        </p:txBody>
+      </p:sp>
+      <p:sp>
+        <p:nvSpPr>
+          <p:cNvPr id="3" name="Content Placeholder 2"/>
+          <p:cNvSpPr>
+            <a:spLocks noGrp="1"/>
+          </p:cNvSpPr>
+          <p:nvPr>
+            <p:ph sz="quarter" idx="1"/>
+          </p:nvPr>
+        </p:nvSpPr>
+        <p:spPr>
+          <a:xfrm>
+            <a:off x="1371600" y="2590800"/>
+            <a:ext cx="6169152" cy="1066800"/>
+          </a:xfrm>
+        </p:spPr>
+        <p:txBody>
+          <a:bodyPr>
+            <a:normAutofit/>
+          </a:bodyPr>
+          <a:lstStyle/>
+          <a:p>
+            <a:pPr marL="0" indent="0">
+              <a:buNone/>
+            </a:pPr>
+            <a:endParaRPr lang="en-US" sz="4000" dirty="0" smtClean="0"/>
+          </a:p>
+        </p:txBody>
+      </p:sp>
+      <p:sp>
+        <p:nvSpPr>
+          <p:cNvPr id="5" name="Slide Number Placeholder 4"/>
+          <p:cNvSpPr>
+            <a:spLocks noGrp="1"/>
+          </p:cNvSpPr>
+          <p:nvPr>
+            <p:ph type="sldNum" sz="quarter" idx="12"/>
+          </p:nvPr>
+        </p:nvSpPr>
+        <p:spPr/>
+        <p:txBody>
+          <a:bodyPr>
+            <a:normAutofit fontScale="85000" lnSpcReduction="20000"/>
+          </a:bodyPr>
+          <a:lstStyle/>
+          <a:p>
+            <a:fld id="{0550DE80-A55D-4FEA-ABCE-0175392B4432}" type="slidenum">
+              <a:rPr lang="en-US" smtClean="0"/>
+              <a:t>5</a:t>
+            </a:fld>
+            <a:endParaRPr lang="en-US" dirty="0"/>
+          </a:p>
+        </p:txBody>
+      </p:sp>
+      <p:sp>
+        <p:nvSpPr>
+          <p:cNvPr id="6" name="Content Placeholder 2"/>
+          <p:cNvSpPr txBox="1">
+            <a:spLocks/>
+          </p:cNvSpPr>
+          <p:nvPr/>
+        </p:nvSpPr>
+        <p:spPr>
+          <a:xfrm>
+            <a:off x="1447800" y="4191000"/>
+            <a:ext cx="6169152" cy="1066800"/>
+          </a:xfrm>
+          <a:prstGeom prst="rect">
+            <a:avLst/>
+          </a:prstGeom>
+        </p:spPr>
+        <p:txBody>
+          <a:bodyPr vert="horz">
+            <a:normAutofit fontScale="92500" lnSpcReduction="20000"/>
+          </a:bodyPr>
+          <a:lstStyle>
+            <a:lvl1pPr marL="320040" indent="-320040" algn="l" rtl="0" eaLnBrk="1" latinLnBrk="0" hangingPunct="1">
+              <a:spcBef>
+                <a:spcPts val="700"/>
+              </a:spcBef>
+              <a:buClr>
+                <a:schemeClr val="accent2"/>
+              </a:buClr>
+              <a:buSzPct val="60000"/>
+              <a:buFont typeface="Wingdings"/>
+              <a:buChar char=""/>
+              <a:defRPr kumimoji="0" sz="2900" kern="1200">
+                <a:solidFill>
+                  <a:schemeClr val="tx1"/>
+                </a:solidFill>
+                <a:latin typeface="+mn-lt"/>
+                <a:ea typeface="+mn-ea"/>
+                <a:cs typeface="+mn-cs"/>
+              </a:defRPr>
+            </a:lvl1pPr>
+            <a:lvl2pPr marL="640080" indent="-274320" algn="l" rtl="0" eaLnBrk="1" latinLnBrk="0" hangingPunct="1">
+              <a:spcBef>
+                <a:spcPts val="550"/>
+              </a:spcBef>
+              <a:buClr>
+                <a:schemeClr val="accent1"/>
+              </a:buClr>
+              <a:buSzPct val="70000"/>
+              <a:buFont typeface="Wingdings 2"/>
+              <a:buChar char=""/>
+              <a:defRPr kumimoji="0" sz="2600" kern="1200">
+                <a:solidFill>
+                  <a:schemeClr val="tx1"/>
+                </a:solidFill>
+                <a:latin typeface="+mn-lt"/>
+                <a:ea typeface="+mn-ea"/>
+                <a:cs typeface="+mn-cs"/>
+              </a:defRPr>
+            </a:lvl2pPr>
+            <a:lvl3pPr marL="914400" indent="-228600" algn="l" rtl="0" eaLnBrk="1" latinLnBrk="0" hangingPunct="1">
+              <a:spcBef>
+                <a:spcPts val="500"/>
+              </a:spcBef>
+              <a:buClr>
+                <a:schemeClr val="accent2"/>
+              </a:buClr>
+              <a:buSzPct val="75000"/>
+              <a:buFont typeface="Wingdings"/>
+              <a:buChar char=""/>
+              <a:defRPr kumimoji="0" sz="2300" kern="1200">
+                <a:solidFill>
+                  <a:schemeClr val="tx1"/>
+                </a:solidFill>
+                <a:latin typeface="+mn-lt"/>
+                <a:ea typeface="+mn-ea"/>
+                <a:cs typeface="+mn-cs"/>
+              </a:defRPr>
+            </a:lvl3pPr>
+            <a:lvl4pPr marL="1371600" indent="-228600" algn="l" rtl="0" eaLnBrk="1" latinLnBrk="0" hangingPunct="1">
+              <a:spcBef>
+                <a:spcPts val="400"/>
+              </a:spcBef>
+              <a:buClr>
+                <a:schemeClr val="accent3"/>
+              </a:buClr>
+              <a:buSzPct val="75000"/>
+              <a:buFont typeface="Wingdings"/>
+              <a:buChar char=""/>
+              <a:defRPr kumimoji="0" sz="2000" kern="1200">
+                <a:solidFill>
+                  <a:schemeClr val="tx1"/>
+                </a:solidFill>
+                <a:latin typeface="+mn-lt"/>
+                <a:ea typeface="+mn-ea"/>
+                <a:cs typeface="+mn-cs"/>
+              </a:defRPr>
+            </a:lvl4pPr>
+            <a:lvl5pPr marL="1828800" indent="-228600" algn="l" rtl="0" eaLnBrk="1" latinLnBrk="0" hangingPunct="1">
+              <a:spcBef>
+                <a:spcPts val="400"/>
+              </a:spcBef>
+              <a:buClr>
+                <a:schemeClr val="accent4"/>
+              </a:buClr>
+              <a:buSzPct val="65000"/>
+              <a:buFont typeface="Wingdings"/>
+              <a:buChar char=""/>
+              <a:defRPr kumimoji="0" sz="2000" kern="1200">
+                <a:solidFill>
+                  <a:schemeClr val="tx1"/>
+                </a:solidFill>
+                <a:latin typeface="+mn-lt"/>
+                <a:ea typeface="+mn-ea"/>
+                <a:cs typeface="+mn-cs"/>
+              </a:defRPr>
+            </a:lvl5pPr>
+            <a:lvl6pPr marL="2103120" indent="-228600" algn="l" rtl="0" eaLnBrk="1" latinLnBrk="0" hangingPunct="1">
+              <a:spcBef>
+                <a:spcPct val="20000"/>
+              </a:spcBef>
+              <a:buClr>
+                <a:schemeClr val="accent1"/>
+              </a:buClr>
+              <a:buFont typeface="Wingdings"/>
+              <a:buChar char="§"/>
+              <a:defRPr kumimoji="0" sz="1800" kern="1200" baseline="0">
+                <a:solidFill>
+                  <a:schemeClr val="tx1"/>
+                </a:solidFill>
+                <a:latin typeface="+mn-lt"/>
+                <a:ea typeface="+mn-ea"/>
+                <a:cs typeface="+mn-cs"/>
+              </a:defRPr>
+            </a:lvl6pPr>
+            <a:lvl7pPr marL="2377440" indent="-228600" algn="l" rtl="0" eaLnBrk="1" latinLnBrk="0" hangingPunct="1">
+              <a:spcBef>
+                <a:spcPct val="20000"/>
+              </a:spcBef>
+              <a:buClr>
+                <a:schemeClr val="accent2"/>
+              </a:buClr>
+              <a:buFont typeface="Wingdings"/>
+              <a:buChar char="§"/>
+              <a:defRPr kumimoji="0" sz="1800" kern="1200" baseline="0">
+                <a:solidFill>
+                  <a:schemeClr val="tx1"/>
+                </a:solidFill>
+                <a:latin typeface="+mn-lt"/>
+                <a:ea typeface="+mn-ea"/>
+                <a:cs typeface="+mn-cs"/>
+              </a:defRPr>
+            </a:lvl7pPr>
+            <a:lvl8pPr marL="2651760" indent="-228600" algn="l" rtl="0" eaLnBrk="1" latinLnBrk="0" hangingPunct="1">
+              <a:spcBef>
+                <a:spcPct val="20000"/>
+              </a:spcBef>
+              <a:buClr>
+                <a:schemeClr val="accent3"/>
+              </a:buClr>
+              <a:buFont typeface="Wingdings"/>
+              <a:buChar char="§"/>
+              <a:defRPr kumimoji="0" sz="1800" kern="1200" baseline="0">
+                <a:solidFill>
+                  <a:schemeClr val="tx1"/>
+                </a:solidFill>
+                <a:latin typeface="+mn-lt"/>
+                <a:ea typeface="+mn-ea"/>
+                <a:cs typeface="+mn-cs"/>
+              </a:defRPr>
+            </a:lvl8pPr>
+            <a:lvl9pPr marL="2926080" indent="-228600" algn="l" rtl="0" eaLnBrk="1" latinLnBrk="0" hangingPunct="1">
+              <a:spcBef>
+                <a:spcPct val="20000"/>
+              </a:spcBef>
+              <a:buClr>
+                <a:schemeClr val="accent4"/>
+              </a:buClr>
+              <a:buFont typeface="Wingdings"/>
+              <a:buChar char="§"/>
+              <a:defRPr kumimoji="0" sz="1800" kern="1200" baseline="0">
+                <a:solidFill>
+                  <a:schemeClr val="tx1"/>
+                </a:solidFill>
+                <a:latin typeface="+mn-lt"/>
+                <a:ea typeface="+mn-ea"/>
+                <a:cs typeface="+mn-cs"/>
+              </a:defRPr>
+            </a:lvl9pPr>
+          </a:lstStyle>
+          <a:p>
+            <a:pPr marL="0" indent="0">
+              <a:buNone/>
+            </a:pPr>
+            <a:r>
+              <a:t>32%</a:t>
+            </a:r>
+          </a:p>
+        </p:txBody>
+      </p:sp>
+    </p:spTree>
+    <p:extLst>
+      <p:ext uri="{BB962C8B-B14F-4D97-AF65-F5344CB8AC3E}">
+        <p14:creationId xmlns:p14="http://schemas.microsoft.com/office/powerpoint/2010/main" val="2841723979"/>
+      </p:ext>
+    </p:extLst>
+  </p:cSld>
+  <p:clrMapOvr>
+    <a:masterClrMapping/>
+  </p:clrMapOvr>
+  <p:timing>
+    <p:tnLst>
+      <p:par>
+        <p:cTn id="1" dur="indefinite" restart="never" nodeType="tmRoot"/>
+      </p:par>
+    </p:tnLst>
+  </p:timing>
+</p:sld>
+</file>
+
+<file path=ppt/slides/slide6.xml><?xml version="1.0" encoding="utf-8"?>
+<p:sld xmlns:a="http://schemas.openxmlformats.org/drawingml/2006/main" xmlns:r="http://schemas.openxmlformats.org/officeDocument/2006/relationships" xmlns:p="http://schemas.openxmlformats.org/presentationml/2006/main">
+  <p:cSld>
+    <p:spTree>
+      <p:nvGrpSpPr>
+        <p:cNvPr id="1" name=""/>
+        <p:cNvGrpSpPr/>
+        <p:nvPr/>
+      </p:nvGrpSpPr>
+      <p:grpSpPr>
+        <a:xfrm>
+          <a:off x="0" y="0"/>
+          <a:ext cx="0" cy="0"/>
+          <a:chOff x="0" y="0"/>
+          <a:chExt cx="0" cy="0"/>
+        </a:xfrm>
+      </p:grpSpPr>
+      <p:sp>
+        <p:nvSpPr>
+          <p:cNvPr id="2" name="Title 1"/>
+          <p:cNvSpPr>
+            <a:spLocks noGrp="1"/>
+          </p:cNvSpPr>
+          <p:nvPr>
+            <p:ph type="title"/>
+          </p:nvPr>
+        </p:nvSpPr>
+        <p:spPr/>
+        <p:txBody>
+          <a:bodyPr/>
+          <a:lstStyle/>
+          <a:p>
+            <a:r>
+              <a:rPr lang="en-US" dirty="0" smtClean="0"/>
+              <a:t>Who participated?</a:t>
+            </a:r>
+            <a:endParaRPr lang="en-US" dirty="0"/>
+          </a:p>
+        </p:txBody>
+      </p:sp>
+      <p:sp>
+        <p:nvSpPr>
+          <p:cNvPr id="3" name="Content Placeholder 2"/>
+          <p:cNvSpPr>
+            <a:spLocks noGrp="1"/>
+          </p:cNvSpPr>
+          <p:nvPr>
+            <p:ph sz="quarter" idx="1"/>
+          </p:nvPr>
+        </p:nvSpPr>
+        <p:spPr>
+          <a:xfrm>
+            <a:off x="612648" y="1600200"/>
+            <a:ext cx="8153400" cy="3886198"/>
+          </a:xfrm>
+        </p:spPr>
+        <p:txBody>
+          <a:bodyPr>
+            <a:normAutofit/>
+          </a:bodyPr>
+          <a:lstStyle/>
+          <a:p>
+            <a:pPr marL="0" indent="0">
+              <a:buNone/>
+            </a:pPr>
+          </a:p>
+        </p:txBody>
+      </p:sp>
+      <p:sp>
+        <p:nvSpPr>
+          <p:cNvPr id="5" name="Slide Number Placeholder 4"/>
+          <p:cNvSpPr>
+            <a:spLocks noGrp="1"/>
+          </p:cNvSpPr>
+          <p:nvPr>
+            <p:ph type="sldNum" sz="quarter" idx="12"/>
+          </p:nvPr>
+        </p:nvSpPr>
+        <p:spPr/>
+        <p:txBody>
+          <a:bodyPr>
+            <a:normAutofit fontScale="85000" lnSpcReduction="20000"/>
+          </a:bodyPr>
+          <a:lstStyle/>
+          <a:p>
+            <a:fld id="{0550DE80-A55D-4FEA-ABCE-0175392B4432}" type="slidenum">
+              <a:rPr lang="en-US" smtClean="0"/>
+              <a:t>6</a:t>
+            </a:fld>
+            <a:endParaRPr lang="en-US" dirty="0"/>
+          </a:p>
+        </p:txBody>
+      </p:sp>
+      <p:graphicFrame>
+        <p:nvGraphicFramePr>
+          <p:cNvPr id="4" name="Chart 3"/>
+          <p:cNvGraphicFramePr>
+            <a:graphicFrameLocks noGrp="1"/>
+          </p:cNvGraphicFramePr>
+          <p:nvPr/>
+        </p:nvGraphicFramePr>
+        <p:xfrm>
+          <a:off x="1828800" y="1828800"/>
+          <a:ext cx="2743200" cy="3886198"/>
+        </p:xfrm>
+        <a:graphic>
+          <a:graphicData uri="http://schemas.openxmlformats.org/drawingml/2006/chart">
+            <c:chart xmlns:c="http://schemas.openxmlformats.org/drawingml/2006/chart" r:id="rId2"/>
+          </a:graphicData>
+        </a:graphic>
+      </p:graphicFrame>
+    </p:spTree>
+    <p:extLst>
+      <p:ext uri="{BB962C8B-B14F-4D97-AF65-F5344CB8AC3E}">
+        <p14:creationId xmlns:p14="http://schemas.microsoft.com/office/powerpoint/2010/main" val="3209572625"/>
+      </p:ext>
+    </p:extLst>
+  </p:cSld>
+  <p:clrMapOvr>
+    <a:masterClrMapping/>
+  </p:clrMapOvr>
+  <p:timing>
+    <p:tnLst>
+      <p:par>
+        <p:cTn id="1" dur="indefinite" restart="never" nodeType="tmRoot"/>
+      </p:par>
+    </p:tnLst>
+  </p:timing>
+</p:sld>
+</file>
+
+<file path=ppt/slides/slide7.xml><?xml version="1.0" encoding="utf-8"?>
+<p:sld xmlns:a="http://schemas.openxmlformats.org/drawingml/2006/main" xmlns:r="http://schemas.openxmlformats.org/officeDocument/2006/relationships" xmlns:p="http://schemas.openxmlformats.org/presentationml/2006/main">
+  <p:cSld>
+    <p:spTree>
+      <p:nvGrpSpPr>
+        <p:cNvPr id="1" name=""/>
+        <p:cNvGrpSpPr/>
+        <p:nvPr/>
+      </p:nvGrpSpPr>
+      <p:grpSpPr>
+        <a:xfrm>
+          <a:off x="0" y="0"/>
+          <a:ext cx="0" cy="0"/>
+          <a:chOff x="0" y="0"/>
+          <a:chExt cx="0" cy="0"/>
+        </a:xfrm>
+      </p:grpSpPr>
+      <p:sp>
+        <p:nvSpPr>
+          <p:cNvPr id="2" name="Title 1"/>
+          <p:cNvSpPr>
+            <a:spLocks noGrp="1"/>
+          </p:cNvSpPr>
+          <p:nvPr>
+            <p:ph type="title"/>
+          </p:nvPr>
+        </p:nvSpPr>
+        <p:spPr/>
+        <p:txBody>
+          <a:bodyPr/>
+          <a:lstStyle/>
+          <a:p>
+            <a:r>
+              <a:rPr lang="en-US" dirty="0" smtClean="0"/>
+              <a:t>Resources</a:t>
+            </a:r>
+            <a:endParaRPr lang="en-US" dirty="0"/>
+          </a:p>
+        </p:txBody>
+      </p:sp>
+      <p:sp>
+        <p:nvSpPr>
+          <p:cNvPr id="3" name="Content Placeholder 2"/>
+          <p:cNvSpPr>
+            <a:spLocks noGrp="1"/>
+          </p:cNvSpPr>
+          <p:nvPr>
+            <p:ph sz="quarter" idx="1"/>
+          </p:nvPr>
+        </p:nvSpPr>
+        <p:spPr>
+          <a:xfrm>
+            <a:off x="612648" y="1600200"/>
+            <a:ext cx="8150352" cy="4800600"/>
+          </a:xfrm>
+        </p:spPr>
+        <p:txBody>
+          <a:bodyPr>
+            <a:normAutofit fontScale="77500" lnSpcReduction="20000"/>
+          </a:bodyPr>
+          <a:lstStyle/>
+          <a:p>
+            <a:r>
+              <a:rPr lang="en-US" sz="3100" dirty="0" smtClean="0"/>
+              <a:t>Managing </a:t>
+            </a:r>
+            <a:r>
+              <a:rPr lang="en-US" sz="3100" dirty="0"/>
+              <a:t>Overweight and Obesity in Adults: Systematic Evidence </a:t>
+            </a:r>
+            <a:r>
+              <a:rPr lang="en-US" sz="3100" dirty="0" smtClean="0"/>
+              <a:t>Review from </a:t>
+            </a:r>
+            <a:r>
+              <a:rPr lang="en-US" sz="3100" dirty="0"/>
+              <a:t>the Obesity Expert Panel. </a:t>
+            </a:r>
+            <a:r>
+              <a:rPr lang="en-US" sz="3100" u="sng" dirty="0" smtClean="0">
+                <a:hlinkClick r:id="rId3" tooltip="Link to External Web Site"/>
+              </a:rPr>
+              <a:t>www.nhlbi.nih.gov/sites/www.nhlbi.nih.gov/files/obesity-evidence-review.pdf[PDF </a:t>
+            </a:r>
+            <a:r>
+              <a:rPr lang="en-US" sz="3100" u="sng" dirty="0">
+                <a:hlinkClick r:id="rId3" tooltip="Link to External Web Site"/>
+              </a:rPr>
+              <a:t>- 93KB]</a:t>
+            </a:r>
+            <a:endParaRPr lang="en-US" sz="3100" dirty="0"/>
+          </a:p>
+          <a:p>
+            <a:r>
+              <a:rPr lang="en-US" sz="3100" dirty="0" smtClean="0"/>
+              <a:t>Clinical </a:t>
+            </a:r>
+            <a:r>
+              <a:rPr lang="en-US" sz="3100" dirty="0"/>
+              <a:t>Guidelines on the Identification, Evaluation, and Treatment of Overweight and Obesity in </a:t>
+            </a:r>
+            <a:r>
+              <a:rPr lang="en-US" sz="3100" dirty="0" smtClean="0"/>
+              <a:t>Adults</a:t>
+            </a:r>
+            <a:r>
+              <a:rPr lang="en-US" sz="3100" u="sng" dirty="0" smtClean="0">
+                <a:hlinkClick r:id="rId4" tooltip="Link to External Web Site"/>
+              </a:rPr>
+              <a:t> www.nhlbi.nih.gov/files/docs/guidelines/ob_gdlns.pdf[PDF </a:t>
+            </a:r>
+            <a:r>
+              <a:rPr lang="en-US" sz="3100" u="sng" dirty="0">
+                <a:hlinkClick r:id="rId4" tooltip="Link to External Web Site"/>
+              </a:rPr>
+              <a:t>- 2MB]</a:t>
+            </a:r>
+            <a:endParaRPr lang="en-US" sz="3100" dirty="0"/>
+          </a:p>
+          <a:p>
+            <a:r>
+              <a:rPr lang="en-US" sz="3100" dirty="0" smtClean="0"/>
+              <a:t>U.S</a:t>
+            </a:r>
+            <a:r>
+              <a:rPr lang="en-US" sz="3100" dirty="0"/>
+              <a:t>. Department of Health and Human </a:t>
+            </a:r>
+            <a:r>
+              <a:rPr lang="en-US" sz="3100" dirty="0" smtClean="0"/>
+              <a:t>Services, Office </a:t>
+            </a:r>
+            <a:r>
+              <a:rPr lang="en-US" sz="3100" dirty="0"/>
+              <a:t>of Disease Prevention and Health </a:t>
+            </a:r>
+            <a:r>
+              <a:rPr lang="en-US" sz="3100" dirty="0" smtClean="0"/>
+              <a:t>Promotion, </a:t>
+            </a:r>
+            <a:r>
+              <a:rPr lang="en-US" sz="3100" i="1" dirty="0"/>
+              <a:t>2008 Physical Activity Guidelines for </a:t>
+            </a:r>
+            <a:r>
+              <a:rPr lang="en-US" sz="3100" i="1" dirty="0" smtClean="0"/>
+              <a:t>Americans</a:t>
+            </a:r>
+          </a:p>
+          <a:p>
+            <a:r>
+              <a:rPr lang="en-US" sz="3100" dirty="0" smtClean="0"/>
+              <a:t>My Plate </a:t>
+            </a:r>
+            <a:r>
+              <a:rPr lang="en-US" sz="3100" dirty="0" smtClean="0">
+                <a:hlinkClick r:id="rId5"/>
+              </a:rPr>
+              <a:t>www.choosemyplate.gov</a:t>
+            </a:r>
+            <a:endParaRPr lang="en-US" sz="3100" dirty="0" smtClean="0"/>
+          </a:p>
+          <a:p>
+            <a:r>
+              <a:rPr lang="en-US" sz="3100" dirty="0" smtClean="0"/>
+              <a:t>Center for Disease Control </a:t>
+            </a:r>
+          </a:p>
+          <a:p>
+            <a:r>
+              <a:rPr lang="en-US" sz="3100" dirty="0" smtClean="0"/>
+              <a:t>Harvard School of Public Health</a:t>
+            </a:r>
+          </a:p>
+          <a:p>
+            <a:endParaRPr lang="en-US" dirty="0"/>
+          </a:p>
+          <a:p>
+            <a:endParaRPr lang="en-US" dirty="0" smtClean="0"/>
+          </a:p>
+          <a:p>
+            <a:endParaRPr lang="en-US" dirty="0"/>
+          </a:p>
+        </p:txBody>
+      </p:sp>
+      <p:sp>
+        <p:nvSpPr>
+          <p:cNvPr id="5" name="Slide Number Placeholder 4"/>
+          <p:cNvSpPr>
+            <a:spLocks noGrp="1"/>
+          </p:cNvSpPr>
+          <p:nvPr>
+            <p:ph type="sldNum" sz="quarter" idx="12"/>
+          </p:nvPr>
+        </p:nvSpPr>
+        <p:spPr/>
+        <p:txBody>
+          <a:bodyPr>
+            <a:normAutofit fontScale="85000" lnSpcReduction="20000"/>
+          </a:bodyPr>
+          <a:lstStyle/>
+          <a:p>
+            <a:fld id="{0550DE80-A55D-4FEA-ABCE-0175392B4432}" type="slidenum">
+              <a:rPr lang="en-US" smtClean="0"/>
+              <a:t>7</a:t>
+            </a:fld>
+            <a:endParaRPr lang="en-US" dirty="0"/>
+          </a:p>
+        </p:txBody>
+      </p:sp>
+    </p:spTree>
+    <p:extLst>
+      <p:ext uri="{BB962C8B-B14F-4D97-AF65-F5344CB8AC3E}">
+        <p14:creationId xmlns:p14="http://schemas.microsoft.com/office/powerpoint/2010/main" val="20209268"/>
       </p:ext>
     </p:extLst>
   </p:cSld>

</xml_diff>